<commit_message>
add a video demo link in the PPT
</commit_message>
<xml_diff>
--- a/trace-symexec/PPTs/demo-1.pptx
+++ b/trace-symexec/PPTs/demo-1.pptx
@@ -1508,6 +1508,1911 @@
     </pc:docChg>
   </pc:docChgLst>
   <pc:docChgLst>
+    <pc:chgData name="Shuo Chen (MSR)" userId="2e7ebbab-928d-4621-b055-ba5ecd87af3f" providerId="ADAL" clId="{406DA4F5-19E9-4571-B523-F5B122CA674E}"/>
+    <pc:docChg chg="undo custSel addSld delSld modSld sldOrd modShowInfo">
+      <pc:chgData name="Shuo Chen (MSR)" userId="2e7ebbab-928d-4621-b055-ba5ecd87af3f" providerId="ADAL" clId="{406DA4F5-19E9-4571-B523-F5B122CA674E}" dt="2023-05-05T18:13:38.804" v="1693" actId="2744"/>
+      <pc:docMkLst>
+        <pc:docMk/>
+      </pc:docMkLst>
+      <pc:sldChg chg="addSp delSp modSp mod modTransition delAnim modAnim modNotesTx">
+        <pc:chgData name="Shuo Chen (MSR)" userId="2e7ebbab-928d-4621-b055-ba5ecd87af3f" providerId="ADAL" clId="{406DA4F5-19E9-4571-B523-F5B122CA674E}" dt="2023-05-02T03:18:42.035" v="13"/>
+        <pc:sldMkLst>
+          <pc:docMk/>
+          <pc:sldMk cId="1520681955" sldId="256"/>
+        </pc:sldMkLst>
+        <pc:picChg chg="add del mod">
+          <ac:chgData name="Shuo Chen (MSR)" userId="2e7ebbab-928d-4621-b055-ba5ecd87af3f" providerId="ADAL" clId="{406DA4F5-19E9-4571-B523-F5B122CA674E}" dt="2023-05-02T03:17:23.562" v="4" actId="478"/>
+          <ac:picMkLst>
+            <pc:docMk/>
+            <pc:sldMk cId="1520681955" sldId="256"/>
+            <ac:picMk id="6" creationId="{C2E8D74D-EC8E-3D3C-9B2F-916CC8FAF617}"/>
+          </ac:picMkLst>
+        </pc:picChg>
+        <pc:picChg chg="add del mod">
+          <ac:chgData name="Shuo Chen (MSR)" userId="2e7ebbab-928d-4621-b055-ba5ecd87af3f" providerId="ADAL" clId="{406DA4F5-19E9-4571-B523-F5B122CA674E}" dt="2023-05-02T03:17:17.450" v="3" actId="478"/>
+          <ac:picMkLst>
+            <pc:docMk/>
+            <pc:sldMk cId="1520681955" sldId="256"/>
+            <ac:picMk id="9" creationId="{EE93F9E8-F9DD-A21D-989B-4E446938EFDE}"/>
+          </ac:picMkLst>
+        </pc:picChg>
+        <pc:picChg chg="add del mod">
+          <ac:chgData name="Shuo Chen (MSR)" userId="2e7ebbab-928d-4621-b055-ba5ecd87af3f" providerId="ADAL" clId="{406DA4F5-19E9-4571-B523-F5B122CA674E}" dt="2023-05-02T03:17:52" v="7"/>
+          <ac:picMkLst>
+            <pc:docMk/>
+            <pc:sldMk cId="1520681955" sldId="256"/>
+            <ac:picMk id="12" creationId="{34565B21-9F65-9117-C19F-696780D7D2DC}"/>
+          </ac:picMkLst>
+        </pc:picChg>
+        <pc:picChg chg="add del mod">
+          <ac:chgData name="Shuo Chen (MSR)" userId="2e7ebbab-928d-4621-b055-ba5ecd87af3f" providerId="ADAL" clId="{406DA4F5-19E9-4571-B523-F5B122CA674E}" dt="2023-05-02T03:17:55.956" v="9"/>
+          <ac:picMkLst>
+            <pc:docMk/>
+            <pc:sldMk cId="1520681955" sldId="256"/>
+            <ac:picMk id="13" creationId="{EB73D28B-5F5F-31E0-EA03-FD005324DDDE}"/>
+          </ac:picMkLst>
+        </pc:picChg>
+        <pc:picChg chg="add del mod ord">
+          <ac:chgData name="Shuo Chen (MSR)" userId="2e7ebbab-928d-4621-b055-ba5ecd87af3f" providerId="ADAL" clId="{406DA4F5-19E9-4571-B523-F5B122CA674E}" dt="2023-05-02T03:18:08.276" v="10"/>
+          <ac:picMkLst>
+            <pc:docMk/>
+            <pc:sldMk cId="1520681955" sldId="256"/>
+            <ac:picMk id="16" creationId="{F1F47BC9-82E3-F542-DA50-321879284F80}"/>
+          </ac:picMkLst>
+        </pc:picChg>
+        <pc:picChg chg="add del mod">
+          <ac:chgData name="Shuo Chen (MSR)" userId="2e7ebbab-928d-4621-b055-ba5ecd87af3f" providerId="ADAL" clId="{406DA4F5-19E9-4571-B523-F5B122CA674E}" dt="2023-05-02T03:18:14.309" v="12"/>
+          <ac:picMkLst>
+            <pc:docMk/>
+            <pc:sldMk cId="1520681955" sldId="256"/>
+            <ac:picMk id="17" creationId="{16CBD6A4-C3A7-450A-4993-A6E957131DA7}"/>
+          </ac:picMkLst>
+        </pc:picChg>
+        <pc:picChg chg="add del mod ord">
+          <ac:chgData name="Shuo Chen (MSR)" userId="2e7ebbab-928d-4621-b055-ba5ecd87af3f" providerId="ADAL" clId="{406DA4F5-19E9-4571-B523-F5B122CA674E}" dt="2023-05-02T03:18:42.035" v="13"/>
+          <ac:picMkLst>
+            <pc:docMk/>
+            <pc:sldMk cId="1520681955" sldId="256"/>
+            <ac:picMk id="20" creationId="{F28BE608-0989-876F-FC46-7377C87791AE}"/>
+          </ac:picMkLst>
+        </pc:picChg>
+        <pc:picChg chg="add mod">
+          <ac:chgData name="Shuo Chen (MSR)" userId="2e7ebbab-928d-4621-b055-ba5ecd87af3f" providerId="ADAL" clId="{406DA4F5-19E9-4571-B523-F5B122CA674E}" dt="2023-05-02T03:18:42.035" v="13"/>
+          <ac:picMkLst>
+            <pc:docMk/>
+            <pc:sldMk cId="1520681955" sldId="256"/>
+            <ac:picMk id="21" creationId="{3386CEEE-3E55-7D00-8F40-E73B46BD4943}"/>
+          </ac:picMkLst>
+        </pc:picChg>
+      </pc:sldChg>
+      <pc:sldChg chg="addSp delSp modSp mod modTransition modAnim modNotesTx">
+        <pc:chgData name="Shuo Chen (MSR)" userId="2e7ebbab-928d-4621-b055-ba5ecd87af3f" providerId="ADAL" clId="{406DA4F5-19E9-4571-B523-F5B122CA674E}" dt="2023-05-02T03:32:31.369" v="244" actId="313"/>
+        <pc:sldMkLst>
+          <pc:docMk/>
+          <pc:sldMk cId="769397940" sldId="257"/>
+        </pc:sldMkLst>
+        <pc:spChg chg="mod">
+          <ac:chgData name="Shuo Chen (MSR)" userId="2e7ebbab-928d-4621-b055-ba5ecd87af3f" providerId="ADAL" clId="{406DA4F5-19E9-4571-B523-F5B122CA674E}" dt="2023-05-02T03:32:31.369" v="244" actId="313"/>
+          <ac:spMkLst>
+            <pc:docMk/>
+            <pc:sldMk cId="769397940" sldId="257"/>
+            <ac:spMk id="3" creationId="{972576A2-9783-8BE4-9C81-A05A503372EA}"/>
+          </ac:spMkLst>
+        </pc:spChg>
+        <pc:picChg chg="add del mod">
+          <ac:chgData name="Shuo Chen (MSR)" userId="2e7ebbab-928d-4621-b055-ba5ecd87af3f" providerId="ADAL" clId="{406DA4F5-19E9-4571-B523-F5B122CA674E}" dt="2023-05-02T03:26:07.650" v="183"/>
+          <ac:picMkLst>
+            <pc:docMk/>
+            <pc:sldMk cId="769397940" sldId="257"/>
+            <ac:picMk id="11" creationId="{168450FE-1672-FC06-6D8A-E1CE123269D1}"/>
+          </ac:picMkLst>
+        </pc:picChg>
+        <pc:picChg chg="add del mod ord">
+          <ac:chgData name="Shuo Chen (MSR)" userId="2e7ebbab-928d-4621-b055-ba5ecd87af3f" providerId="ADAL" clId="{406DA4F5-19E9-4571-B523-F5B122CA674E}" dt="2023-05-02T03:26:17.241" v="184"/>
+          <ac:picMkLst>
+            <pc:docMk/>
+            <pc:sldMk cId="769397940" sldId="257"/>
+            <ac:picMk id="14" creationId="{1D2800E4-FB29-AA57-588C-E8978D0B3E50}"/>
+          </ac:picMkLst>
+        </pc:picChg>
+        <pc:picChg chg="add del mod">
+          <ac:chgData name="Shuo Chen (MSR)" userId="2e7ebbab-928d-4621-b055-ba5ecd87af3f" providerId="ADAL" clId="{406DA4F5-19E9-4571-B523-F5B122CA674E}" dt="2023-05-02T03:26:18.927" v="186"/>
+          <ac:picMkLst>
+            <pc:docMk/>
+            <pc:sldMk cId="769397940" sldId="257"/>
+            <ac:picMk id="15" creationId="{9FFE323A-1ED0-CCE8-C32C-200E967DC588}"/>
+          </ac:picMkLst>
+        </pc:picChg>
+        <pc:picChg chg="add del mod ord">
+          <ac:chgData name="Shuo Chen (MSR)" userId="2e7ebbab-928d-4621-b055-ba5ecd87af3f" providerId="ADAL" clId="{406DA4F5-19E9-4571-B523-F5B122CA674E}" dt="2023-05-02T03:26:28.779" v="187"/>
+          <ac:picMkLst>
+            <pc:docMk/>
+            <pc:sldMk cId="769397940" sldId="257"/>
+            <ac:picMk id="18" creationId="{413FBF46-18A9-9E5E-1F75-3505670E6F9D}"/>
+          </ac:picMkLst>
+        </pc:picChg>
+        <pc:picChg chg="add del mod">
+          <ac:chgData name="Shuo Chen (MSR)" userId="2e7ebbab-928d-4621-b055-ba5ecd87af3f" providerId="ADAL" clId="{406DA4F5-19E9-4571-B523-F5B122CA674E}" dt="2023-05-02T03:26:32.680" v="189"/>
+          <ac:picMkLst>
+            <pc:docMk/>
+            <pc:sldMk cId="769397940" sldId="257"/>
+            <ac:picMk id="19" creationId="{26A2D441-192A-5DF7-17C4-7820557AE772}"/>
+          </ac:picMkLst>
+        </pc:picChg>
+        <pc:picChg chg="add del mod ord">
+          <ac:chgData name="Shuo Chen (MSR)" userId="2e7ebbab-928d-4621-b055-ba5ecd87af3f" providerId="ADAL" clId="{406DA4F5-19E9-4571-B523-F5B122CA674E}" dt="2023-05-02T03:26:46.036" v="190"/>
+          <ac:picMkLst>
+            <pc:docMk/>
+            <pc:sldMk cId="769397940" sldId="257"/>
+            <ac:picMk id="22" creationId="{4575CDF3-F011-9746-501E-59CA8CCA05E6}"/>
+          </ac:picMkLst>
+        </pc:picChg>
+        <pc:picChg chg="add del mod">
+          <ac:chgData name="Shuo Chen (MSR)" userId="2e7ebbab-928d-4621-b055-ba5ecd87af3f" providerId="ADAL" clId="{406DA4F5-19E9-4571-B523-F5B122CA674E}" dt="2023-05-02T03:27:13.759" v="195"/>
+          <ac:picMkLst>
+            <pc:docMk/>
+            <pc:sldMk cId="769397940" sldId="257"/>
+            <ac:picMk id="23" creationId="{635D1AC6-055B-14A4-1AF2-B9F90C951ABA}"/>
+          </ac:picMkLst>
+        </pc:picChg>
+        <pc:picChg chg="add del mod ord">
+          <ac:chgData name="Shuo Chen (MSR)" userId="2e7ebbab-928d-4621-b055-ba5ecd87af3f" providerId="ADAL" clId="{406DA4F5-19E9-4571-B523-F5B122CA674E}" dt="2023-05-02T03:28:15.523" v="196"/>
+          <ac:picMkLst>
+            <pc:docMk/>
+            <pc:sldMk cId="769397940" sldId="257"/>
+            <ac:picMk id="27" creationId="{F3FD7C40-3A7F-97FD-58BE-41ECC0A28CC8}"/>
+          </ac:picMkLst>
+        </pc:picChg>
+        <pc:picChg chg="add del mod">
+          <ac:chgData name="Shuo Chen (MSR)" userId="2e7ebbab-928d-4621-b055-ba5ecd87af3f" providerId="ADAL" clId="{406DA4F5-19E9-4571-B523-F5B122CA674E}" dt="2023-05-02T03:28:18.136" v="198"/>
+          <ac:picMkLst>
+            <pc:docMk/>
+            <pc:sldMk cId="769397940" sldId="257"/>
+            <ac:picMk id="28" creationId="{3F2814F9-6F90-C7B2-41BD-4390190C6AD7}"/>
+          </ac:picMkLst>
+        </pc:picChg>
+        <pc:picChg chg="add del mod ord">
+          <ac:chgData name="Shuo Chen (MSR)" userId="2e7ebbab-928d-4621-b055-ba5ecd87af3f" providerId="ADAL" clId="{406DA4F5-19E9-4571-B523-F5B122CA674E}" dt="2023-05-02T03:29:03.895" v="199"/>
+          <ac:picMkLst>
+            <pc:docMk/>
+            <pc:sldMk cId="769397940" sldId="257"/>
+            <ac:picMk id="31" creationId="{E36889D6-49DC-0697-1AA9-0AF628DC77A8}"/>
+          </ac:picMkLst>
+        </pc:picChg>
+        <pc:picChg chg="add del mod">
+          <ac:chgData name="Shuo Chen (MSR)" userId="2e7ebbab-928d-4621-b055-ba5ecd87af3f" providerId="ADAL" clId="{406DA4F5-19E9-4571-B523-F5B122CA674E}" dt="2023-05-02T03:29:10.519" v="201"/>
+          <ac:picMkLst>
+            <pc:docMk/>
+            <pc:sldMk cId="769397940" sldId="257"/>
+            <ac:picMk id="32" creationId="{A57CA9D8-C390-75FC-3448-34A6A55645FD}"/>
+          </ac:picMkLst>
+        </pc:picChg>
+        <pc:picChg chg="add del mod ord">
+          <ac:chgData name="Shuo Chen (MSR)" userId="2e7ebbab-928d-4621-b055-ba5ecd87af3f" providerId="ADAL" clId="{406DA4F5-19E9-4571-B523-F5B122CA674E}" dt="2023-05-02T03:30:09.463" v="202"/>
+          <ac:picMkLst>
+            <pc:docMk/>
+            <pc:sldMk cId="769397940" sldId="257"/>
+            <ac:picMk id="35" creationId="{2C1E1E5B-F92B-8647-D5BD-4D4133807DF1}"/>
+          </ac:picMkLst>
+        </pc:picChg>
+        <pc:picChg chg="add mod">
+          <ac:chgData name="Shuo Chen (MSR)" userId="2e7ebbab-928d-4621-b055-ba5ecd87af3f" providerId="ADAL" clId="{406DA4F5-19E9-4571-B523-F5B122CA674E}" dt="2023-05-02T03:30:09.463" v="202"/>
+          <ac:picMkLst>
+            <pc:docMk/>
+            <pc:sldMk cId="769397940" sldId="257"/>
+            <ac:picMk id="36" creationId="{D9026E56-EC87-5462-BB42-20102500F5FC}"/>
+          </ac:picMkLst>
+        </pc:picChg>
+      </pc:sldChg>
+      <pc:sldChg chg="addSp modSp mod modTransition modAnim modNotesTx">
+        <pc:chgData name="Shuo Chen (MSR)" userId="2e7ebbab-928d-4621-b055-ba5ecd87af3f" providerId="ADAL" clId="{406DA4F5-19E9-4571-B523-F5B122CA674E}" dt="2023-05-02T05:10:32.368" v="1369"/>
+        <pc:sldMkLst>
+          <pc:docMk/>
+          <pc:sldMk cId="3923138916" sldId="258"/>
+        </pc:sldMkLst>
+        <pc:spChg chg="mod">
+          <ac:chgData name="Shuo Chen (MSR)" userId="2e7ebbab-928d-4621-b055-ba5ecd87af3f" providerId="ADAL" clId="{406DA4F5-19E9-4571-B523-F5B122CA674E}" dt="2023-05-02T03:34:01.853" v="247" actId="20577"/>
+          <ac:spMkLst>
+            <pc:docMk/>
+            <pc:sldMk cId="3923138916" sldId="258"/>
+            <ac:spMk id="3" creationId="{B832D10F-404D-E9DA-8981-5A18FA6F4472}"/>
+          </ac:spMkLst>
+        </pc:spChg>
+        <pc:picChg chg="add mod">
+          <ac:chgData name="Shuo Chen (MSR)" userId="2e7ebbab-928d-4621-b055-ba5ecd87af3f" providerId="ADAL" clId="{406DA4F5-19E9-4571-B523-F5B122CA674E}" dt="2023-05-02T03:35:38.684" v="248"/>
+          <ac:picMkLst>
+            <pc:docMk/>
+            <pc:sldMk cId="3923138916" sldId="258"/>
+            <ac:picMk id="6" creationId="{51AF6A8F-AC55-044F-8C4B-591BEF7416A7}"/>
+          </ac:picMkLst>
+        </pc:picChg>
+      </pc:sldChg>
+      <pc:sldChg chg="addSp delSp modSp mod modTransition modAnim modNotesTx">
+        <pc:chgData name="Shuo Chen (MSR)" userId="2e7ebbab-928d-4621-b055-ba5ecd87af3f" providerId="ADAL" clId="{406DA4F5-19E9-4571-B523-F5B122CA674E}" dt="2023-05-02T05:13:26.222" v="1387" actId="20577"/>
+        <pc:sldMkLst>
+          <pc:docMk/>
+          <pc:sldMk cId="2134660308" sldId="259"/>
+        </pc:sldMkLst>
+        <pc:spChg chg="mod">
+          <ac:chgData name="Shuo Chen (MSR)" userId="2e7ebbab-928d-4621-b055-ba5ecd87af3f" providerId="ADAL" clId="{406DA4F5-19E9-4571-B523-F5B122CA674E}" dt="2023-05-02T05:13:26.222" v="1387" actId="20577"/>
+          <ac:spMkLst>
+            <pc:docMk/>
+            <pc:sldMk cId="2134660308" sldId="259"/>
+            <ac:spMk id="3" creationId="{FD5AF04A-4085-A438-46E2-BA90B750345B}"/>
+          </ac:spMkLst>
+        </pc:spChg>
+        <pc:spChg chg="mod">
+          <ac:chgData name="Shuo Chen (MSR)" userId="2e7ebbab-928d-4621-b055-ba5ecd87af3f" providerId="ADAL" clId="{406DA4F5-19E9-4571-B523-F5B122CA674E}" dt="2023-05-02T03:40:16.507" v="257" actId="1076"/>
+          <ac:spMkLst>
+            <pc:docMk/>
+            <pc:sldMk cId="2134660308" sldId="259"/>
+            <ac:spMk id="5" creationId="{2D166818-6056-E400-12A2-35E16488BFE0}"/>
+          </ac:spMkLst>
+        </pc:spChg>
+        <pc:spChg chg="mod">
+          <ac:chgData name="Shuo Chen (MSR)" userId="2e7ebbab-928d-4621-b055-ba5ecd87af3f" providerId="ADAL" clId="{406DA4F5-19E9-4571-B523-F5B122CA674E}" dt="2023-05-02T03:40:16.507" v="257" actId="1076"/>
+          <ac:spMkLst>
+            <pc:docMk/>
+            <pc:sldMk cId="2134660308" sldId="259"/>
+            <ac:spMk id="6" creationId="{9D61511D-2F33-9794-405C-11777FBCBD27}"/>
+          </ac:spMkLst>
+        </pc:spChg>
+        <pc:spChg chg="mod">
+          <ac:chgData name="Shuo Chen (MSR)" userId="2e7ebbab-928d-4621-b055-ba5ecd87af3f" providerId="ADAL" clId="{406DA4F5-19E9-4571-B523-F5B122CA674E}" dt="2023-05-02T03:40:16.507" v="257" actId="1076"/>
+          <ac:spMkLst>
+            <pc:docMk/>
+            <pc:sldMk cId="2134660308" sldId="259"/>
+            <ac:spMk id="11" creationId="{C7FE1669-C345-A5D5-57EB-C4588C6B528F}"/>
+          </ac:spMkLst>
+        </pc:spChg>
+        <pc:picChg chg="mod">
+          <ac:chgData name="Shuo Chen (MSR)" userId="2e7ebbab-928d-4621-b055-ba5ecd87af3f" providerId="ADAL" clId="{406DA4F5-19E9-4571-B523-F5B122CA674E}" dt="2023-05-02T03:39:58.475" v="254" actId="1076"/>
+          <ac:picMkLst>
+            <pc:docMk/>
+            <pc:sldMk cId="2134660308" sldId="259"/>
+            <ac:picMk id="4" creationId="{85EFA03A-5071-00C9-5A75-D8EB9FB62BAF}"/>
+          </ac:picMkLst>
+        </pc:picChg>
+        <pc:picChg chg="add del mod">
+          <ac:chgData name="Shuo Chen (MSR)" userId="2e7ebbab-928d-4621-b055-ba5ecd87af3f" providerId="ADAL" clId="{406DA4F5-19E9-4571-B523-F5B122CA674E}" dt="2023-05-02T03:45:22.642" v="306"/>
+          <ac:picMkLst>
+            <pc:docMk/>
+            <pc:sldMk cId="2134660308" sldId="259"/>
+            <ac:picMk id="15" creationId="{860A5C13-DB91-8BEB-8C61-0D21D4A2F548}"/>
+          </ac:picMkLst>
+        </pc:picChg>
+        <pc:picChg chg="add del mod ord">
+          <ac:chgData name="Shuo Chen (MSR)" userId="2e7ebbab-928d-4621-b055-ba5ecd87af3f" providerId="ADAL" clId="{406DA4F5-19E9-4571-B523-F5B122CA674E}" dt="2023-05-02T03:46:07.377" v="307"/>
+          <ac:picMkLst>
+            <pc:docMk/>
+            <pc:sldMk cId="2134660308" sldId="259"/>
+            <ac:picMk id="18" creationId="{783239A2-9CE4-34F1-3E3E-5C7D8A9B5B59}"/>
+          </ac:picMkLst>
+        </pc:picChg>
+        <pc:picChg chg="add del mod">
+          <ac:chgData name="Shuo Chen (MSR)" userId="2e7ebbab-928d-4621-b055-ba5ecd87af3f" providerId="ADAL" clId="{406DA4F5-19E9-4571-B523-F5B122CA674E}" dt="2023-05-02T03:46:16.277" v="309"/>
+          <ac:picMkLst>
+            <pc:docMk/>
+            <pc:sldMk cId="2134660308" sldId="259"/>
+            <ac:picMk id="19" creationId="{6C40F060-36C8-8D7F-F16D-C5107A59A31B}"/>
+          </ac:picMkLst>
+        </pc:picChg>
+        <pc:picChg chg="add del mod ord">
+          <ac:chgData name="Shuo Chen (MSR)" userId="2e7ebbab-928d-4621-b055-ba5ecd87af3f" providerId="ADAL" clId="{406DA4F5-19E9-4571-B523-F5B122CA674E}" dt="2023-05-02T03:47:24.171" v="310"/>
+          <ac:picMkLst>
+            <pc:docMk/>
+            <pc:sldMk cId="2134660308" sldId="259"/>
+            <ac:picMk id="22" creationId="{F39B0AE2-5544-7EEA-D77A-272C9AC324B1}"/>
+          </ac:picMkLst>
+        </pc:picChg>
+        <pc:picChg chg="add del mod">
+          <ac:chgData name="Shuo Chen (MSR)" userId="2e7ebbab-928d-4621-b055-ba5ecd87af3f" providerId="ADAL" clId="{406DA4F5-19E9-4571-B523-F5B122CA674E}" dt="2023-05-02T03:48:36.057" v="318"/>
+          <ac:picMkLst>
+            <pc:docMk/>
+            <pc:sldMk cId="2134660308" sldId="259"/>
+            <ac:picMk id="23" creationId="{FA387B5E-BCCA-3A56-DF07-5C52F752A13F}"/>
+          </ac:picMkLst>
+        </pc:picChg>
+        <pc:picChg chg="add del mod ord">
+          <ac:chgData name="Shuo Chen (MSR)" userId="2e7ebbab-928d-4621-b055-ba5ecd87af3f" providerId="ADAL" clId="{406DA4F5-19E9-4571-B523-F5B122CA674E}" dt="2023-05-02T03:48:46.619" v="319"/>
+          <ac:picMkLst>
+            <pc:docMk/>
+            <pc:sldMk cId="2134660308" sldId="259"/>
+            <ac:picMk id="27" creationId="{394E3FD1-604B-C178-48EE-65755F0C5A55}"/>
+          </ac:picMkLst>
+        </pc:picChg>
+        <pc:picChg chg="add del mod">
+          <ac:chgData name="Shuo Chen (MSR)" userId="2e7ebbab-928d-4621-b055-ba5ecd87af3f" providerId="ADAL" clId="{406DA4F5-19E9-4571-B523-F5B122CA674E}" dt="2023-05-02T03:48:48.190" v="321"/>
+          <ac:picMkLst>
+            <pc:docMk/>
+            <pc:sldMk cId="2134660308" sldId="259"/>
+            <ac:picMk id="28" creationId="{50DA80BA-7D72-832F-2445-5731DA1C3CA3}"/>
+          </ac:picMkLst>
+        </pc:picChg>
+        <pc:picChg chg="add del mod ord">
+          <ac:chgData name="Shuo Chen (MSR)" userId="2e7ebbab-928d-4621-b055-ba5ecd87af3f" providerId="ADAL" clId="{406DA4F5-19E9-4571-B523-F5B122CA674E}" dt="2023-05-02T03:50:17.872" v="322"/>
+          <ac:picMkLst>
+            <pc:docMk/>
+            <pc:sldMk cId="2134660308" sldId="259"/>
+            <ac:picMk id="31" creationId="{495BB437-2D9D-51FE-A683-D2A2F9AF75EE}"/>
+          </ac:picMkLst>
+        </pc:picChg>
+        <pc:picChg chg="add mod">
+          <ac:chgData name="Shuo Chen (MSR)" userId="2e7ebbab-928d-4621-b055-ba5ecd87af3f" providerId="ADAL" clId="{406DA4F5-19E9-4571-B523-F5B122CA674E}" dt="2023-05-02T03:50:17.872" v="322"/>
+          <ac:picMkLst>
+            <pc:docMk/>
+            <pc:sldMk cId="2134660308" sldId="259"/>
+            <ac:picMk id="32" creationId="{8A5A12E9-326B-3EF4-70A7-CBE5B96B12FB}"/>
+          </ac:picMkLst>
+        </pc:picChg>
+        <pc:cxnChg chg="mod">
+          <ac:chgData name="Shuo Chen (MSR)" userId="2e7ebbab-928d-4621-b055-ba5ecd87af3f" providerId="ADAL" clId="{406DA4F5-19E9-4571-B523-F5B122CA674E}" dt="2023-05-02T03:40:16.507" v="257" actId="1076"/>
+          <ac:cxnSpMkLst>
+            <pc:docMk/>
+            <pc:sldMk cId="2134660308" sldId="259"/>
+            <ac:cxnSpMk id="7" creationId="{FE23244A-4F89-60E9-FF59-E23BA53EFE83}"/>
+          </ac:cxnSpMkLst>
+        </pc:cxnChg>
+        <pc:cxnChg chg="mod">
+          <ac:chgData name="Shuo Chen (MSR)" userId="2e7ebbab-928d-4621-b055-ba5ecd87af3f" providerId="ADAL" clId="{406DA4F5-19E9-4571-B523-F5B122CA674E}" dt="2023-05-02T03:40:16.507" v="257" actId="1076"/>
+          <ac:cxnSpMkLst>
+            <pc:docMk/>
+            <pc:sldMk cId="2134660308" sldId="259"/>
+            <ac:cxnSpMk id="8" creationId="{2ACE8E55-C75E-03F5-3743-78C16076D589}"/>
+          </ac:cxnSpMkLst>
+        </pc:cxnChg>
+        <pc:cxnChg chg="mod">
+          <ac:chgData name="Shuo Chen (MSR)" userId="2e7ebbab-928d-4621-b055-ba5ecd87af3f" providerId="ADAL" clId="{406DA4F5-19E9-4571-B523-F5B122CA674E}" dt="2023-05-02T03:40:16.507" v="257" actId="1076"/>
+          <ac:cxnSpMkLst>
+            <pc:docMk/>
+            <pc:sldMk cId="2134660308" sldId="259"/>
+            <ac:cxnSpMk id="9" creationId="{D23D79F7-6D85-CC79-B441-0B56F57BC74C}"/>
+          </ac:cxnSpMkLst>
+        </pc:cxnChg>
+        <pc:cxnChg chg="mod">
+          <ac:chgData name="Shuo Chen (MSR)" userId="2e7ebbab-928d-4621-b055-ba5ecd87af3f" providerId="ADAL" clId="{406DA4F5-19E9-4571-B523-F5B122CA674E}" dt="2023-05-02T03:40:16.507" v="257" actId="1076"/>
+          <ac:cxnSpMkLst>
+            <pc:docMk/>
+            <pc:sldMk cId="2134660308" sldId="259"/>
+            <ac:cxnSpMk id="10" creationId="{D5E99447-EAB4-A092-FB39-16B567C48E8E}"/>
+          </ac:cxnSpMkLst>
+        </pc:cxnChg>
+      </pc:sldChg>
+      <pc:sldChg chg="addSp modSp mod modTransition modAnim">
+        <pc:chgData name="Shuo Chen (MSR)" userId="2e7ebbab-928d-4621-b055-ba5ecd87af3f" providerId="ADAL" clId="{406DA4F5-19E9-4571-B523-F5B122CA674E}" dt="2023-05-02T05:13:01.476" v="1370"/>
+        <pc:sldMkLst>
+          <pc:docMk/>
+          <pc:sldMk cId="330743462" sldId="260"/>
+        </pc:sldMkLst>
+        <pc:spChg chg="mod">
+          <ac:chgData name="Shuo Chen (MSR)" userId="2e7ebbab-928d-4621-b055-ba5ecd87af3f" providerId="ADAL" clId="{406DA4F5-19E9-4571-B523-F5B122CA674E}" dt="2023-05-02T03:51:42.527" v="337" actId="20577"/>
+          <ac:spMkLst>
+            <pc:docMk/>
+            <pc:sldMk cId="330743462" sldId="260"/>
+            <ac:spMk id="3" creationId="{19C7CB0F-8772-3D99-2205-C7984D06B126}"/>
+          </ac:spMkLst>
+        </pc:spChg>
+        <pc:spChg chg="mod">
+          <ac:chgData name="Shuo Chen (MSR)" userId="2e7ebbab-928d-4621-b055-ba5ecd87af3f" providerId="ADAL" clId="{406DA4F5-19E9-4571-B523-F5B122CA674E}" dt="2023-05-02T03:50:57.118" v="331" actId="20577"/>
+          <ac:spMkLst>
+            <pc:docMk/>
+            <pc:sldMk cId="330743462" sldId="260"/>
+            <ac:spMk id="4" creationId="{CEC5304A-2F5F-BF25-F276-8B67C930F2F5}"/>
+          </ac:spMkLst>
+        </pc:spChg>
+        <pc:spChg chg="mod">
+          <ac:chgData name="Shuo Chen (MSR)" userId="2e7ebbab-928d-4621-b055-ba5ecd87af3f" providerId="ADAL" clId="{406DA4F5-19E9-4571-B523-F5B122CA674E}" dt="2023-05-02T03:52:19.149" v="339" actId="14100"/>
+          <ac:spMkLst>
+            <pc:docMk/>
+            <pc:sldMk cId="330743462" sldId="260"/>
+            <ac:spMk id="5" creationId="{CD01A572-1A49-BE4A-60BA-3B4C4F9F2EFA}"/>
+          </ac:spMkLst>
+        </pc:spChg>
+        <pc:spChg chg="mod">
+          <ac:chgData name="Shuo Chen (MSR)" userId="2e7ebbab-928d-4621-b055-ba5ecd87af3f" providerId="ADAL" clId="{406DA4F5-19E9-4571-B523-F5B122CA674E}" dt="2023-05-02T03:52:22.879" v="340" actId="1076"/>
+          <ac:spMkLst>
+            <pc:docMk/>
+            <pc:sldMk cId="330743462" sldId="260"/>
+            <ac:spMk id="8" creationId="{4A8C95F2-0922-B5EC-7EA9-32B045D29727}"/>
+          </ac:spMkLst>
+        </pc:spChg>
+        <pc:picChg chg="add mod">
+          <ac:chgData name="Shuo Chen (MSR)" userId="2e7ebbab-928d-4621-b055-ba5ecd87af3f" providerId="ADAL" clId="{406DA4F5-19E9-4571-B523-F5B122CA674E}" dt="2023-05-02T03:53:51.789" v="341"/>
+          <ac:picMkLst>
+            <pc:docMk/>
+            <pc:sldMk cId="330743462" sldId="260"/>
+            <ac:picMk id="6" creationId="{3CE23FF5-3F32-C86A-09BD-A5D119E5565C}"/>
+          </ac:picMkLst>
+        </pc:picChg>
+      </pc:sldChg>
+      <pc:sldChg chg="addSp delSp modSp mod modTransition modAnim modNotesTx">
+        <pc:chgData name="Shuo Chen (MSR)" userId="2e7ebbab-928d-4621-b055-ba5ecd87af3f" providerId="ADAL" clId="{406DA4F5-19E9-4571-B523-F5B122CA674E}" dt="2023-05-02T04:03:34.186" v="356"/>
+        <pc:sldMkLst>
+          <pc:docMk/>
+          <pc:sldMk cId="2857909126" sldId="261"/>
+        </pc:sldMkLst>
+        <pc:spChg chg="mod">
+          <ac:chgData name="Shuo Chen (MSR)" userId="2e7ebbab-928d-4621-b055-ba5ecd87af3f" providerId="ADAL" clId="{406DA4F5-19E9-4571-B523-F5B122CA674E}" dt="2023-05-02T03:57:07.008" v="346" actId="20577"/>
+          <ac:spMkLst>
+            <pc:docMk/>
+            <pc:sldMk cId="2857909126" sldId="261"/>
+            <ac:spMk id="3" creationId="{AE4522A9-1EA2-E38E-B18E-AAE0F478F6AD}"/>
+          </ac:spMkLst>
+        </pc:spChg>
+        <pc:spChg chg="mod">
+          <ac:chgData name="Shuo Chen (MSR)" userId="2e7ebbab-928d-4621-b055-ba5ecd87af3f" providerId="ADAL" clId="{406DA4F5-19E9-4571-B523-F5B122CA674E}" dt="2023-05-02T03:56:03.915" v="342" actId="1076"/>
+          <ac:spMkLst>
+            <pc:docMk/>
+            <pc:sldMk cId="2857909126" sldId="261"/>
+            <ac:spMk id="42" creationId="{94FBEADE-78D3-B466-E24A-366F6C0BD87D}"/>
+          </ac:spMkLst>
+        </pc:spChg>
+        <pc:picChg chg="add del mod">
+          <ac:chgData name="Shuo Chen (MSR)" userId="2e7ebbab-928d-4621-b055-ba5ecd87af3f" providerId="ADAL" clId="{406DA4F5-19E9-4571-B523-F5B122CA674E}" dt="2023-05-02T04:02:03.176" v="355"/>
+          <ac:picMkLst>
+            <pc:docMk/>
+            <pc:sldMk cId="2857909126" sldId="261"/>
+            <ac:picMk id="44" creationId="{BA299895-B597-CB1D-641F-D5467C5661C2}"/>
+          </ac:picMkLst>
+        </pc:picChg>
+        <pc:picChg chg="add del mod ord">
+          <ac:chgData name="Shuo Chen (MSR)" userId="2e7ebbab-928d-4621-b055-ba5ecd87af3f" providerId="ADAL" clId="{406DA4F5-19E9-4571-B523-F5B122CA674E}" dt="2023-05-02T04:03:34.186" v="356"/>
+          <ac:picMkLst>
+            <pc:docMk/>
+            <pc:sldMk cId="2857909126" sldId="261"/>
+            <ac:picMk id="47" creationId="{004B18D9-E49C-381F-31EE-4188306D6E18}"/>
+          </ac:picMkLst>
+        </pc:picChg>
+        <pc:picChg chg="add mod">
+          <ac:chgData name="Shuo Chen (MSR)" userId="2e7ebbab-928d-4621-b055-ba5ecd87af3f" providerId="ADAL" clId="{406DA4F5-19E9-4571-B523-F5B122CA674E}" dt="2023-05-02T04:03:34.186" v="356"/>
+          <ac:picMkLst>
+            <pc:docMk/>
+            <pc:sldMk cId="2857909126" sldId="261"/>
+            <ac:picMk id="48" creationId="{AFA2B895-5506-2D94-6B41-CBD310FD372E}"/>
+          </ac:picMkLst>
+        </pc:picChg>
+      </pc:sldChg>
+      <pc:sldChg chg="add del modTransition">
+        <pc:chgData name="Shuo Chen (MSR)" userId="2e7ebbab-928d-4621-b055-ba5ecd87af3f" providerId="ADAL" clId="{406DA4F5-19E9-4571-B523-F5B122CA674E}" dt="2023-05-02T04:34:32.033" v="1320"/>
+        <pc:sldMkLst>
+          <pc:docMk/>
+          <pc:sldMk cId="3732450724" sldId="262"/>
+        </pc:sldMkLst>
+      </pc:sldChg>
+      <pc:sldChg chg="addSp modSp ord modTransition modAnim">
+        <pc:chgData name="Shuo Chen (MSR)" userId="2e7ebbab-928d-4621-b055-ba5ecd87af3f" providerId="ADAL" clId="{406DA4F5-19E9-4571-B523-F5B122CA674E}" dt="2023-05-02T15:27:01.911" v="1388"/>
+        <pc:sldMkLst>
+          <pc:docMk/>
+          <pc:sldMk cId="309724048" sldId="263"/>
+        </pc:sldMkLst>
+        <pc:spChg chg="mod">
+          <ac:chgData name="Shuo Chen (MSR)" userId="2e7ebbab-928d-4621-b055-ba5ecd87af3f" providerId="ADAL" clId="{406DA4F5-19E9-4571-B523-F5B122CA674E}" dt="2023-05-02T04:04:48.778" v="358" actId="20577"/>
+          <ac:spMkLst>
+            <pc:docMk/>
+            <pc:sldMk cId="309724048" sldId="263"/>
+            <ac:spMk id="2" creationId="{BDCEF694-3D4D-86E8-7876-C7A5E692451F}"/>
+          </ac:spMkLst>
+        </pc:spChg>
+        <pc:picChg chg="add mod">
+          <ac:chgData name="Shuo Chen (MSR)" userId="2e7ebbab-928d-4621-b055-ba5ecd87af3f" providerId="ADAL" clId="{406DA4F5-19E9-4571-B523-F5B122CA674E}" dt="2023-05-02T03:38:40.906" v="251"/>
+          <ac:picMkLst>
+            <pc:docMk/>
+            <pc:sldMk cId="309724048" sldId="263"/>
+            <ac:picMk id="5" creationId="{F6B1D6D8-C3D9-3068-A3CC-16ADE426735C}"/>
+          </ac:picMkLst>
+        </pc:picChg>
+      </pc:sldChg>
+      <pc:sldChg chg="addSp modSp del mod modNotesTx">
+        <pc:chgData name="Shuo Chen (MSR)" userId="2e7ebbab-928d-4621-b055-ba5ecd87af3f" providerId="ADAL" clId="{406DA4F5-19E9-4571-B523-F5B122CA674E}" dt="2023-05-02T15:35:42.576" v="1407" actId="47"/>
+        <pc:sldMkLst>
+          <pc:docMk/>
+          <pc:sldMk cId="2643142849" sldId="264"/>
+        </pc:sldMkLst>
+        <pc:spChg chg="mod">
+          <ac:chgData name="Shuo Chen (MSR)" userId="2e7ebbab-928d-4621-b055-ba5ecd87af3f" providerId="ADAL" clId="{406DA4F5-19E9-4571-B523-F5B122CA674E}" dt="2023-05-02T15:33:09.409" v="1398" actId="1076"/>
+          <ac:spMkLst>
+            <pc:docMk/>
+            <pc:sldMk cId="2643142849" sldId="264"/>
+            <ac:spMk id="3" creationId="{D6F01BF1-DB64-FF52-FA05-58572F6946FC}"/>
+          </ac:spMkLst>
+        </pc:spChg>
+        <pc:spChg chg="add mod">
+          <ac:chgData name="Shuo Chen (MSR)" userId="2e7ebbab-928d-4621-b055-ba5ecd87af3f" providerId="ADAL" clId="{406DA4F5-19E9-4571-B523-F5B122CA674E}" dt="2023-05-02T15:33:33.433" v="1403" actId="1076"/>
+          <ac:spMkLst>
+            <pc:docMk/>
+            <pc:sldMk cId="2643142849" sldId="264"/>
+            <ac:spMk id="7" creationId="{11CD7742-8D0E-F117-256B-F0E12B2C3904}"/>
+          </ac:spMkLst>
+        </pc:spChg>
+      </pc:sldChg>
+      <pc:sldChg chg="addSp delSp modSp mod modTransition delAnim modAnim modNotesTx">
+        <pc:chgData name="Shuo Chen (MSR)" userId="2e7ebbab-928d-4621-b055-ba5ecd87af3f" providerId="ADAL" clId="{406DA4F5-19E9-4571-B523-F5B122CA674E}" dt="2023-05-02T16:01:35.073" v="1526"/>
+        <pc:sldMkLst>
+          <pc:docMk/>
+          <pc:sldMk cId="3917931094" sldId="265"/>
+        </pc:sldMkLst>
+        <pc:picChg chg="add del mod">
+          <ac:chgData name="Shuo Chen (MSR)" userId="2e7ebbab-928d-4621-b055-ba5ecd87af3f" providerId="ADAL" clId="{406DA4F5-19E9-4571-B523-F5B122CA674E}" dt="2023-05-02T04:43:32.752" v="1322" actId="478"/>
+          <ac:picMkLst>
+            <pc:docMk/>
+            <pc:sldMk cId="3917931094" sldId="265"/>
+            <ac:picMk id="3" creationId="{7831E6AD-4403-D6AC-42C2-92C425D22E81}"/>
+          </ac:picMkLst>
+        </pc:picChg>
+        <pc:picChg chg="add del mod">
+          <ac:chgData name="Shuo Chen (MSR)" userId="2e7ebbab-928d-4621-b055-ba5ecd87af3f" providerId="ADAL" clId="{406DA4F5-19E9-4571-B523-F5B122CA674E}" dt="2023-05-02T16:00:39.556" v="1525"/>
+          <ac:picMkLst>
+            <pc:docMk/>
+            <pc:sldMk cId="3917931094" sldId="265"/>
+            <ac:picMk id="29" creationId="{D1BD6ABB-392F-14E7-AEC2-683BD85F599E}"/>
+          </ac:picMkLst>
+        </pc:picChg>
+        <pc:picChg chg="add del mod ord">
+          <ac:chgData name="Shuo Chen (MSR)" userId="2e7ebbab-928d-4621-b055-ba5ecd87af3f" providerId="ADAL" clId="{406DA4F5-19E9-4571-B523-F5B122CA674E}" dt="2023-05-02T16:01:35.073" v="1526"/>
+          <ac:picMkLst>
+            <pc:docMk/>
+            <pc:sldMk cId="3917931094" sldId="265"/>
+            <ac:picMk id="32" creationId="{DEEAD0C3-E15B-84AB-683F-F1D076015377}"/>
+          </ac:picMkLst>
+        </pc:picChg>
+        <pc:picChg chg="add mod">
+          <ac:chgData name="Shuo Chen (MSR)" userId="2e7ebbab-928d-4621-b055-ba5ecd87af3f" providerId="ADAL" clId="{406DA4F5-19E9-4571-B523-F5B122CA674E}" dt="2023-05-02T16:01:35.073" v="1526"/>
+          <ac:picMkLst>
+            <pc:docMk/>
+            <pc:sldMk cId="3917931094" sldId="265"/>
+            <ac:picMk id="33" creationId="{E220BB00-D01C-ABD8-7369-BEC9E9D736B7}"/>
+          </ac:picMkLst>
+        </pc:picChg>
+      </pc:sldChg>
+      <pc:sldChg chg="addSp modSp mod modTransition modAnim modNotesTx">
+        <pc:chgData name="Shuo Chen (MSR)" userId="2e7ebbab-928d-4621-b055-ba5ecd87af3f" providerId="ADAL" clId="{406DA4F5-19E9-4571-B523-F5B122CA674E}" dt="2023-05-02T16:37:36.890" v="1685" actId="21"/>
+        <pc:sldMkLst>
+          <pc:docMk/>
+          <pc:sldMk cId="3928553163" sldId="266"/>
+        </pc:sldMkLst>
+        <pc:spChg chg="mod">
+          <ac:chgData name="Shuo Chen (MSR)" userId="2e7ebbab-928d-4621-b055-ba5ecd87af3f" providerId="ADAL" clId="{406DA4F5-19E9-4571-B523-F5B122CA674E}" dt="2023-05-02T16:37:36.890" v="1685" actId="21"/>
+          <ac:spMkLst>
+            <pc:docMk/>
+            <pc:sldMk cId="3928553163" sldId="266"/>
+            <ac:spMk id="3" creationId="{D4A68C14-C764-09AB-2564-DC14E83133A0}"/>
+          </ac:spMkLst>
+        </pc:spChg>
+        <pc:picChg chg="add mod">
+          <ac:chgData name="Shuo Chen (MSR)" userId="2e7ebbab-928d-4621-b055-ba5ecd87af3f" providerId="ADAL" clId="{406DA4F5-19E9-4571-B523-F5B122CA674E}" dt="2023-05-02T04:50:00.378" v="1330"/>
+          <ac:picMkLst>
+            <pc:docMk/>
+            <pc:sldMk cId="3928553163" sldId="266"/>
+            <ac:picMk id="5" creationId="{B897D662-A55E-C218-9592-E3E75AD72866}"/>
+          </ac:picMkLst>
+        </pc:picChg>
+      </pc:sldChg>
+      <pc:sldChg chg="addSp delSp modSp mod modTransition modAnim modNotesTx">
+        <pc:chgData name="Shuo Chen (MSR)" userId="2e7ebbab-928d-4621-b055-ba5ecd87af3f" providerId="ADAL" clId="{406DA4F5-19E9-4571-B523-F5B122CA674E}" dt="2023-05-02T16:07:07.491" v="1547"/>
+        <pc:sldMkLst>
+          <pc:docMk/>
+          <pc:sldMk cId="2316422460" sldId="267"/>
+        </pc:sldMkLst>
+        <pc:spChg chg="mod">
+          <ac:chgData name="Shuo Chen (MSR)" userId="2e7ebbab-928d-4621-b055-ba5ecd87af3f" providerId="ADAL" clId="{406DA4F5-19E9-4571-B523-F5B122CA674E}" dt="2023-05-02T16:05:04.360" v="1542" actId="1076"/>
+          <ac:spMkLst>
+            <pc:docMk/>
+            <pc:sldMk cId="2316422460" sldId="267"/>
+            <ac:spMk id="11" creationId="{DF047735-531D-D8B9-306F-4D001519F6F7}"/>
+          </ac:spMkLst>
+        </pc:spChg>
+        <pc:spChg chg="mod">
+          <ac:chgData name="Shuo Chen (MSR)" userId="2e7ebbab-928d-4621-b055-ba5ecd87af3f" providerId="ADAL" clId="{406DA4F5-19E9-4571-B523-F5B122CA674E}" dt="2023-05-02T16:05:12.019" v="1543" actId="1076"/>
+          <ac:spMkLst>
+            <pc:docMk/>
+            <pc:sldMk cId="2316422460" sldId="267"/>
+            <ac:spMk id="17" creationId="{D65817DE-D685-89B0-9DC9-7F154E79D8A8}"/>
+          </ac:spMkLst>
+        </pc:spChg>
+        <pc:spChg chg="add del mod">
+          <ac:chgData name="Shuo Chen (MSR)" userId="2e7ebbab-928d-4621-b055-ba5ecd87af3f" providerId="ADAL" clId="{406DA4F5-19E9-4571-B523-F5B122CA674E}" dt="2023-05-02T16:04:58.746" v="1541" actId="478"/>
+          <ac:spMkLst>
+            <pc:docMk/>
+            <pc:sldMk cId="2316422460" sldId="267"/>
+            <ac:spMk id="27" creationId="{8A4978E5-89BD-AA2A-9EF8-460CD0F5407C}"/>
+          </ac:spMkLst>
+        </pc:spChg>
+        <pc:picChg chg="add del mod">
+          <ac:chgData name="Shuo Chen (MSR)" userId="2e7ebbab-928d-4621-b055-ba5ecd87af3f" providerId="ADAL" clId="{406DA4F5-19E9-4571-B523-F5B122CA674E}" dt="2023-05-02T16:05:57.423" v="1546"/>
+          <ac:picMkLst>
+            <pc:docMk/>
+            <pc:sldMk cId="2316422460" sldId="267"/>
+            <ac:picMk id="24" creationId="{070D2B14-B7B1-48FA-ED38-A9FF4337DF02}"/>
+          </ac:picMkLst>
+        </pc:picChg>
+        <pc:picChg chg="add del mod ord">
+          <ac:chgData name="Shuo Chen (MSR)" userId="2e7ebbab-928d-4621-b055-ba5ecd87af3f" providerId="ADAL" clId="{406DA4F5-19E9-4571-B523-F5B122CA674E}" dt="2023-05-02T16:07:07.491" v="1547"/>
+          <ac:picMkLst>
+            <pc:docMk/>
+            <pc:sldMk cId="2316422460" sldId="267"/>
+            <ac:picMk id="30" creationId="{0584EEEC-DEF5-8AE7-EAA6-8C006DB2E60E}"/>
+          </ac:picMkLst>
+        </pc:picChg>
+        <pc:picChg chg="add mod">
+          <ac:chgData name="Shuo Chen (MSR)" userId="2e7ebbab-928d-4621-b055-ba5ecd87af3f" providerId="ADAL" clId="{406DA4F5-19E9-4571-B523-F5B122CA674E}" dt="2023-05-02T16:07:07.491" v="1547"/>
+          <ac:picMkLst>
+            <pc:docMk/>
+            <pc:sldMk cId="2316422460" sldId="267"/>
+            <ac:picMk id="31" creationId="{F0416ED9-244E-4312-F428-0C0E423992D1}"/>
+          </ac:picMkLst>
+        </pc:picChg>
+      </pc:sldChg>
+      <pc:sldChg chg="modSp del mod">
+        <pc:chgData name="Shuo Chen (MSR)" userId="2e7ebbab-928d-4621-b055-ba5ecd87af3f" providerId="ADAL" clId="{406DA4F5-19E9-4571-B523-F5B122CA674E}" dt="2023-05-02T04:58:03.638" v="1345" actId="2696"/>
+        <pc:sldMkLst>
+          <pc:docMk/>
+          <pc:sldMk cId="3234405172" sldId="268"/>
+        </pc:sldMkLst>
+        <pc:spChg chg="mod">
+          <ac:chgData name="Shuo Chen (MSR)" userId="2e7ebbab-928d-4621-b055-ba5ecd87af3f" providerId="ADAL" clId="{406DA4F5-19E9-4571-B523-F5B122CA674E}" dt="2023-05-02T04:51:56.677" v="1332" actId="20577"/>
+          <ac:spMkLst>
+            <pc:docMk/>
+            <pc:sldMk cId="3234405172" sldId="268"/>
+            <ac:spMk id="24" creationId="{8E5678CA-FF5D-5D96-6754-78E15597BE04}"/>
+          </ac:spMkLst>
+        </pc:spChg>
+      </pc:sldChg>
+      <pc:sldChg chg="addSp delSp modSp mod modTransition delAnim modAnim">
+        <pc:chgData name="Shuo Chen (MSR)" userId="2e7ebbab-928d-4621-b055-ba5ecd87af3f" providerId="ADAL" clId="{406DA4F5-19E9-4571-B523-F5B122CA674E}" dt="2023-05-02T05:03:50.505" v="1366"/>
+        <pc:sldMkLst>
+          <pc:docMk/>
+          <pc:sldMk cId="1884591052" sldId="270"/>
+        </pc:sldMkLst>
+        <pc:picChg chg="add del mod">
+          <ac:chgData name="Shuo Chen (MSR)" userId="2e7ebbab-928d-4621-b055-ba5ecd87af3f" providerId="ADAL" clId="{406DA4F5-19E9-4571-B523-F5B122CA674E}" dt="2023-05-02T05:00:10.978" v="1358" actId="478"/>
+          <ac:picMkLst>
+            <pc:docMk/>
+            <pc:sldMk cId="1884591052" sldId="270"/>
+            <ac:picMk id="16" creationId="{14D39B66-DA2D-CA87-6B62-9C5FFB483FAB}"/>
+          </ac:picMkLst>
+        </pc:picChg>
+        <pc:picChg chg="add del mod">
+          <ac:chgData name="Shuo Chen (MSR)" userId="2e7ebbab-928d-4621-b055-ba5ecd87af3f" providerId="ADAL" clId="{406DA4F5-19E9-4571-B523-F5B122CA674E}" dt="2023-05-02T05:01:56.305" v="1362"/>
+          <ac:picMkLst>
+            <pc:docMk/>
+            <pc:sldMk cId="1884591052" sldId="270"/>
+            <ac:picMk id="21" creationId="{6B7C5472-2011-7D6D-BF33-AC00EE99CA35}"/>
+          </ac:picMkLst>
+        </pc:picChg>
+        <pc:picChg chg="add del mod ord">
+          <ac:chgData name="Shuo Chen (MSR)" userId="2e7ebbab-928d-4621-b055-ba5ecd87af3f" providerId="ADAL" clId="{406DA4F5-19E9-4571-B523-F5B122CA674E}" dt="2023-05-02T05:02:51.357" v="1363"/>
+          <ac:picMkLst>
+            <pc:docMk/>
+            <pc:sldMk cId="1884591052" sldId="270"/>
+            <ac:picMk id="25" creationId="{BC585BD7-FA46-847D-CCBC-BA77DA9E48FF}"/>
+          </ac:picMkLst>
+        </pc:picChg>
+        <pc:picChg chg="add del mod">
+          <ac:chgData name="Shuo Chen (MSR)" userId="2e7ebbab-928d-4621-b055-ba5ecd87af3f" providerId="ADAL" clId="{406DA4F5-19E9-4571-B523-F5B122CA674E}" dt="2023-05-02T05:02:56.311" v="1365"/>
+          <ac:picMkLst>
+            <pc:docMk/>
+            <pc:sldMk cId="1884591052" sldId="270"/>
+            <ac:picMk id="26" creationId="{BB713DF9-1A2E-26C6-7008-6230AE1D76B9}"/>
+          </ac:picMkLst>
+        </pc:picChg>
+        <pc:picChg chg="add del mod ord">
+          <ac:chgData name="Shuo Chen (MSR)" userId="2e7ebbab-928d-4621-b055-ba5ecd87af3f" providerId="ADAL" clId="{406DA4F5-19E9-4571-B523-F5B122CA674E}" dt="2023-05-02T05:03:50.505" v="1366"/>
+          <ac:picMkLst>
+            <pc:docMk/>
+            <pc:sldMk cId="1884591052" sldId="270"/>
+            <ac:picMk id="29" creationId="{F318E4E4-48A1-1D04-3239-306B2952113B}"/>
+          </ac:picMkLst>
+        </pc:picChg>
+        <pc:picChg chg="add mod">
+          <ac:chgData name="Shuo Chen (MSR)" userId="2e7ebbab-928d-4621-b055-ba5ecd87af3f" providerId="ADAL" clId="{406DA4F5-19E9-4571-B523-F5B122CA674E}" dt="2023-05-02T05:03:50.505" v="1366"/>
+          <ac:picMkLst>
+            <pc:docMk/>
+            <pc:sldMk cId="1884591052" sldId="270"/>
+            <ac:picMk id="30" creationId="{BAEFDA04-48FD-8FEA-7090-2D4A26646615}"/>
+          </ac:picMkLst>
+        </pc:picChg>
+      </pc:sldChg>
+      <pc:sldChg chg="addSp delSp modSp mod modTransition modAnim modNotesTx">
+        <pc:chgData name="Shuo Chen (MSR)" userId="2e7ebbab-928d-4621-b055-ba5ecd87af3f" providerId="ADAL" clId="{406DA4F5-19E9-4571-B523-F5B122CA674E}" dt="2023-05-02T15:55:26.998" v="1507"/>
+        <pc:sldMkLst>
+          <pc:docMk/>
+          <pc:sldMk cId="128444667" sldId="272"/>
+        </pc:sldMkLst>
+        <pc:picChg chg="add del mod">
+          <ac:chgData name="Shuo Chen (MSR)" userId="2e7ebbab-928d-4621-b055-ba5ecd87af3f" providerId="ADAL" clId="{406DA4F5-19E9-4571-B523-F5B122CA674E}" dt="2023-05-02T15:54:38.178" v="1503"/>
+          <ac:picMkLst>
+            <pc:docMk/>
+            <pc:sldMk cId="128444667" sldId="272"/>
+            <ac:picMk id="6" creationId="{B7E73127-741A-3B89-AA6F-41BD9AFF64FC}"/>
+          </ac:picMkLst>
+        </pc:picChg>
+        <pc:picChg chg="add del mod ord">
+          <ac:chgData name="Shuo Chen (MSR)" userId="2e7ebbab-928d-4621-b055-ba5ecd87af3f" providerId="ADAL" clId="{406DA4F5-19E9-4571-B523-F5B122CA674E}" dt="2023-05-02T15:54:54.520" v="1504"/>
+          <ac:picMkLst>
+            <pc:docMk/>
+            <pc:sldMk cId="128444667" sldId="272"/>
+            <ac:picMk id="9" creationId="{D8C61F0A-C30F-38CE-8AD1-DEE944D568E0}"/>
+          </ac:picMkLst>
+        </pc:picChg>
+        <pc:picChg chg="add del mod">
+          <ac:chgData name="Shuo Chen (MSR)" userId="2e7ebbab-928d-4621-b055-ba5ecd87af3f" providerId="ADAL" clId="{406DA4F5-19E9-4571-B523-F5B122CA674E}" dt="2023-05-02T15:54:56.343" v="1506"/>
+          <ac:picMkLst>
+            <pc:docMk/>
+            <pc:sldMk cId="128444667" sldId="272"/>
+            <ac:picMk id="10" creationId="{6E8FA43D-FABC-D524-C432-027878DA76B2}"/>
+          </ac:picMkLst>
+        </pc:picChg>
+        <pc:picChg chg="add del mod ord">
+          <ac:chgData name="Shuo Chen (MSR)" userId="2e7ebbab-928d-4621-b055-ba5ecd87af3f" providerId="ADAL" clId="{406DA4F5-19E9-4571-B523-F5B122CA674E}" dt="2023-05-02T15:55:26.998" v="1507"/>
+          <ac:picMkLst>
+            <pc:docMk/>
+            <pc:sldMk cId="128444667" sldId="272"/>
+            <ac:picMk id="13" creationId="{FDA51E7C-FADF-136B-884A-AFC578E18078}"/>
+          </ac:picMkLst>
+        </pc:picChg>
+        <pc:picChg chg="add mod">
+          <ac:chgData name="Shuo Chen (MSR)" userId="2e7ebbab-928d-4621-b055-ba5ecd87af3f" providerId="ADAL" clId="{406DA4F5-19E9-4571-B523-F5B122CA674E}" dt="2023-05-02T15:55:26.998" v="1507"/>
+          <ac:picMkLst>
+            <pc:docMk/>
+            <pc:sldMk cId="128444667" sldId="272"/>
+            <ac:picMk id="14" creationId="{C1FA2AF4-51E5-7425-A151-C9BDAB124229}"/>
+          </ac:picMkLst>
+        </pc:picChg>
+      </pc:sldChg>
+      <pc:sldChg chg="addSp modSp modTransition modAnim">
+        <pc:chgData name="Shuo Chen (MSR)" userId="2e7ebbab-928d-4621-b055-ba5ecd87af3f" providerId="ADAL" clId="{406DA4F5-19E9-4571-B523-F5B122CA674E}" dt="2023-05-02T15:50:02.360" v="1493"/>
+        <pc:sldMkLst>
+          <pc:docMk/>
+          <pc:sldMk cId="2103635629" sldId="274"/>
+        </pc:sldMkLst>
+        <pc:picChg chg="add mod">
+          <ac:chgData name="Shuo Chen (MSR)" userId="2e7ebbab-928d-4621-b055-ba5ecd87af3f" providerId="ADAL" clId="{406DA4F5-19E9-4571-B523-F5B122CA674E}" dt="2023-05-02T05:05:10.715" v="1367"/>
+          <ac:picMkLst>
+            <pc:docMk/>
+            <pc:sldMk cId="2103635629" sldId="274"/>
+            <ac:picMk id="9" creationId="{2FFD6CF6-5AD4-3A68-54CC-EFB936CD1B09}"/>
+          </ac:picMkLst>
+        </pc:picChg>
+      </pc:sldChg>
+      <pc:sldChg chg="modSp add mod modTransition">
+        <pc:chgData name="Shuo Chen (MSR)" userId="2e7ebbab-928d-4621-b055-ba5ecd87af3f" providerId="ADAL" clId="{406DA4F5-19E9-4571-B523-F5B122CA674E}" dt="2023-05-02T15:39:45.012" v="1443" actId="6549"/>
+        <pc:sldMkLst>
+          <pc:docMk/>
+          <pc:sldMk cId="4109316617" sldId="286"/>
+        </pc:sldMkLst>
+        <pc:spChg chg="mod">
+          <ac:chgData name="Shuo Chen (MSR)" userId="2e7ebbab-928d-4621-b055-ba5ecd87af3f" providerId="ADAL" clId="{406DA4F5-19E9-4571-B523-F5B122CA674E}" dt="2023-05-02T15:39:45.012" v="1443" actId="6549"/>
+          <ac:spMkLst>
+            <pc:docMk/>
+            <pc:sldMk cId="4109316617" sldId="286"/>
+            <ac:spMk id="2" creationId="{F02D85EE-D8D5-568B-6491-68C504D82FE3}"/>
+          </ac:spMkLst>
+        </pc:spChg>
+        <pc:spChg chg="mod">
+          <ac:chgData name="Shuo Chen (MSR)" userId="2e7ebbab-928d-4621-b055-ba5ecd87af3f" providerId="ADAL" clId="{406DA4F5-19E9-4571-B523-F5B122CA674E}" dt="2023-05-02T15:37:04.922" v="1411" actId="2711"/>
+          <ac:spMkLst>
+            <pc:docMk/>
+            <pc:sldMk cId="4109316617" sldId="286"/>
+            <ac:spMk id="3" creationId="{6D00613C-31F8-4DDB-BE33-F36DDB99BB7E}"/>
+          </ac:spMkLst>
+        </pc:spChg>
+        <pc:spChg chg="mod">
+          <ac:chgData name="Shuo Chen (MSR)" userId="2e7ebbab-928d-4621-b055-ba5ecd87af3f" providerId="ADAL" clId="{406DA4F5-19E9-4571-B523-F5B122CA674E}" dt="2023-05-02T15:39:10.342" v="1418" actId="14100"/>
+          <ac:spMkLst>
+            <pc:docMk/>
+            <pc:sldMk cId="4109316617" sldId="286"/>
+            <ac:spMk id="7" creationId="{F06E78A5-0464-DDEF-B24F-60D30BC29E31}"/>
+          </ac:spMkLst>
+        </pc:spChg>
+        <pc:spChg chg="mod">
+          <ac:chgData name="Shuo Chen (MSR)" userId="2e7ebbab-928d-4621-b055-ba5ecd87af3f" providerId="ADAL" clId="{406DA4F5-19E9-4571-B523-F5B122CA674E}" dt="2023-05-02T15:37:50.779" v="1416" actId="1076"/>
+          <ac:spMkLst>
+            <pc:docMk/>
+            <pc:sldMk cId="4109316617" sldId="286"/>
+            <ac:spMk id="12" creationId="{4174AF05-A298-B583-8CB2-130B2631F2B8}"/>
+          </ac:spMkLst>
+        </pc:spChg>
+        <pc:spChg chg="mod">
+          <ac:chgData name="Shuo Chen (MSR)" userId="2e7ebbab-928d-4621-b055-ba5ecd87af3f" providerId="ADAL" clId="{406DA4F5-19E9-4571-B523-F5B122CA674E}" dt="2023-05-02T15:37:54.398" v="1417" actId="2711"/>
+          <ac:spMkLst>
+            <pc:docMk/>
+            <pc:sldMk cId="4109316617" sldId="286"/>
+            <ac:spMk id="21" creationId="{119490B3-12CB-C998-71AE-F1314304D39D}"/>
+          </ac:spMkLst>
+        </pc:spChg>
+        <pc:spChg chg="mod">
+          <ac:chgData name="Shuo Chen (MSR)" userId="2e7ebbab-928d-4621-b055-ba5ecd87af3f" providerId="ADAL" clId="{406DA4F5-19E9-4571-B523-F5B122CA674E}" dt="2023-05-02T15:37:37.026" v="1414" actId="1076"/>
+          <ac:spMkLst>
+            <pc:docMk/>
+            <pc:sldMk cId="4109316617" sldId="286"/>
+            <ac:spMk id="25" creationId="{B47D2CF2-60AB-412D-B1F9-9304D0D7FC5E}"/>
+          </ac:spMkLst>
+        </pc:spChg>
+      </pc:sldChg>
+      <pc:sldChg chg="addSp delSp modSp add mod modTransition">
+        <pc:chgData name="Shuo Chen (MSR)" userId="2e7ebbab-928d-4621-b055-ba5ecd87af3f" providerId="ADAL" clId="{406DA4F5-19E9-4571-B523-F5B122CA674E}" dt="2023-05-02T15:47:05.274" v="1487" actId="1076"/>
+        <pc:sldMkLst>
+          <pc:docMk/>
+          <pc:sldMk cId="2103549427" sldId="287"/>
+        </pc:sldMkLst>
+        <pc:spChg chg="del">
+          <ac:chgData name="Shuo Chen (MSR)" userId="2e7ebbab-928d-4621-b055-ba5ecd87af3f" providerId="ADAL" clId="{406DA4F5-19E9-4571-B523-F5B122CA674E}" dt="2023-05-02T15:39:53.258" v="1444" actId="478"/>
+          <ac:spMkLst>
+            <pc:docMk/>
+            <pc:sldMk cId="2103549427" sldId="287"/>
+            <ac:spMk id="2" creationId="{F02D85EE-D8D5-568B-6491-68C504D82FE3}"/>
+          </ac:spMkLst>
+        </pc:spChg>
+        <pc:spChg chg="mod">
+          <ac:chgData name="Shuo Chen (MSR)" userId="2e7ebbab-928d-4621-b055-ba5ecd87af3f" providerId="ADAL" clId="{406DA4F5-19E9-4571-B523-F5B122CA674E}" dt="2023-05-02T15:44:34.691" v="1472" actId="20577"/>
+          <ac:spMkLst>
+            <pc:docMk/>
+            <pc:sldMk cId="2103549427" sldId="287"/>
+            <ac:spMk id="3" creationId="{6D00613C-31F8-4DDB-BE33-F36DDB99BB7E}"/>
+          </ac:spMkLst>
+        </pc:spChg>
+        <pc:spChg chg="mod">
+          <ac:chgData name="Shuo Chen (MSR)" userId="2e7ebbab-928d-4621-b055-ba5ecd87af3f" providerId="ADAL" clId="{406DA4F5-19E9-4571-B523-F5B122CA674E}" dt="2023-05-02T15:44:51.636" v="1473" actId="1076"/>
+          <ac:spMkLst>
+            <pc:docMk/>
+            <pc:sldMk cId="2103549427" sldId="287"/>
+            <ac:spMk id="6" creationId="{3FD8FB2A-F9C1-FF6D-A398-0F3920401DB0}"/>
+          </ac:spMkLst>
+        </pc:spChg>
+        <pc:spChg chg="mod">
+          <ac:chgData name="Shuo Chen (MSR)" userId="2e7ebbab-928d-4621-b055-ba5ecd87af3f" providerId="ADAL" clId="{406DA4F5-19E9-4571-B523-F5B122CA674E}" dt="2023-05-02T15:45:31.784" v="1478" actId="1076"/>
+          <ac:spMkLst>
+            <pc:docMk/>
+            <pc:sldMk cId="2103549427" sldId="287"/>
+            <ac:spMk id="7" creationId="{0AFFECC6-8E25-C481-A072-3EC6FAED06EE}"/>
+          </ac:spMkLst>
+        </pc:spChg>
+        <pc:spChg chg="add del mod">
+          <ac:chgData name="Shuo Chen (MSR)" userId="2e7ebbab-928d-4621-b055-ba5ecd87af3f" providerId="ADAL" clId="{406DA4F5-19E9-4571-B523-F5B122CA674E}" dt="2023-05-02T15:39:56.969" v="1445" actId="478"/>
+          <ac:spMkLst>
+            <pc:docMk/>
+            <pc:sldMk cId="2103549427" sldId="287"/>
+            <ac:spMk id="11" creationId="{D4333C4D-BB36-2836-7B89-8E668EA4F1D9}"/>
+          </ac:spMkLst>
+        </pc:spChg>
+        <pc:spChg chg="add mod">
+          <ac:chgData name="Shuo Chen (MSR)" userId="2e7ebbab-928d-4621-b055-ba5ecd87af3f" providerId="ADAL" clId="{406DA4F5-19E9-4571-B523-F5B122CA674E}" dt="2023-05-02T15:40:01.847" v="1454" actId="20577"/>
+          <ac:spMkLst>
+            <pc:docMk/>
+            <pc:sldMk cId="2103549427" sldId="287"/>
+            <ac:spMk id="12" creationId="{F4E870EC-86E2-824E-07BB-A13287E158AC}"/>
+          </ac:spMkLst>
+        </pc:spChg>
+        <pc:spChg chg="mod">
+          <ac:chgData name="Shuo Chen (MSR)" userId="2e7ebbab-928d-4621-b055-ba5ecd87af3f" providerId="ADAL" clId="{406DA4F5-19E9-4571-B523-F5B122CA674E}" dt="2023-05-02T15:46:19.695" v="1479" actId="1076"/>
+          <ac:spMkLst>
+            <pc:docMk/>
+            <pc:sldMk cId="2103549427" sldId="287"/>
+            <ac:spMk id="13" creationId="{EA9C1A90-A136-F9DF-2E7F-10B5CF0718A0}"/>
+          </ac:spMkLst>
+        </pc:spChg>
+        <pc:spChg chg="mod">
+          <ac:chgData name="Shuo Chen (MSR)" userId="2e7ebbab-928d-4621-b055-ba5ecd87af3f" providerId="ADAL" clId="{406DA4F5-19E9-4571-B523-F5B122CA674E}" dt="2023-05-02T15:46:35.598" v="1481" actId="1076"/>
+          <ac:spMkLst>
+            <pc:docMk/>
+            <pc:sldMk cId="2103549427" sldId="287"/>
+            <ac:spMk id="15" creationId="{970B3837-4549-E8B2-35FC-002049AA31E4}"/>
+          </ac:spMkLst>
+        </pc:spChg>
+        <pc:spChg chg="mod">
+          <ac:chgData name="Shuo Chen (MSR)" userId="2e7ebbab-928d-4621-b055-ba5ecd87af3f" providerId="ADAL" clId="{406DA4F5-19E9-4571-B523-F5B122CA674E}" dt="2023-05-02T15:46:55.208" v="1485" actId="1076"/>
+          <ac:spMkLst>
+            <pc:docMk/>
+            <pc:sldMk cId="2103549427" sldId="287"/>
+            <ac:spMk id="16" creationId="{0AABE2B1-B714-253E-30ED-4C32BBCC5F57}"/>
+          </ac:spMkLst>
+        </pc:spChg>
+        <pc:spChg chg="mod">
+          <ac:chgData name="Shuo Chen (MSR)" userId="2e7ebbab-928d-4621-b055-ba5ecd87af3f" providerId="ADAL" clId="{406DA4F5-19E9-4571-B523-F5B122CA674E}" dt="2023-05-02T15:47:01.017" v="1486" actId="1076"/>
+          <ac:spMkLst>
+            <pc:docMk/>
+            <pc:sldMk cId="2103549427" sldId="287"/>
+            <ac:spMk id="17" creationId="{190C70E0-C7B7-9192-CA28-DD5948BAD2CE}"/>
+          </ac:spMkLst>
+        </pc:spChg>
+        <pc:picChg chg="mod">
+          <ac:chgData name="Shuo Chen (MSR)" userId="2e7ebbab-928d-4621-b055-ba5ecd87af3f" providerId="ADAL" clId="{406DA4F5-19E9-4571-B523-F5B122CA674E}" dt="2023-05-02T15:46:43.684" v="1484" actId="1076"/>
+          <ac:picMkLst>
+            <pc:docMk/>
+            <pc:sldMk cId="2103549427" sldId="287"/>
+            <ac:picMk id="10" creationId="{E6352778-3A24-EC47-F1C5-FA627AA085A5}"/>
+          </ac:picMkLst>
+        </pc:picChg>
+        <pc:picChg chg="mod">
+          <ac:chgData name="Shuo Chen (MSR)" userId="2e7ebbab-928d-4621-b055-ba5ecd87af3f" providerId="ADAL" clId="{406DA4F5-19E9-4571-B523-F5B122CA674E}" dt="2023-05-02T15:47:05.274" v="1487" actId="1076"/>
+          <ac:picMkLst>
+            <pc:docMk/>
+            <pc:sldMk cId="2103549427" sldId="287"/>
+            <ac:picMk id="23" creationId="{A5F73DB6-3300-844C-EB3C-1B6A546E2F91}"/>
+          </ac:picMkLst>
+        </pc:picChg>
+      </pc:sldChg>
+      <pc:sldChg chg="addSp modSp modTransition modAnim">
+        <pc:chgData name="Shuo Chen (MSR)" userId="2e7ebbab-928d-4621-b055-ba5ecd87af3f" providerId="ADAL" clId="{406DA4F5-19E9-4571-B523-F5B122CA674E}" dt="2023-05-02T16:44:10.211" v="1691"/>
+        <pc:sldMkLst>
+          <pc:docMk/>
+          <pc:sldMk cId="1220370174" sldId="288"/>
+        </pc:sldMkLst>
+        <pc:picChg chg="add mod">
+          <ac:chgData name="Shuo Chen (MSR)" userId="2e7ebbab-928d-4621-b055-ba5ecd87af3f" providerId="ADAL" clId="{406DA4F5-19E9-4571-B523-F5B122CA674E}" dt="2023-05-02T04:42:30.743" v="1321"/>
+          <ac:picMkLst>
+            <pc:docMk/>
+            <pc:sldMk cId="1220370174" sldId="288"/>
+            <ac:picMk id="5" creationId="{3D89BE40-DDFF-F41D-5625-4CB7BD49BA0C}"/>
+          </ac:picMkLst>
+        </pc:picChg>
+      </pc:sldChg>
+      <pc:sldChg chg="addSp delSp modSp mod modTransition delAnim modAnim modNotesTx">
+        <pc:chgData name="Shuo Chen (MSR)" userId="2e7ebbab-928d-4621-b055-ba5ecd87af3f" providerId="ADAL" clId="{406DA4F5-19E9-4571-B523-F5B122CA674E}" dt="2023-05-02T16:16:55.289" v="1648" actId="1076"/>
+        <pc:sldMkLst>
+          <pc:docMk/>
+          <pc:sldMk cId="1473077478" sldId="289"/>
+        </pc:sldMkLst>
+        <pc:spChg chg="mod">
+          <ac:chgData name="Shuo Chen (MSR)" userId="2e7ebbab-928d-4621-b055-ba5ecd87af3f" providerId="ADAL" clId="{406DA4F5-19E9-4571-B523-F5B122CA674E}" dt="2023-05-02T16:12:55.212" v="1579" actId="14100"/>
+          <ac:spMkLst>
+            <pc:docMk/>
+            <pc:sldMk cId="1473077478" sldId="289"/>
+            <ac:spMk id="3" creationId="{2C74E118-F88D-D5CE-DF9E-B409CBB2FB5F}"/>
+          </ac:spMkLst>
+        </pc:spChg>
+        <pc:spChg chg="mod">
+          <ac:chgData name="Shuo Chen (MSR)" userId="2e7ebbab-928d-4621-b055-ba5ecd87af3f" providerId="ADAL" clId="{406DA4F5-19E9-4571-B523-F5B122CA674E}" dt="2023-05-02T16:15:21.368" v="1606" actId="20577"/>
+          <ac:spMkLst>
+            <pc:docMk/>
+            <pc:sldMk cId="1473077478" sldId="289"/>
+            <ac:spMk id="8" creationId="{39F78D93-E895-ED46-5E6A-F7446949F032}"/>
+          </ac:spMkLst>
+        </pc:spChg>
+        <pc:spChg chg="add mod">
+          <ac:chgData name="Shuo Chen (MSR)" userId="2e7ebbab-928d-4621-b055-ba5ecd87af3f" providerId="ADAL" clId="{406DA4F5-19E9-4571-B523-F5B122CA674E}" dt="2023-05-02T16:16:05.448" v="1610" actId="14100"/>
+          <ac:spMkLst>
+            <pc:docMk/>
+            <pc:sldMk cId="1473077478" sldId="289"/>
+            <ac:spMk id="20" creationId="{EC922177-2E76-4B6F-873A-58AEE67B4398}"/>
+          </ac:spMkLst>
+        </pc:spChg>
+        <pc:spChg chg="add mod">
+          <ac:chgData name="Shuo Chen (MSR)" userId="2e7ebbab-928d-4621-b055-ba5ecd87af3f" providerId="ADAL" clId="{406DA4F5-19E9-4571-B523-F5B122CA674E}" dt="2023-05-02T16:16:55.289" v="1648" actId="1076"/>
+          <ac:spMkLst>
+            <pc:docMk/>
+            <pc:sldMk cId="1473077478" sldId="289"/>
+            <ac:spMk id="21" creationId="{AE9D56ED-5D79-8CBF-45C0-A439D8868236}"/>
+          </ac:spMkLst>
+        </pc:spChg>
+        <pc:spChg chg="del mod">
+          <ac:chgData name="Shuo Chen (MSR)" userId="2e7ebbab-928d-4621-b055-ba5ecd87af3f" providerId="ADAL" clId="{406DA4F5-19E9-4571-B523-F5B122CA674E}" dt="2023-05-02T16:11:27.489" v="1575" actId="478"/>
+          <ac:spMkLst>
+            <pc:docMk/>
+            <pc:sldMk cId="1473077478" sldId="289"/>
+            <ac:spMk id="28" creationId="{154EC11D-A1C2-6830-6CCB-1F7410CEC703}"/>
+          </ac:spMkLst>
+        </pc:spChg>
+        <pc:picChg chg="add del mod">
+          <ac:chgData name="Shuo Chen (MSR)" userId="2e7ebbab-928d-4621-b055-ba5ecd87af3f" providerId="ADAL" clId="{406DA4F5-19E9-4571-B523-F5B122CA674E}" dt="2023-05-02T04:48:00.479" v="1327" actId="478"/>
+          <ac:picMkLst>
+            <pc:docMk/>
+            <pc:sldMk cId="1473077478" sldId="289"/>
+            <ac:picMk id="5" creationId="{83EBB5E6-7E84-A232-5A13-8954865160D7}"/>
+          </ac:picMkLst>
+        </pc:picChg>
+        <pc:picChg chg="add del mod">
+          <ac:chgData name="Shuo Chen (MSR)" userId="2e7ebbab-928d-4621-b055-ba5ecd87af3f" providerId="ADAL" clId="{406DA4F5-19E9-4571-B523-F5B122CA674E}" dt="2023-05-02T16:13:39.155" v="1582"/>
+          <ac:picMkLst>
+            <pc:docMk/>
+            <pc:sldMk cId="1473077478" sldId="289"/>
+            <ac:picMk id="11" creationId="{46142408-B748-4FE9-DA76-3089AECBC42F}"/>
+          </ac:picMkLst>
+        </pc:picChg>
+        <pc:picChg chg="add del mod ord">
+          <ac:chgData name="Shuo Chen (MSR)" userId="2e7ebbab-928d-4621-b055-ba5ecd87af3f" providerId="ADAL" clId="{406DA4F5-19E9-4571-B523-F5B122CA674E}" dt="2023-05-02T16:14:30.088" v="1583"/>
+          <ac:picMkLst>
+            <pc:docMk/>
+            <pc:sldMk cId="1473077478" sldId="289"/>
+            <ac:picMk id="14" creationId="{A192A77F-B274-4644-EE88-F47CECB56061}"/>
+          </ac:picMkLst>
+        </pc:picChg>
+        <pc:picChg chg="add mod">
+          <ac:chgData name="Shuo Chen (MSR)" userId="2e7ebbab-928d-4621-b055-ba5ecd87af3f" providerId="ADAL" clId="{406DA4F5-19E9-4571-B523-F5B122CA674E}" dt="2023-05-02T16:14:30.088" v="1583"/>
+          <ac:picMkLst>
+            <pc:docMk/>
+            <pc:sldMk cId="1473077478" sldId="289"/>
+            <ac:picMk id="15" creationId="{6C2E11A1-D0FD-F3F6-3F0C-50C3C67D0FBA}"/>
+          </ac:picMkLst>
+        </pc:picChg>
+      </pc:sldChg>
+      <pc:sldChg chg="addSp delSp modSp mod delAnim modAnim">
+        <pc:chgData name="Shuo Chen (MSR)" userId="2e7ebbab-928d-4621-b055-ba5ecd87af3f" providerId="ADAL" clId="{406DA4F5-19E9-4571-B523-F5B122CA674E}" dt="2023-05-02T16:32:14.112" v="1670"/>
+        <pc:sldMkLst>
+          <pc:docMk/>
+          <pc:sldMk cId="1958234100" sldId="290"/>
+        </pc:sldMkLst>
+        <pc:spChg chg="mod">
+          <ac:chgData name="Shuo Chen (MSR)" userId="2e7ebbab-928d-4621-b055-ba5ecd87af3f" providerId="ADAL" clId="{406DA4F5-19E9-4571-B523-F5B122CA674E}" dt="2023-05-02T16:24:56.569" v="1663"/>
+          <ac:spMkLst>
+            <pc:docMk/>
+            <pc:sldMk cId="1958234100" sldId="290"/>
+            <ac:spMk id="5" creationId="{21ABF669-01C0-E1DD-EDF5-24568DFFBF98}"/>
+          </ac:spMkLst>
+        </pc:spChg>
+        <pc:spChg chg="mod">
+          <ac:chgData name="Shuo Chen (MSR)" userId="2e7ebbab-928d-4621-b055-ba5ecd87af3f" providerId="ADAL" clId="{406DA4F5-19E9-4571-B523-F5B122CA674E}" dt="2023-05-02T16:25:11.976" v="1668" actId="20577"/>
+          <ac:spMkLst>
+            <pc:docMk/>
+            <pc:sldMk cId="1958234100" sldId="290"/>
+            <ac:spMk id="6" creationId="{64A799F4-730B-6C80-9527-1E368F9F4955}"/>
+          </ac:spMkLst>
+        </pc:spChg>
+        <pc:spChg chg="mod">
+          <ac:chgData name="Shuo Chen (MSR)" userId="2e7ebbab-928d-4621-b055-ba5ecd87af3f" providerId="ADAL" clId="{406DA4F5-19E9-4571-B523-F5B122CA674E}" dt="2023-05-02T16:26:04.266" v="1669" actId="207"/>
+          <ac:spMkLst>
+            <pc:docMk/>
+            <pc:sldMk cId="1958234100" sldId="290"/>
+            <ac:spMk id="151" creationId="{684F2905-3598-24C4-B2B2-E7F70850B30E}"/>
+          </ac:spMkLst>
+        </pc:spChg>
+        <pc:spChg chg="mod">
+          <ac:chgData name="Shuo Chen (MSR)" userId="2e7ebbab-928d-4621-b055-ba5ecd87af3f" providerId="ADAL" clId="{406DA4F5-19E9-4571-B523-F5B122CA674E}" dt="2023-05-02T16:25:06.284" v="1665" actId="1076"/>
+          <ac:spMkLst>
+            <pc:docMk/>
+            <pc:sldMk cId="1958234100" sldId="290"/>
+            <ac:spMk id="152" creationId="{73EF83D5-2689-6BF7-339E-03B24B38E759}"/>
+          </ac:spMkLst>
+        </pc:spChg>
+        <pc:grpChg chg="add mod">
+          <ac:chgData name="Shuo Chen (MSR)" userId="2e7ebbab-928d-4621-b055-ba5ecd87af3f" providerId="ADAL" clId="{406DA4F5-19E9-4571-B523-F5B122CA674E}" dt="2023-05-02T16:25:00.893" v="1664" actId="1076"/>
+          <ac:grpSpMkLst>
+            <pc:docMk/>
+            <pc:sldMk cId="1958234100" sldId="290"/>
+            <ac:grpSpMk id="4" creationId="{08DB1309-5C9A-6297-6346-0440DFE16093}"/>
+          </ac:grpSpMkLst>
+        </pc:grpChg>
+        <pc:grpChg chg="del">
+          <ac:chgData name="Shuo Chen (MSR)" userId="2e7ebbab-928d-4621-b055-ba5ecd87af3f" providerId="ADAL" clId="{406DA4F5-19E9-4571-B523-F5B122CA674E}" dt="2023-05-02T16:24:54.588" v="1662" actId="478"/>
+          <ac:grpSpMkLst>
+            <pc:docMk/>
+            <pc:sldMk cId="1958234100" sldId="290"/>
+            <ac:grpSpMk id="262" creationId="{A76EA46A-E4E8-CAE6-9737-E940FB13AC05}"/>
+          </ac:grpSpMkLst>
+        </pc:grpChg>
+        <pc:picChg chg="add mod">
+          <ac:chgData name="Shuo Chen (MSR)" userId="2e7ebbab-928d-4621-b055-ba5ecd87af3f" providerId="ADAL" clId="{406DA4F5-19E9-4571-B523-F5B122CA674E}" dt="2023-05-02T16:32:14.112" v="1670"/>
+          <ac:picMkLst>
+            <pc:docMk/>
+            <pc:sldMk cId="1958234100" sldId="290"/>
+            <ac:picMk id="9" creationId="{432C2244-E5CF-708A-6543-2BC18580AF52}"/>
+          </ac:picMkLst>
+        </pc:picChg>
+      </pc:sldChg>
+      <pc:sldChg chg="addSp modSp mod">
+        <pc:chgData name="Shuo Chen (MSR)" userId="2e7ebbab-928d-4621-b055-ba5ecd87af3f" providerId="ADAL" clId="{406DA4F5-19E9-4571-B523-F5B122CA674E}" dt="2023-05-02T16:33:45.855" v="1671"/>
+        <pc:sldMkLst>
+          <pc:docMk/>
+          <pc:sldMk cId="3817332862" sldId="291"/>
+        </pc:sldMkLst>
+        <pc:spChg chg="mod">
+          <ac:chgData name="Shuo Chen (MSR)" userId="2e7ebbab-928d-4621-b055-ba5ecd87af3f" providerId="ADAL" clId="{406DA4F5-19E9-4571-B523-F5B122CA674E}" dt="2023-05-02T16:23:29.237" v="1658" actId="692"/>
+          <ac:spMkLst>
+            <pc:docMk/>
+            <pc:sldMk cId="3817332862" sldId="291"/>
+            <ac:spMk id="14" creationId="{2DEEC018-7895-0B20-3428-C88425835ADF}"/>
+          </ac:spMkLst>
+        </pc:spChg>
+        <pc:spChg chg="mod">
+          <ac:chgData name="Shuo Chen (MSR)" userId="2e7ebbab-928d-4621-b055-ba5ecd87af3f" providerId="ADAL" clId="{406DA4F5-19E9-4571-B523-F5B122CA674E}" dt="2023-05-02T16:23:21.080" v="1657" actId="207"/>
+          <ac:spMkLst>
+            <pc:docMk/>
+            <pc:sldMk cId="3817332862" sldId="291"/>
+            <ac:spMk id="15" creationId="{EE475632-019D-754F-E78F-EEEDDF8BA64C}"/>
+          </ac:spMkLst>
+        </pc:spChg>
+        <pc:spChg chg="mod">
+          <ac:chgData name="Shuo Chen (MSR)" userId="2e7ebbab-928d-4621-b055-ba5ecd87af3f" providerId="ADAL" clId="{406DA4F5-19E9-4571-B523-F5B122CA674E}" dt="2023-05-02T16:22:32.026" v="1653" actId="207"/>
+          <ac:spMkLst>
+            <pc:docMk/>
+            <pc:sldMk cId="3817332862" sldId="291"/>
+            <ac:spMk id="151" creationId="{684F2905-3598-24C4-B2B2-E7F70850B30E}"/>
+          </ac:spMkLst>
+        </pc:spChg>
+        <pc:spChg chg="mod">
+          <ac:chgData name="Shuo Chen (MSR)" userId="2e7ebbab-928d-4621-b055-ba5ecd87af3f" providerId="ADAL" clId="{406DA4F5-19E9-4571-B523-F5B122CA674E}" dt="2023-05-02T16:23:12.112" v="1656" actId="1076"/>
+          <ac:spMkLst>
+            <pc:docMk/>
+            <pc:sldMk cId="3817332862" sldId="291"/>
+            <ac:spMk id="152" creationId="{73EF83D5-2689-6BF7-339E-03B24B38E759}"/>
+          </ac:spMkLst>
+        </pc:spChg>
+        <pc:spChg chg="mod">
+          <ac:chgData name="Shuo Chen (MSR)" userId="2e7ebbab-928d-4621-b055-ba5ecd87af3f" providerId="ADAL" clId="{406DA4F5-19E9-4571-B523-F5B122CA674E}" dt="2023-05-02T16:24:11.145" v="1661" actId="1076"/>
+          <ac:spMkLst>
+            <pc:docMk/>
+            <pc:sldMk cId="3817332862" sldId="291"/>
+            <ac:spMk id="216" creationId="{1360AC33-A255-91B2-5D1D-C0E32530A3A0}"/>
+          </ac:spMkLst>
+        </pc:spChg>
+        <pc:spChg chg="mod">
+          <ac:chgData name="Shuo Chen (MSR)" userId="2e7ebbab-928d-4621-b055-ba5ecd87af3f" providerId="ADAL" clId="{406DA4F5-19E9-4571-B523-F5B122CA674E}" dt="2023-05-02T16:23:36.942" v="1659" actId="14100"/>
+          <ac:spMkLst>
+            <pc:docMk/>
+            <pc:sldMk cId="3817332862" sldId="291"/>
+            <ac:spMk id="263" creationId="{EE03992A-E796-B9D9-A4F2-088E5B9E5073}"/>
+          </ac:spMkLst>
+        </pc:spChg>
+        <pc:spChg chg="mod">
+          <ac:chgData name="Shuo Chen (MSR)" userId="2e7ebbab-928d-4621-b055-ba5ecd87af3f" providerId="ADAL" clId="{406DA4F5-19E9-4571-B523-F5B122CA674E}" dt="2023-05-02T16:22:40.159" v="1654" actId="207"/>
+          <ac:spMkLst>
+            <pc:docMk/>
+            <pc:sldMk cId="3817332862" sldId="291"/>
+            <ac:spMk id="264" creationId="{FCF5CA29-5B0A-9257-A99E-88198580F93A}"/>
+          </ac:spMkLst>
+        </pc:spChg>
+        <pc:picChg chg="add mod">
+          <ac:chgData name="Shuo Chen (MSR)" userId="2e7ebbab-928d-4621-b055-ba5ecd87af3f" providerId="ADAL" clId="{406DA4F5-19E9-4571-B523-F5B122CA674E}" dt="2023-05-02T16:33:45.855" v="1671"/>
+          <ac:picMkLst>
+            <pc:docMk/>
+            <pc:sldMk cId="3817332862" sldId="291"/>
+            <ac:picMk id="7" creationId="{BDCC0A9D-849B-958C-801E-04C5D74B984E}"/>
+          </ac:picMkLst>
+        </pc:picChg>
+      </pc:sldChg>
+      <pc:sldChg chg="addSp delSp modSp mod modTransition modAnim">
+        <pc:chgData name="Shuo Chen (MSR)" userId="2e7ebbab-928d-4621-b055-ba5ecd87af3f" providerId="ADAL" clId="{406DA4F5-19E9-4571-B523-F5B122CA674E}" dt="2023-05-02T16:35:20.343" v="1675"/>
+        <pc:sldMkLst>
+          <pc:docMk/>
+          <pc:sldMk cId="4165179042" sldId="292"/>
+        </pc:sldMkLst>
+        <pc:picChg chg="add del mod">
+          <ac:chgData name="Shuo Chen (MSR)" userId="2e7ebbab-928d-4621-b055-ba5ecd87af3f" providerId="ADAL" clId="{406DA4F5-19E9-4571-B523-F5B122CA674E}" dt="2023-05-02T16:34:56.853" v="1674"/>
+          <ac:picMkLst>
+            <pc:docMk/>
+            <pc:sldMk cId="4165179042" sldId="292"/>
+            <ac:picMk id="49" creationId="{7F488390-18BB-8B4B-4B4D-5BBA498103DA}"/>
+          </ac:picMkLst>
+        </pc:picChg>
+        <pc:picChg chg="add del mod ord">
+          <ac:chgData name="Shuo Chen (MSR)" userId="2e7ebbab-928d-4621-b055-ba5ecd87af3f" providerId="ADAL" clId="{406DA4F5-19E9-4571-B523-F5B122CA674E}" dt="2023-05-02T16:35:20.343" v="1675"/>
+          <ac:picMkLst>
+            <pc:docMk/>
+            <pc:sldMk cId="4165179042" sldId="292"/>
+            <ac:picMk id="53" creationId="{2CC7C029-DEF8-60E6-C541-06805A6CBC57}"/>
+          </ac:picMkLst>
+        </pc:picChg>
+        <pc:picChg chg="add mod">
+          <ac:chgData name="Shuo Chen (MSR)" userId="2e7ebbab-928d-4621-b055-ba5ecd87af3f" providerId="ADAL" clId="{406DA4F5-19E9-4571-B523-F5B122CA674E}" dt="2023-05-02T16:35:20.343" v="1675"/>
+          <ac:picMkLst>
+            <pc:docMk/>
+            <pc:sldMk cId="4165179042" sldId="292"/>
+            <ac:picMk id="54" creationId="{8245224E-6015-63BF-95D3-3B34A4B958F0}"/>
+          </ac:picMkLst>
+        </pc:picChg>
+      </pc:sldChg>
+      <pc:sldChg chg="addSp modSp modTransition modAnim modNotesTx">
+        <pc:chgData name="Shuo Chen (MSR)" userId="2e7ebbab-928d-4621-b055-ba5ecd87af3f" providerId="ADAL" clId="{406DA4F5-19E9-4571-B523-F5B122CA674E}" dt="2023-05-02T15:49:00.711" v="1491"/>
+        <pc:sldMkLst>
+          <pc:docMk/>
+          <pc:sldMk cId="2748381907" sldId="293"/>
+        </pc:sldMkLst>
+        <pc:picChg chg="add mod">
+          <ac:chgData name="Shuo Chen (MSR)" userId="2e7ebbab-928d-4621-b055-ba5ecd87af3f" providerId="ADAL" clId="{406DA4F5-19E9-4571-B523-F5B122CA674E}" dt="2023-05-02T15:48:45.292" v="1490"/>
+          <ac:picMkLst>
+            <pc:docMk/>
+            <pc:sldMk cId="2748381907" sldId="293"/>
+            <ac:picMk id="5" creationId="{DA7026DE-A0F3-1815-AF2A-72CB183E6867}"/>
+          </ac:picMkLst>
+        </pc:picChg>
+      </pc:sldChg>
+      <pc:sldChg chg="addSp modSp modTransition modAnim">
+        <pc:chgData name="Shuo Chen (MSR)" userId="2e7ebbab-928d-4621-b055-ba5ecd87af3f" providerId="ADAL" clId="{406DA4F5-19E9-4571-B523-F5B122CA674E}" dt="2023-05-02T15:29:36.910" v="1389"/>
+        <pc:sldMkLst>
+          <pc:docMk/>
+          <pc:sldMk cId="2710933721" sldId="294"/>
+        </pc:sldMkLst>
+        <pc:picChg chg="add mod">
+          <ac:chgData name="Shuo Chen (MSR)" userId="2e7ebbab-928d-4621-b055-ba5ecd87af3f" providerId="ADAL" clId="{406DA4F5-19E9-4571-B523-F5B122CA674E}" dt="2023-05-02T04:28:54.878" v="1313"/>
+          <ac:picMkLst>
+            <pc:docMk/>
+            <pc:sldMk cId="2710933721" sldId="294"/>
+            <ac:picMk id="5" creationId="{D202C96A-36ED-4BEC-2870-4D1308C7EBBB}"/>
+          </ac:picMkLst>
+        </pc:picChg>
+      </pc:sldChg>
+      <pc:sldChg chg="addSp modSp mod modTransition modAnim modNotesTx">
+        <pc:chgData name="Shuo Chen (MSR)" userId="2e7ebbab-928d-4621-b055-ba5ecd87af3f" providerId="ADAL" clId="{406DA4F5-19E9-4571-B523-F5B122CA674E}" dt="2023-05-02T16:42:45.710" v="1690" actId="20577"/>
+        <pc:sldMkLst>
+          <pc:docMk/>
+          <pc:sldMk cId="836384348" sldId="296"/>
+        </pc:sldMkLst>
+        <pc:spChg chg="mod">
+          <ac:chgData name="Shuo Chen (MSR)" userId="2e7ebbab-928d-4621-b055-ba5ecd87af3f" providerId="ADAL" clId="{406DA4F5-19E9-4571-B523-F5B122CA674E}" dt="2023-05-02T16:42:39.277" v="1689" actId="20577"/>
+          <ac:spMkLst>
+            <pc:docMk/>
+            <pc:sldMk cId="836384348" sldId="296"/>
+            <ac:spMk id="3" creationId="{2C74E118-F88D-D5CE-DF9E-B409CBB2FB5F}"/>
+          </ac:spMkLst>
+        </pc:spChg>
+        <pc:picChg chg="add mod">
+          <ac:chgData name="Shuo Chen (MSR)" userId="2e7ebbab-928d-4621-b055-ba5ecd87af3f" providerId="ADAL" clId="{406DA4F5-19E9-4571-B523-F5B122CA674E}" dt="2023-05-02T04:51:37.263" v="1331"/>
+          <ac:picMkLst>
+            <pc:docMk/>
+            <pc:sldMk cId="836384348" sldId="296"/>
+            <ac:picMk id="5" creationId="{E0FAE419-CB36-9FE4-D666-DA035A938C66}"/>
+          </ac:picMkLst>
+        </pc:picChg>
+      </pc:sldChg>
+      <pc:sldChg chg="addSp delSp modSp mod modTransition modAnim">
+        <pc:chgData name="Shuo Chen (MSR)" userId="2e7ebbab-928d-4621-b055-ba5ecd87af3f" providerId="ADAL" clId="{406DA4F5-19E9-4571-B523-F5B122CA674E}" dt="2023-05-02T15:56:11.959" v="1511"/>
+        <pc:sldMkLst>
+          <pc:docMk/>
+          <pc:sldMk cId="3822367586" sldId="297"/>
+        </pc:sldMkLst>
+        <pc:picChg chg="add del mod">
+          <ac:chgData name="Shuo Chen (MSR)" userId="2e7ebbab-928d-4621-b055-ba5ecd87af3f" providerId="ADAL" clId="{406DA4F5-19E9-4571-B523-F5B122CA674E}" dt="2023-05-02T15:56:02.915" v="1510"/>
+          <ac:picMkLst>
+            <pc:docMk/>
+            <pc:sldMk cId="3822367586" sldId="297"/>
+            <ac:picMk id="6" creationId="{ADA18638-8DDA-8299-0FDC-7D7E9DC507AF}"/>
+          </ac:picMkLst>
+        </pc:picChg>
+        <pc:picChg chg="add del mod ord">
+          <ac:chgData name="Shuo Chen (MSR)" userId="2e7ebbab-928d-4621-b055-ba5ecd87af3f" providerId="ADAL" clId="{406DA4F5-19E9-4571-B523-F5B122CA674E}" dt="2023-05-02T15:56:11.959" v="1511"/>
+          <ac:picMkLst>
+            <pc:docMk/>
+            <pc:sldMk cId="3822367586" sldId="297"/>
+            <ac:picMk id="9" creationId="{856D09E2-78D9-3216-FCC2-B54246448C0C}"/>
+          </ac:picMkLst>
+        </pc:picChg>
+        <pc:picChg chg="add mod">
+          <ac:chgData name="Shuo Chen (MSR)" userId="2e7ebbab-928d-4621-b055-ba5ecd87af3f" providerId="ADAL" clId="{406DA4F5-19E9-4571-B523-F5B122CA674E}" dt="2023-05-02T15:56:11.959" v="1511"/>
+          <ac:picMkLst>
+            <pc:docMk/>
+            <pc:sldMk cId="3822367586" sldId="297"/>
+            <ac:picMk id="10" creationId="{2C58948A-880F-2B18-839A-C9DFA27572EB}"/>
+          </ac:picMkLst>
+        </pc:picChg>
+      </pc:sldChg>
+      <pc:sldChg chg="addSp modSp modTransition modAnim">
+        <pc:chgData name="Shuo Chen (MSR)" userId="2e7ebbab-928d-4621-b055-ba5ecd87af3f" providerId="ADAL" clId="{406DA4F5-19E9-4571-B523-F5B122CA674E}" dt="2023-05-02T15:52:07.195" v="1496"/>
+        <pc:sldMkLst>
+          <pc:docMk/>
+          <pc:sldMk cId="3415354248" sldId="298"/>
+        </pc:sldMkLst>
+        <pc:picChg chg="add mod">
+          <ac:chgData name="Shuo Chen (MSR)" userId="2e7ebbab-928d-4621-b055-ba5ecd87af3f" providerId="ADAL" clId="{406DA4F5-19E9-4571-B523-F5B122CA674E}" dt="2023-05-02T15:51:50.038" v="1495"/>
+          <ac:picMkLst>
+            <pc:docMk/>
+            <pc:sldMk cId="3415354248" sldId="298"/>
+            <ac:picMk id="5" creationId="{7DE39233-430D-3F55-3D10-C573ECBECA04}"/>
+          </ac:picMkLst>
+        </pc:picChg>
+      </pc:sldChg>
+      <pc:sldChg chg="addSp modSp modTransition modAnim">
+        <pc:chgData name="Shuo Chen (MSR)" userId="2e7ebbab-928d-4621-b055-ba5ecd87af3f" providerId="ADAL" clId="{406DA4F5-19E9-4571-B523-F5B122CA674E}" dt="2023-05-02T15:52:43.626" v="1498"/>
+        <pc:sldMkLst>
+          <pc:docMk/>
+          <pc:sldMk cId="2636307608" sldId="299"/>
+        </pc:sldMkLst>
+        <pc:picChg chg="add mod">
+          <ac:chgData name="Shuo Chen (MSR)" userId="2e7ebbab-928d-4621-b055-ba5ecd87af3f" providerId="ADAL" clId="{406DA4F5-19E9-4571-B523-F5B122CA674E}" dt="2023-05-02T15:52:31.063" v="1497"/>
+          <ac:picMkLst>
+            <pc:docMk/>
+            <pc:sldMk cId="2636307608" sldId="299"/>
+            <ac:picMk id="5" creationId="{7FA9A9B4-406D-B3E1-CF5F-E2423DC1C2F7}"/>
+          </ac:picMkLst>
+        </pc:picChg>
+      </pc:sldChg>
+      <pc:sldChg chg="addSp delSp modSp mod modTransition modAnim modNotesTx">
+        <pc:chgData name="Shuo Chen (MSR)" userId="2e7ebbab-928d-4621-b055-ba5ecd87af3f" providerId="ADAL" clId="{406DA4F5-19E9-4571-B523-F5B122CA674E}" dt="2023-05-02T04:26:25.786" v="1312"/>
+        <pc:sldMkLst>
+          <pc:docMk/>
+          <pc:sldMk cId="257127731" sldId="300"/>
+        </pc:sldMkLst>
+        <pc:spChg chg="mod">
+          <ac:chgData name="Shuo Chen (MSR)" userId="2e7ebbab-928d-4621-b055-ba5ecd87af3f" providerId="ADAL" clId="{406DA4F5-19E9-4571-B523-F5B122CA674E}" dt="2023-05-02T04:24:26.733" v="1299" actId="20577"/>
+          <ac:spMkLst>
+            <pc:docMk/>
+            <pc:sldMk cId="257127731" sldId="300"/>
+            <ac:spMk id="3" creationId="{19C7CB0F-8772-3D99-2205-C7984D06B126}"/>
+          </ac:spMkLst>
+        </pc:spChg>
+        <pc:spChg chg="mod">
+          <ac:chgData name="Shuo Chen (MSR)" userId="2e7ebbab-928d-4621-b055-ba5ecd87af3f" providerId="ADAL" clId="{406DA4F5-19E9-4571-B523-F5B122CA674E}" dt="2023-05-02T04:04:31.003" v="357" actId="403"/>
+          <ac:spMkLst>
+            <pc:docMk/>
+            <pc:sldMk cId="257127731" sldId="300"/>
+            <ac:spMk id="4" creationId="{CEC5304A-2F5F-BF25-F276-8B67C930F2F5}"/>
+          </ac:spMkLst>
+        </pc:spChg>
+        <pc:spChg chg="mod">
+          <ac:chgData name="Shuo Chen (MSR)" userId="2e7ebbab-928d-4621-b055-ba5ecd87af3f" providerId="ADAL" clId="{406DA4F5-19E9-4571-B523-F5B122CA674E}" dt="2023-05-02T04:09:41.490" v="703" actId="20577"/>
+          <ac:spMkLst>
+            <pc:docMk/>
+            <pc:sldMk cId="257127731" sldId="300"/>
+            <ac:spMk id="7" creationId="{71109773-686E-4DA3-4BB7-990E8FEA2E23}"/>
+          </ac:spMkLst>
+        </pc:spChg>
+        <pc:spChg chg="mod">
+          <ac:chgData name="Shuo Chen (MSR)" userId="2e7ebbab-928d-4621-b055-ba5ecd87af3f" providerId="ADAL" clId="{406DA4F5-19E9-4571-B523-F5B122CA674E}" dt="2023-05-02T04:13:25.663" v="829" actId="1076"/>
+          <ac:spMkLst>
+            <pc:docMk/>
+            <pc:sldMk cId="257127731" sldId="300"/>
+            <ac:spMk id="10" creationId="{6A1F44F4-30CA-795E-C1C0-C3573213640D}"/>
+          </ac:spMkLst>
+        </pc:spChg>
+        <pc:spChg chg="mod">
+          <ac:chgData name="Shuo Chen (MSR)" userId="2e7ebbab-928d-4621-b055-ba5ecd87af3f" providerId="ADAL" clId="{406DA4F5-19E9-4571-B523-F5B122CA674E}" dt="2023-05-02T04:14:59.567" v="901" actId="20577"/>
+          <ac:spMkLst>
+            <pc:docMk/>
+            <pc:sldMk cId="257127731" sldId="300"/>
+            <ac:spMk id="11" creationId="{D06DEB81-C2AC-11BF-F838-7E443D56A158}"/>
+          </ac:spMkLst>
+        </pc:spChg>
+        <pc:picChg chg="add del mod">
+          <ac:chgData name="Shuo Chen (MSR)" userId="2e7ebbab-928d-4621-b055-ba5ecd87af3f" providerId="ADAL" clId="{406DA4F5-19E9-4571-B523-F5B122CA674E}" dt="2023-05-02T04:25:04.565" v="1311"/>
+          <ac:picMkLst>
+            <pc:docMk/>
+            <pc:sldMk cId="257127731" sldId="300"/>
+            <ac:picMk id="14" creationId="{43FEA2A7-5F33-1649-333E-113EDE3D3A18}"/>
+          </ac:picMkLst>
+        </pc:picChg>
+        <pc:picChg chg="add del mod ord">
+          <ac:chgData name="Shuo Chen (MSR)" userId="2e7ebbab-928d-4621-b055-ba5ecd87af3f" providerId="ADAL" clId="{406DA4F5-19E9-4571-B523-F5B122CA674E}" dt="2023-05-02T04:26:25.786" v="1312"/>
+          <ac:picMkLst>
+            <pc:docMk/>
+            <pc:sldMk cId="257127731" sldId="300"/>
+            <ac:picMk id="17" creationId="{C48A60F7-F0D1-0232-4CEC-668ECEF75F1A}"/>
+          </ac:picMkLst>
+        </pc:picChg>
+        <pc:picChg chg="add mod">
+          <ac:chgData name="Shuo Chen (MSR)" userId="2e7ebbab-928d-4621-b055-ba5ecd87af3f" providerId="ADAL" clId="{406DA4F5-19E9-4571-B523-F5B122CA674E}" dt="2023-05-02T04:26:25.786" v="1312"/>
+          <ac:picMkLst>
+            <pc:docMk/>
+            <pc:sldMk cId="257127731" sldId="300"/>
+            <ac:picMk id="18" creationId="{8C56BDC8-6CB1-7ABB-0C1C-043216485CBC}"/>
+          </ac:picMkLst>
+        </pc:picChg>
+      </pc:sldChg>
+      <pc:sldChg chg="addSp delSp modSp add mod modTransition">
+        <pc:chgData name="Shuo Chen (MSR)" userId="2e7ebbab-928d-4621-b055-ba5ecd87af3f" providerId="ADAL" clId="{406DA4F5-19E9-4571-B523-F5B122CA674E}" dt="2023-05-02T04:57:13.801" v="1344" actId="1076"/>
+        <pc:sldMkLst>
+          <pc:docMk/>
+          <pc:sldMk cId="3980272723" sldId="301"/>
+        </pc:sldMkLst>
+        <pc:spChg chg="del">
+          <ac:chgData name="Shuo Chen (MSR)" userId="2e7ebbab-928d-4621-b055-ba5ecd87af3f" providerId="ADAL" clId="{406DA4F5-19E9-4571-B523-F5B122CA674E}" dt="2023-05-02T04:53:22.351" v="1334" actId="478"/>
+          <ac:spMkLst>
+            <pc:docMk/>
+            <pc:sldMk cId="3980272723" sldId="301"/>
+            <ac:spMk id="2" creationId="{AE7FE623-FFC5-8142-3D42-51CE3D9EAA68}"/>
+          </ac:spMkLst>
+        </pc:spChg>
+        <pc:spChg chg="del">
+          <ac:chgData name="Shuo Chen (MSR)" userId="2e7ebbab-928d-4621-b055-ba5ecd87af3f" providerId="ADAL" clId="{406DA4F5-19E9-4571-B523-F5B122CA674E}" dt="2023-05-02T04:54:07.739" v="1337" actId="478"/>
+          <ac:spMkLst>
+            <pc:docMk/>
+            <pc:sldMk cId="3980272723" sldId="301"/>
+            <ac:spMk id="3" creationId="{7ADE9F33-95E8-C970-DAAA-322FD1168595}"/>
+          </ac:spMkLst>
+        </pc:spChg>
+        <pc:spChg chg="add del mod">
+          <ac:chgData name="Shuo Chen (MSR)" userId="2e7ebbab-928d-4621-b055-ba5ecd87af3f" providerId="ADAL" clId="{406DA4F5-19E9-4571-B523-F5B122CA674E}" dt="2023-05-02T04:53:25.740" v="1335" actId="478"/>
+          <ac:spMkLst>
+            <pc:docMk/>
+            <pc:sldMk cId="3980272723" sldId="301"/>
+            <ac:spMk id="9" creationId="{FC4D8B20-8717-799D-F003-9F9E5DCD8462}"/>
+          </ac:spMkLst>
+        </pc:spChg>
+        <pc:spChg chg="add mod">
+          <ac:chgData name="Shuo Chen (MSR)" userId="2e7ebbab-928d-4621-b055-ba5ecd87af3f" providerId="ADAL" clId="{406DA4F5-19E9-4571-B523-F5B122CA674E}" dt="2023-05-02T04:53:26.385" v="1336"/>
+          <ac:spMkLst>
+            <pc:docMk/>
+            <pc:sldMk cId="3980272723" sldId="301"/>
+            <ac:spMk id="10" creationId="{8ED4D008-B698-0E4A-553A-BD6316F24D0A}"/>
+          </ac:spMkLst>
+        </pc:spChg>
+        <pc:spChg chg="add del mod">
+          <ac:chgData name="Shuo Chen (MSR)" userId="2e7ebbab-928d-4621-b055-ba5ecd87af3f" providerId="ADAL" clId="{406DA4F5-19E9-4571-B523-F5B122CA674E}" dt="2023-05-02T04:54:13.018" v="1338" actId="478"/>
+          <ac:spMkLst>
+            <pc:docMk/>
+            <pc:sldMk cId="3980272723" sldId="301"/>
+            <ac:spMk id="14" creationId="{618CB1F5-9B32-B83E-A937-8D796321B6DC}"/>
+          </ac:spMkLst>
+        </pc:spChg>
+        <pc:spChg chg="add mod">
+          <ac:chgData name="Shuo Chen (MSR)" userId="2e7ebbab-928d-4621-b055-ba5ecd87af3f" providerId="ADAL" clId="{406DA4F5-19E9-4571-B523-F5B122CA674E}" dt="2023-05-02T04:54:23.062" v="1341"/>
+          <ac:spMkLst>
+            <pc:docMk/>
+            <pc:sldMk cId="3980272723" sldId="301"/>
+            <ac:spMk id="16" creationId="{284EB8C3-09A2-D976-6026-EA9D81CB221D}"/>
+          </ac:spMkLst>
+        </pc:spChg>
+        <pc:spChg chg="add mod">
+          <ac:chgData name="Shuo Chen (MSR)" userId="2e7ebbab-928d-4621-b055-ba5ecd87af3f" providerId="ADAL" clId="{406DA4F5-19E9-4571-B523-F5B122CA674E}" dt="2023-05-02T04:54:23.062" v="1341"/>
+          <ac:spMkLst>
+            <pc:docMk/>
+            <pc:sldMk cId="3980272723" sldId="301"/>
+            <ac:spMk id="23" creationId="{2EA3C30E-58B2-B938-76BB-E682C92F8240}"/>
+          </ac:spMkLst>
+        </pc:spChg>
+        <pc:spChg chg="add mod">
+          <ac:chgData name="Shuo Chen (MSR)" userId="2e7ebbab-928d-4621-b055-ba5ecd87af3f" providerId="ADAL" clId="{406DA4F5-19E9-4571-B523-F5B122CA674E}" dt="2023-05-02T04:54:23.062" v="1341"/>
+          <ac:spMkLst>
+            <pc:docMk/>
+            <pc:sldMk cId="3980272723" sldId="301"/>
+            <ac:spMk id="26" creationId="{EF73CFF9-2353-0C47-8899-1542C6A54FF9}"/>
+          </ac:spMkLst>
+        </pc:spChg>
+        <pc:spChg chg="add mod">
+          <ac:chgData name="Shuo Chen (MSR)" userId="2e7ebbab-928d-4621-b055-ba5ecd87af3f" providerId="ADAL" clId="{406DA4F5-19E9-4571-B523-F5B122CA674E}" dt="2023-05-02T04:54:23.062" v="1341"/>
+          <ac:spMkLst>
+            <pc:docMk/>
+            <pc:sldMk cId="3980272723" sldId="301"/>
+            <ac:spMk id="27" creationId="{DF2E2DCD-4149-3DE3-4049-C7E778BF8787}"/>
+          </ac:spMkLst>
+        </pc:spChg>
+        <pc:spChg chg="add mod">
+          <ac:chgData name="Shuo Chen (MSR)" userId="2e7ebbab-928d-4621-b055-ba5ecd87af3f" providerId="ADAL" clId="{406DA4F5-19E9-4571-B523-F5B122CA674E}" dt="2023-05-02T04:54:23.062" v="1341"/>
+          <ac:spMkLst>
+            <pc:docMk/>
+            <pc:sldMk cId="3980272723" sldId="301"/>
+            <ac:spMk id="28" creationId="{CCA451F1-11AA-E4C2-4EC5-23F035789F38}"/>
+          </ac:spMkLst>
+        </pc:spChg>
+        <pc:spChg chg="add mod">
+          <ac:chgData name="Shuo Chen (MSR)" userId="2e7ebbab-928d-4621-b055-ba5ecd87af3f" providerId="ADAL" clId="{406DA4F5-19E9-4571-B523-F5B122CA674E}" dt="2023-05-02T04:54:23.062" v="1341"/>
+          <ac:spMkLst>
+            <pc:docMk/>
+            <pc:sldMk cId="3980272723" sldId="301"/>
+            <ac:spMk id="29" creationId="{23F7949C-8F99-29C3-67EC-FC8AD4D1A8DE}"/>
+          </ac:spMkLst>
+        </pc:spChg>
+        <pc:spChg chg="add mod">
+          <ac:chgData name="Shuo Chen (MSR)" userId="2e7ebbab-928d-4621-b055-ba5ecd87af3f" providerId="ADAL" clId="{406DA4F5-19E9-4571-B523-F5B122CA674E}" dt="2023-05-02T04:54:23.062" v="1341"/>
+          <ac:spMkLst>
+            <pc:docMk/>
+            <pc:sldMk cId="3980272723" sldId="301"/>
+            <ac:spMk id="30" creationId="{69BAAD33-4F04-F0CD-80DE-128D4A3B2512}"/>
+          </ac:spMkLst>
+        </pc:spChg>
+        <pc:spChg chg="add mod">
+          <ac:chgData name="Shuo Chen (MSR)" userId="2e7ebbab-928d-4621-b055-ba5ecd87af3f" providerId="ADAL" clId="{406DA4F5-19E9-4571-B523-F5B122CA674E}" dt="2023-05-02T04:54:23.062" v="1341"/>
+          <ac:spMkLst>
+            <pc:docMk/>
+            <pc:sldMk cId="3980272723" sldId="301"/>
+            <ac:spMk id="31" creationId="{B93B4374-B3BB-9BE3-963C-5DCB7C0A22AB}"/>
+          </ac:spMkLst>
+        </pc:spChg>
+        <pc:spChg chg="del">
+          <ac:chgData name="Shuo Chen (MSR)" userId="2e7ebbab-928d-4621-b055-ba5ecd87af3f" providerId="ADAL" clId="{406DA4F5-19E9-4571-B523-F5B122CA674E}" dt="2023-05-02T04:54:07.739" v="1337" actId="478"/>
+          <ac:spMkLst>
+            <pc:docMk/>
+            <pc:sldMk cId="3980272723" sldId="301"/>
+            <ac:spMk id="35" creationId="{C9571D96-6FE6-55BD-9426-8098F244F11C}"/>
+          </ac:spMkLst>
+        </pc:spChg>
+        <pc:spChg chg="del">
+          <ac:chgData name="Shuo Chen (MSR)" userId="2e7ebbab-928d-4621-b055-ba5ecd87af3f" providerId="ADAL" clId="{406DA4F5-19E9-4571-B523-F5B122CA674E}" dt="2023-05-02T04:54:07.739" v="1337" actId="478"/>
+          <ac:spMkLst>
+            <pc:docMk/>
+            <pc:sldMk cId="3980272723" sldId="301"/>
+            <ac:spMk id="36" creationId="{CB468E1B-B625-4AC7-B2C9-3A603E36AFFD}"/>
+          </ac:spMkLst>
+        </pc:spChg>
+        <pc:spChg chg="del">
+          <ac:chgData name="Shuo Chen (MSR)" userId="2e7ebbab-928d-4621-b055-ba5ecd87af3f" providerId="ADAL" clId="{406DA4F5-19E9-4571-B523-F5B122CA674E}" dt="2023-05-02T04:54:07.739" v="1337" actId="478"/>
+          <ac:spMkLst>
+            <pc:docMk/>
+            <pc:sldMk cId="3980272723" sldId="301"/>
+            <ac:spMk id="37" creationId="{4BF723CA-81CC-35F0-CB2E-EFC07DDDD18A}"/>
+          </ac:spMkLst>
+        </pc:spChg>
+        <pc:spChg chg="del">
+          <ac:chgData name="Shuo Chen (MSR)" userId="2e7ebbab-928d-4621-b055-ba5ecd87af3f" providerId="ADAL" clId="{406DA4F5-19E9-4571-B523-F5B122CA674E}" dt="2023-05-02T04:54:07.739" v="1337" actId="478"/>
+          <ac:spMkLst>
+            <pc:docMk/>
+            <pc:sldMk cId="3980272723" sldId="301"/>
+            <ac:spMk id="38" creationId="{1D9F8231-514A-E556-F6AA-82F55E825021}"/>
+          </ac:spMkLst>
+        </pc:spChg>
+        <pc:spChg chg="del">
+          <ac:chgData name="Shuo Chen (MSR)" userId="2e7ebbab-928d-4621-b055-ba5ecd87af3f" providerId="ADAL" clId="{406DA4F5-19E9-4571-B523-F5B122CA674E}" dt="2023-05-02T04:54:17.124" v="1339" actId="478"/>
+          <ac:spMkLst>
+            <pc:docMk/>
+            <pc:sldMk cId="3980272723" sldId="301"/>
+            <ac:spMk id="39" creationId="{730F3A04-B663-B081-1F7D-ABE53DF5D3D6}"/>
+          </ac:spMkLst>
+        </pc:spChg>
+        <pc:spChg chg="del">
+          <ac:chgData name="Shuo Chen (MSR)" userId="2e7ebbab-928d-4621-b055-ba5ecd87af3f" providerId="ADAL" clId="{406DA4F5-19E9-4571-B523-F5B122CA674E}" dt="2023-05-02T04:54:07.739" v="1337" actId="478"/>
+          <ac:spMkLst>
+            <pc:docMk/>
+            <pc:sldMk cId="3980272723" sldId="301"/>
+            <ac:spMk id="40" creationId="{767DE12F-BF90-BDA4-F8F1-4BDF592645E7}"/>
+          </ac:spMkLst>
+        </pc:spChg>
+        <pc:spChg chg="del">
+          <ac:chgData name="Shuo Chen (MSR)" userId="2e7ebbab-928d-4621-b055-ba5ecd87af3f" providerId="ADAL" clId="{406DA4F5-19E9-4571-B523-F5B122CA674E}" dt="2023-05-02T04:54:07.739" v="1337" actId="478"/>
+          <ac:spMkLst>
+            <pc:docMk/>
+            <pc:sldMk cId="3980272723" sldId="301"/>
+            <ac:spMk id="41" creationId="{D70B9471-9BB1-7AD4-BB14-74EB1A8D4A8C}"/>
+          </ac:spMkLst>
+        </pc:spChg>
+        <pc:spChg chg="del">
+          <ac:chgData name="Shuo Chen (MSR)" userId="2e7ebbab-928d-4621-b055-ba5ecd87af3f" providerId="ADAL" clId="{406DA4F5-19E9-4571-B523-F5B122CA674E}" dt="2023-05-02T04:54:07.739" v="1337" actId="478"/>
+          <ac:spMkLst>
+            <pc:docMk/>
+            <pc:sldMk cId="3980272723" sldId="301"/>
+            <ac:spMk id="42" creationId="{DD6FA758-1468-1D55-7C08-8AB7A1D16CB8}"/>
+          </ac:spMkLst>
+        </pc:spChg>
+        <pc:spChg chg="del">
+          <ac:chgData name="Shuo Chen (MSR)" userId="2e7ebbab-928d-4621-b055-ba5ecd87af3f" providerId="ADAL" clId="{406DA4F5-19E9-4571-B523-F5B122CA674E}" dt="2023-05-02T04:54:07.739" v="1337" actId="478"/>
+          <ac:spMkLst>
+            <pc:docMk/>
+            <pc:sldMk cId="3980272723" sldId="301"/>
+            <ac:spMk id="43" creationId="{C47E26AA-916A-28AE-24DB-B0F73BB1A273}"/>
+          </ac:spMkLst>
+        </pc:spChg>
+        <pc:spChg chg="del">
+          <ac:chgData name="Shuo Chen (MSR)" userId="2e7ebbab-928d-4621-b055-ba5ecd87af3f" providerId="ADAL" clId="{406DA4F5-19E9-4571-B523-F5B122CA674E}" dt="2023-05-02T04:54:07.739" v="1337" actId="478"/>
+          <ac:spMkLst>
+            <pc:docMk/>
+            <pc:sldMk cId="3980272723" sldId="301"/>
+            <ac:spMk id="45" creationId="{2CAD130A-9486-0408-3C68-2583302CF8A8}"/>
+          </ac:spMkLst>
+        </pc:spChg>
+        <pc:spChg chg="del">
+          <ac:chgData name="Shuo Chen (MSR)" userId="2e7ebbab-928d-4621-b055-ba5ecd87af3f" providerId="ADAL" clId="{406DA4F5-19E9-4571-B523-F5B122CA674E}" dt="2023-05-02T04:54:07.739" v="1337" actId="478"/>
+          <ac:spMkLst>
+            <pc:docMk/>
+            <pc:sldMk cId="3980272723" sldId="301"/>
+            <ac:spMk id="47" creationId="{047207CE-8335-F242-78B9-C3EF432833E2}"/>
+          </ac:spMkLst>
+        </pc:spChg>
+        <pc:spChg chg="del">
+          <ac:chgData name="Shuo Chen (MSR)" userId="2e7ebbab-928d-4621-b055-ba5ecd87af3f" providerId="ADAL" clId="{406DA4F5-19E9-4571-B523-F5B122CA674E}" dt="2023-05-02T04:54:07.739" v="1337" actId="478"/>
+          <ac:spMkLst>
+            <pc:docMk/>
+            <pc:sldMk cId="3980272723" sldId="301"/>
+            <ac:spMk id="49" creationId="{8EEBC499-FF4C-953B-FEAE-A24897A600DA}"/>
+          </ac:spMkLst>
+        </pc:spChg>
+        <pc:spChg chg="del">
+          <ac:chgData name="Shuo Chen (MSR)" userId="2e7ebbab-928d-4621-b055-ba5ecd87af3f" providerId="ADAL" clId="{406DA4F5-19E9-4571-B523-F5B122CA674E}" dt="2023-05-02T04:54:07.739" v="1337" actId="478"/>
+          <ac:spMkLst>
+            <pc:docMk/>
+            <pc:sldMk cId="3980272723" sldId="301"/>
+            <ac:spMk id="50" creationId="{F8112FF1-B85C-5BE1-1C6C-A0DE435CD0A0}"/>
+          </ac:spMkLst>
+        </pc:spChg>
+        <pc:spChg chg="del">
+          <ac:chgData name="Shuo Chen (MSR)" userId="2e7ebbab-928d-4621-b055-ba5ecd87af3f" providerId="ADAL" clId="{406DA4F5-19E9-4571-B523-F5B122CA674E}" dt="2023-05-02T04:54:07.739" v="1337" actId="478"/>
+          <ac:spMkLst>
+            <pc:docMk/>
+            <pc:sldMk cId="3980272723" sldId="301"/>
+            <ac:spMk id="52" creationId="{799A7B81-9ED3-7A2E-6A5A-DC1F5C2A51CA}"/>
+          </ac:spMkLst>
+        </pc:spChg>
+        <pc:spChg chg="del">
+          <ac:chgData name="Shuo Chen (MSR)" userId="2e7ebbab-928d-4621-b055-ba5ecd87af3f" providerId="ADAL" clId="{406DA4F5-19E9-4571-B523-F5B122CA674E}" dt="2023-05-02T04:54:07.739" v="1337" actId="478"/>
+          <ac:spMkLst>
+            <pc:docMk/>
+            <pc:sldMk cId="3980272723" sldId="301"/>
+            <ac:spMk id="53" creationId="{F1EE4EAC-3652-F369-64D0-CD21642A3F14}"/>
+          </ac:spMkLst>
+        </pc:spChg>
+        <pc:spChg chg="del">
+          <ac:chgData name="Shuo Chen (MSR)" userId="2e7ebbab-928d-4621-b055-ba5ecd87af3f" providerId="ADAL" clId="{406DA4F5-19E9-4571-B523-F5B122CA674E}" dt="2023-05-02T04:54:07.739" v="1337" actId="478"/>
+          <ac:spMkLst>
+            <pc:docMk/>
+            <pc:sldMk cId="3980272723" sldId="301"/>
+            <ac:spMk id="54" creationId="{BE185489-66F3-E8E5-4A85-49C91EA69074}"/>
+          </ac:spMkLst>
+        </pc:spChg>
+        <pc:spChg chg="del">
+          <ac:chgData name="Shuo Chen (MSR)" userId="2e7ebbab-928d-4621-b055-ba5ecd87af3f" providerId="ADAL" clId="{406DA4F5-19E9-4571-B523-F5B122CA674E}" dt="2023-05-02T04:54:07.739" v="1337" actId="478"/>
+          <ac:spMkLst>
+            <pc:docMk/>
+            <pc:sldMk cId="3980272723" sldId="301"/>
+            <ac:spMk id="55" creationId="{7B90813E-B032-BCAB-0AD5-5EF92C7A4BC0}"/>
+          </ac:spMkLst>
+        </pc:spChg>
+        <pc:spChg chg="del">
+          <ac:chgData name="Shuo Chen (MSR)" userId="2e7ebbab-928d-4621-b055-ba5ecd87af3f" providerId="ADAL" clId="{406DA4F5-19E9-4571-B523-F5B122CA674E}" dt="2023-05-02T04:54:07.739" v="1337" actId="478"/>
+          <ac:spMkLst>
+            <pc:docMk/>
+            <pc:sldMk cId="3980272723" sldId="301"/>
+            <ac:spMk id="56" creationId="{3E250064-B66B-EA83-8060-60A0991F466A}"/>
+          </ac:spMkLst>
+        </pc:spChg>
+        <pc:spChg chg="del">
+          <ac:chgData name="Shuo Chen (MSR)" userId="2e7ebbab-928d-4621-b055-ba5ecd87af3f" providerId="ADAL" clId="{406DA4F5-19E9-4571-B523-F5B122CA674E}" dt="2023-05-02T04:54:20.671" v="1340" actId="478"/>
+          <ac:spMkLst>
+            <pc:docMk/>
+            <pc:sldMk cId="3980272723" sldId="301"/>
+            <ac:spMk id="57" creationId="{8C9A3B1C-76F2-C662-B520-FC1A11DD96F3}"/>
+          </ac:spMkLst>
+        </pc:spChg>
+        <pc:spChg chg="del">
+          <ac:chgData name="Shuo Chen (MSR)" userId="2e7ebbab-928d-4621-b055-ba5ecd87af3f" providerId="ADAL" clId="{406DA4F5-19E9-4571-B523-F5B122CA674E}" dt="2023-05-02T04:54:07.739" v="1337" actId="478"/>
+          <ac:spMkLst>
+            <pc:docMk/>
+            <pc:sldMk cId="3980272723" sldId="301"/>
+            <ac:spMk id="59" creationId="{5A0CCFA2-3111-E253-D1C9-E065E97D1604}"/>
+          </ac:spMkLst>
+        </pc:spChg>
+        <pc:spChg chg="add mod">
+          <ac:chgData name="Shuo Chen (MSR)" userId="2e7ebbab-928d-4621-b055-ba5ecd87af3f" providerId="ADAL" clId="{406DA4F5-19E9-4571-B523-F5B122CA674E}" dt="2023-05-02T04:54:23.062" v="1341"/>
+          <ac:spMkLst>
+            <pc:docMk/>
+            <pc:sldMk cId="3980272723" sldId="301"/>
+            <ac:spMk id="60" creationId="{CEAFCC27-0B1A-9183-1036-8C79753145EC}"/>
+          </ac:spMkLst>
+        </pc:spChg>
+        <pc:spChg chg="add mod">
+          <ac:chgData name="Shuo Chen (MSR)" userId="2e7ebbab-928d-4621-b055-ba5ecd87af3f" providerId="ADAL" clId="{406DA4F5-19E9-4571-B523-F5B122CA674E}" dt="2023-05-02T04:54:23.062" v="1341"/>
+          <ac:spMkLst>
+            <pc:docMk/>
+            <pc:sldMk cId="3980272723" sldId="301"/>
+            <ac:spMk id="62" creationId="{A8CCA0E2-DBF0-A162-5243-2EB1ACCDE5E7}"/>
+          </ac:spMkLst>
+        </pc:spChg>
+        <pc:spChg chg="add mod">
+          <ac:chgData name="Shuo Chen (MSR)" userId="2e7ebbab-928d-4621-b055-ba5ecd87af3f" providerId="ADAL" clId="{406DA4F5-19E9-4571-B523-F5B122CA674E}" dt="2023-05-02T04:54:23.062" v="1341"/>
+          <ac:spMkLst>
+            <pc:docMk/>
+            <pc:sldMk cId="3980272723" sldId="301"/>
+            <ac:spMk id="64" creationId="{214B8F23-07C6-77AC-021B-33393CB8D5B5}"/>
+          </ac:spMkLst>
+        </pc:spChg>
+        <pc:spChg chg="add mod">
+          <ac:chgData name="Shuo Chen (MSR)" userId="2e7ebbab-928d-4621-b055-ba5ecd87af3f" providerId="ADAL" clId="{406DA4F5-19E9-4571-B523-F5B122CA674E}" dt="2023-05-02T04:54:23.062" v="1341"/>
+          <ac:spMkLst>
+            <pc:docMk/>
+            <pc:sldMk cId="3980272723" sldId="301"/>
+            <ac:spMk id="66" creationId="{7D3E4FEB-E5D3-555E-AFC4-BDB56D83659A}"/>
+          </ac:spMkLst>
+        </pc:spChg>
+        <pc:spChg chg="add mod">
+          <ac:chgData name="Shuo Chen (MSR)" userId="2e7ebbab-928d-4621-b055-ba5ecd87af3f" providerId="ADAL" clId="{406DA4F5-19E9-4571-B523-F5B122CA674E}" dt="2023-05-02T04:54:23.062" v="1341"/>
+          <ac:spMkLst>
+            <pc:docMk/>
+            <pc:sldMk cId="3980272723" sldId="301"/>
+            <ac:spMk id="67" creationId="{82A4C159-DD6F-9DC9-9557-F375D876A7FB}"/>
+          </ac:spMkLst>
+        </pc:spChg>
+        <pc:spChg chg="add mod">
+          <ac:chgData name="Shuo Chen (MSR)" userId="2e7ebbab-928d-4621-b055-ba5ecd87af3f" providerId="ADAL" clId="{406DA4F5-19E9-4571-B523-F5B122CA674E}" dt="2023-05-02T04:54:23.062" v="1341"/>
+          <ac:spMkLst>
+            <pc:docMk/>
+            <pc:sldMk cId="3980272723" sldId="301"/>
+            <ac:spMk id="69" creationId="{F8090703-6A01-43F3-D0BE-A7D85F44521A}"/>
+          </ac:spMkLst>
+        </pc:spChg>
+        <pc:spChg chg="add mod">
+          <ac:chgData name="Shuo Chen (MSR)" userId="2e7ebbab-928d-4621-b055-ba5ecd87af3f" providerId="ADAL" clId="{406DA4F5-19E9-4571-B523-F5B122CA674E}" dt="2023-05-02T04:54:23.062" v="1341"/>
+          <ac:spMkLst>
+            <pc:docMk/>
+            <pc:sldMk cId="3980272723" sldId="301"/>
+            <ac:spMk id="70" creationId="{D275AD5A-3E14-BADB-DCDB-15E739DA7024}"/>
+          </ac:spMkLst>
+        </pc:spChg>
+        <pc:spChg chg="add mod">
+          <ac:chgData name="Shuo Chen (MSR)" userId="2e7ebbab-928d-4621-b055-ba5ecd87af3f" providerId="ADAL" clId="{406DA4F5-19E9-4571-B523-F5B122CA674E}" dt="2023-05-02T04:54:23.062" v="1341"/>
+          <ac:spMkLst>
+            <pc:docMk/>
+            <pc:sldMk cId="3980272723" sldId="301"/>
+            <ac:spMk id="71" creationId="{8912D629-8C68-A056-B8FD-13173E6F737E}"/>
+          </ac:spMkLst>
+        </pc:spChg>
+        <pc:spChg chg="add mod">
+          <ac:chgData name="Shuo Chen (MSR)" userId="2e7ebbab-928d-4621-b055-ba5ecd87af3f" providerId="ADAL" clId="{406DA4F5-19E9-4571-B523-F5B122CA674E}" dt="2023-05-02T04:54:23.062" v="1341"/>
+          <ac:spMkLst>
+            <pc:docMk/>
+            <pc:sldMk cId="3980272723" sldId="301"/>
+            <ac:spMk id="72" creationId="{670E011A-7B2C-46F7-A794-C14A71503054}"/>
+          </ac:spMkLst>
+        </pc:spChg>
+        <pc:spChg chg="add mod">
+          <ac:chgData name="Shuo Chen (MSR)" userId="2e7ebbab-928d-4621-b055-ba5ecd87af3f" providerId="ADAL" clId="{406DA4F5-19E9-4571-B523-F5B122CA674E}" dt="2023-05-02T04:54:23.062" v="1341"/>
+          <ac:spMkLst>
+            <pc:docMk/>
+            <pc:sldMk cId="3980272723" sldId="301"/>
+            <ac:spMk id="73" creationId="{08727CF7-9518-6818-03DC-1140C5586028}"/>
+          </ac:spMkLst>
+        </pc:spChg>
+        <pc:spChg chg="add mod">
+          <ac:chgData name="Shuo Chen (MSR)" userId="2e7ebbab-928d-4621-b055-ba5ecd87af3f" providerId="ADAL" clId="{406DA4F5-19E9-4571-B523-F5B122CA674E}" dt="2023-05-02T04:54:23.062" v="1341"/>
+          <ac:spMkLst>
+            <pc:docMk/>
+            <pc:sldMk cId="3980272723" sldId="301"/>
+            <ac:spMk id="74" creationId="{DE95EC68-AC46-861E-4E7E-B8D7BB02606A}"/>
+          </ac:spMkLst>
+        </pc:spChg>
+        <pc:spChg chg="add mod">
+          <ac:chgData name="Shuo Chen (MSR)" userId="2e7ebbab-928d-4621-b055-ba5ecd87af3f" providerId="ADAL" clId="{406DA4F5-19E9-4571-B523-F5B122CA674E}" dt="2023-05-02T04:54:23.062" v="1341"/>
+          <ac:spMkLst>
+            <pc:docMk/>
+            <pc:sldMk cId="3980272723" sldId="301"/>
+            <ac:spMk id="76" creationId="{7FEA3A7E-9093-B619-BABB-51D4AB5DFEEB}"/>
+          </ac:spMkLst>
+        </pc:spChg>
+        <pc:spChg chg="add mod">
+          <ac:chgData name="Shuo Chen (MSR)" userId="2e7ebbab-928d-4621-b055-ba5ecd87af3f" providerId="ADAL" clId="{406DA4F5-19E9-4571-B523-F5B122CA674E}" dt="2023-05-02T04:57:00.339" v="1342"/>
+          <ac:spMkLst>
+            <pc:docMk/>
+            <pc:sldMk cId="3980272723" sldId="301"/>
+            <ac:spMk id="77" creationId="{D1E53264-EC33-4BC5-E906-217CA5C31976}"/>
+          </ac:spMkLst>
+        </pc:spChg>
+        <pc:grpChg chg="mod">
+          <ac:chgData name="Shuo Chen (MSR)" userId="2e7ebbab-928d-4621-b055-ba5ecd87af3f" providerId="ADAL" clId="{406DA4F5-19E9-4571-B523-F5B122CA674E}" dt="2023-05-02T04:57:09.002" v="1343" actId="1076"/>
+          <ac:grpSpMkLst>
+            <pc:docMk/>
+            <pc:sldMk cId="3980272723" sldId="301"/>
+            <ac:grpSpMk id="15" creationId="{81B60229-E92B-D049-63A1-F7D80903CE89}"/>
+          </ac:grpSpMkLst>
+        </pc:grpChg>
+        <pc:grpChg chg="mod">
+          <ac:chgData name="Shuo Chen (MSR)" userId="2e7ebbab-928d-4621-b055-ba5ecd87af3f" providerId="ADAL" clId="{406DA4F5-19E9-4571-B523-F5B122CA674E}" dt="2023-05-02T04:57:13.801" v="1344" actId="1076"/>
+          <ac:grpSpMkLst>
+            <pc:docMk/>
+            <pc:sldMk cId="3980272723" sldId="301"/>
+            <ac:grpSpMk id="25" creationId="{213C9B97-DADF-FF5E-6BD0-9699CEEAB3EF}"/>
+          </ac:grpSpMkLst>
+        </pc:grpChg>
+        <pc:cxnChg chg="add mod">
+          <ac:chgData name="Shuo Chen (MSR)" userId="2e7ebbab-928d-4621-b055-ba5ecd87af3f" providerId="ADAL" clId="{406DA4F5-19E9-4571-B523-F5B122CA674E}" dt="2023-05-02T04:54:23.062" v="1341"/>
+          <ac:cxnSpMkLst>
+            <pc:docMk/>
+            <pc:sldMk cId="3980272723" sldId="301"/>
+            <ac:cxnSpMk id="19" creationId="{7278F78F-D453-E164-0DC9-984DECFCDFDC}"/>
+          </ac:cxnSpMkLst>
+        </pc:cxnChg>
+        <pc:cxnChg chg="add mod">
+          <ac:chgData name="Shuo Chen (MSR)" userId="2e7ebbab-928d-4621-b055-ba5ecd87af3f" providerId="ADAL" clId="{406DA4F5-19E9-4571-B523-F5B122CA674E}" dt="2023-05-02T04:54:23.062" v="1341"/>
+          <ac:cxnSpMkLst>
+            <pc:docMk/>
+            <pc:sldMk cId="3980272723" sldId="301"/>
+            <ac:cxnSpMk id="20" creationId="{378ABE65-0698-4E8E-04B8-27648A9C6601}"/>
+          </ac:cxnSpMkLst>
+        </pc:cxnChg>
+        <pc:cxnChg chg="add mod">
+          <ac:chgData name="Shuo Chen (MSR)" userId="2e7ebbab-928d-4621-b055-ba5ecd87af3f" providerId="ADAL" clId="{406DA4F5-19E9-4571-B523-F5B122CA674E}" dt="2023-05-02T04:54:23.062" v="1341"/>
+          <ac:cxnSpMkLst>
+            <pc:docMk/>
+            <pc:sldMk cId="3980272723" sldId="301"/>
+            <ac:cxnSpMk id="21" creationId="{34FE9420-19D8-78E3-3965-BAB4FECFFDB6}"/>
+          </ac:cxnSpMkLst>
+        </pc:cxnChg>
+        <pc:cxnChg chg="del">
+          <ac:chgData name="Shuo Chen (MSR)" userId="2e7ebbab-928d-4621-b055-ba5ecd87af3f" providerId="ADAL" clId="{406DA4F5-19E9-4571-B523-F5B122CA674E}" dt="2023-05-02T04:54:07.739" v="1337" actId="478"/>
+          <ac:cxnSpMkLst>
+            <pc:docMk/>
+            <pc:sldMk cId="3980272723" sldId="301"/>
+            <ac:cxnSpMk id="32" creationId="{4935389C-A0B8-689D-7DBD-7E72F7833099}"/>
+          </ac:cxnSpMkLst>
+        </pc:cxnChg>
+        <pc:cxnChg chg="del">
+          <ac:chgData name="Shuo Chen (MSR)" userId="2e7ebbab-928d-4621-b055-ba5ecd87af3f" providerId="ADAL" clId="{406DA4F5-19E9-4571-B523-F5B122CA674E}" dt="2023-05-02T04:54:07.739" v="1337" actId="478"/>
+          <ac:cxnSpMkLst>
+            <pc:docMk/>
+            <pc:sldMk cId="3980272723" sldId="301"/>
+            <ac:cxnSpMk id="33" creationId="{4FFD2477-C032-4661-6DF5-09A607126D84}"/>
+          </ac:cxnSpMkLst>
+        </pc:cxnChg>
+        <pc:cxnChg chg="del">
+          <ac:chgData name="Shuo Chen (MSR)" userId="2e7ebbab-928d-4621-b055-ba5ecd87af3f" providerId="ADAL" clId="{406DA4F5-19E9-4571-B523-F5B122CA674E}" dt="2023-05-02T04:54:07.739" v="1337" actId="478"/>
+          <ac:cxnSpMkLst>
+            <pc:docMk/>
+            <pc:sldMk cId="3980272723" sldId="301"/>
+            <ac:cxnSpMk id="34" creationId="{45760F61-6D63-97D2-5DA1-F29F3E7D0E38}"/>
+          </ac:cxnSpMkLst>
+        </pc:cxnChg>
+        <pc:cxnChg chg="del">
+          <ac:chgData name="Shuo Chen (MSR)" userId="2e7ebbab-928d-4621-b055-ba5ecd87af3f" providerId="ADAL" clId="{406DA4F5-19E9-4571-B523-F5B122CA674E}" dt="2023-05-02T04:54:07.739" v="1337" actId="478"/>
+          <ac:cxnSpMkLst>
+            <pc:docMk/>
+            <pc:sldMk cId="3980272723" sldId="301"/>
+            <ac:cxnSpMk id="44" creationId="{4322E517-0EA7-4D1C-B4ED-1CDFA9C2C3C8}"/>
+          </ac:cxnSpMkLst>
+        </pc:cxnChg>
+        <pc:cxnChg chg="del">
+          <ac:chgData name="Shuo Chen (MSR)" userId="2e7ebbab-928d-4621-b055-ba5ecd87af3f" providerId="ADAL" clId="{406DA4F5-19E9-4571-B523-F5B122CA674E}" dt="2023-05-02T04:54:07.739" v="1337" actId="478"/>
+          <ac:cxnSpMkLst>
+            <pc:docMk/>
+            <pc:sldMk cId="3980272723" sldId="301"/>
+            <ac:cxnSpMk id="46" creationId="{18A5364F-0D13-5386-4DB4-0EB579BC6793}"/>
+          </ac:cxnSpMkLst>
+        </pc:cxnChg>
+        <pc:cxnChg chg="del">
+          <ac:chgData name="Shuo Chen (MSR)" userId="2e7ebbab-928d-4621-b055-ba5ecd87af3f" providerId="ADAL" clId="{406DA4F5-19E9-4571-B523-F5B122CA674E}" dt="2023-05-02T04:54:07.739" v="1337" actId="478"/>
+          <ac:cxnSpMkLst>
+            <pc:docMk/>
+            <pc:sldMk cId="3980272723" sldId="301"/>
+            <ac:cxnSpMk id="48" creationId="{E25F88C6-22B2-CAA0-5B7D-0689B4103A0A}"/>
+          </ac:cxnSpMkLst>
+        </pc:cxnChg>
+        <pc:cxnChg chg="del">
+          <ac:chgData name="Shuo Chen (MSR)" userId="2e7ebbab-928d-4621-b055-ba5ecd87af3f" providerId="ADAL" clId="{406DA4F5-19E9-4571-B523-F5B122CA674E}" dt="2023-05-02T04:54:07.739" v="1337" actId="478"/>
+          <ac:cxnSpMkLst>
+            <pc:docMk/>
+            <pc:sldMk cId="3980272723" sldId="301"/>
+            <ac:cxnSpMk id="51" creationId="{4342EBCD-EA90-C368-3226-F1F7192BC9F6}"/>
+          </ac:cxnSpMkLst>
+        </pc:cxnChg>
+        <pc:cxnChg chg="del">
+          <ac:chgData name="Shuo Chen (MSR)" userId="2e7ebbab-928d-4621-b055-ba5ecd87af3f" providerId="ADAL" clId="{406DA4F5-19E9-4571-B523-F5B122CA674E}" dt="2023-05-02T04:54:07.739" v="1337" actId="478"/>
+          <ac:cxnSpMkLst>
+            <pc:docMk/>
+            <pc:sldMk cId="3980272723" sldId="301"/>
+            <ac:cxnSpMk id="58" creationId="{901D2E43-ADC4-0E6A-67C6-308414C3D77E}"/>
+          </ac:cxnSpMkLst>
+        </pc:cxnChg>
+        <pc:cxnChg chg="add mod">
+          <ac:chgData name="Shuo Chen (MSR)" userId="2e7ebbab-928d-4621-b055-ba5ecd87af3f" providerId="ADAL" clId="{406DA4F5-19E9-4571-B523-F5B122CA674E}" dt="2023-05-02T04:54:23.062" v="1341"/>
+          <ac:cxnSpMkLst>
+            <pc:docMk/>
+            <pc:sldMk cId="3980272723" sldId="301"/>
+            <ac:cxnSpMk id="61" creationId="{9C58978C-F780-5757-964F-FE81DF97D436}"/>
+          </ac:cxnSpMkLst>
+        </pc:cxnChg>
+        <pc:cxnChg chg="add mod">
+          <ac:chgData name="Shuo Chen (MSR)" userId="2e7ebbab-928d-4621-b055-ba5ecd87af3f" providerId="ADAL" clId="{406DA4F5-19E9-4571-B523-F5B122CA674E}" dt="2023-05-02T04:54:23.062" v="1341"/>
+          <ac:cxnSpMkLst>
+            <pc:docMk/>
+            <pc:sldMk cId="3980272723" sldId="301"/>
+            <ac:cxnSpMk id="63" creationId="{EEFDA28B-5309-03F7-07FB-ECBDD21D42E4}"/>
+          </ac:cxnSpMkLst>
+        </pc:cxnChg>
+        <pc:cxnChg chg="add mod">
+          <ac:chgData name="Shuo Chen (MSR)" userId="2e7ebbab-928d-4621-b055-ba5ecd87af3f" providerId="ADAL" clId="{406DA4F5-19E9-4571-B523-F5B122CA674E}" dt="2023-05-02T04:54:23.062" v="1341"/>
+          <ac:cxnSpMkLst>
+            <pc:docMk/>
+            <pc:sldMk cId="3980272723" sldId="301"/>
+            <ac:cxnSpMk id="65" creationId="{A3480C54-5B7C-1D69-6599-BAFC9B204D0E}"/>
+          </ac:cxnSpMkLst>
+        </pc:cxnChg>
+        <pc:cxnChg chg="add mod">
+          <ac:chgData name="Shuo Chen (MSR)" userId="2e7ebbab-928d-4621-b055-ba5ecd87af3f" providerId="ADAL" clId="{406DA4F5-19E9-4571-B523-F5B122CA674E}" dt="2023-05-02T04:54:23.062" v="1341"/>
+          <ac:cxnSpMkLst>
+            <pc:docMk/>
+            <pc:sldMk cId="3980272723" sldId="301"/>
+            <ac:cxnSpMk id="68" creationId="{F85A274C-3D6F-0505-D96C-CF0F39C62DFE}"/>
+          </ac:cxnSpMkLst>
+        </pc:cxnChg>
+        <pc:cxnChg chg="add mod">
+          <ac:chgData name="Shuo Chen (MSR)" userId="2e7ebbab-928d-4621-b055-ba5ecd87af3f" providerId="ADAL" clId="{406DA4F5-19E9-4571-B523-F5B122CA674E}" dt="2023-05-02T04:54:23.062" v="1341"/>
+          <ac:cxnSpMkLst>
+            <pc:docMk/>
+            <pc:sldMk cId="3980272723" sldId="301"/>
+            <ac:cxnSpMk id="75" creationId="{58EC4310-4C25-087E-5054-48320D88DC5D}"/>
+          </ac:cxnSpMkLst>
+        </pc:cxnChg>
+      </pc:sldChg>
+      <pc:sldChg chg="modSp add del mod">
+        <pc:chgData name="Shuo Chen (MSR)" userId="2e7ebbab-928d-4621-b055-ba5ecd87af3f" providerId="ADAL" clId="{406DA4F5-19E9-4571-B523-F5B122CA674E}" dt="2023-05-02T15:47:21.425" v="1488" actId="2696"/>
+        <pc:sldMkLst>
+          <pc:docMk/>
+          <pc:sldMk cId="3504208454" sldId="302"/>
+        </pc:sldMkLst>
+        <pc:spChg chg="mod">
+          <ac:chgData name="Shuo Chen (MSR)" userId="2e7ebbab-928d-4621-b055-ba5ecd87af3f" providerId="ADAL" clId="{406DA4F5-19E9-4571-B523-F5B122CA674E}" dt="2023-05-02T15:34:52.745" v="1406" actId="20577"/>
+          <ac:spMkLst>
+            <pc:docMk/>
+            <pc:sldMk cId="3504208454" sldId="302"/>
+            <ac:spMk id="2" creationId="{AF1E760D-A108-EF06-3138-D7DED2193228}"/>
+          </ac:spMkLst>
+        </pc:spChg>
+      </pc:sldChg>
+    </pc:docChg>
+  </pc:docChgLst>
+  <pc:docChgLst>
     <pc:chgData name="Shuo Chen (MSR)" userId="2e7ebbab-928d-4621-b055-ba5ecd87af3f" providerId="ADAL" clId="{8084D9DB-B6CB-4D60-9DE9-951A72526351}"/>
     <pc:docChg chg="undo custSel addSld delSld modSld">
       <pc:chgData name="Shuo Chen (MSR)" userId="2e7ebbab-928d-4621-b055-ba5ecd87af3f" providerId="ADAL" clId="{8084D9DB-B6CB-4D60-9DE9-951A72526351}" dt="2023-05-02T18:01:59.878" v="959"/>
@@ -2278,1911 +4183,6 @@
             <ac:picMk id="53" creationId="{FFA24069-C27D-9969-3E8A-E854511C8E60}"/>
           </ac:picMkLst>
         </pc:picChg>
-      </pc:sldChg>
-    </pc:docChg>
-  </pc:docChgLst>
-  <pc:docChgLst>
-    <pc:chgData name="Shuo Chen (MSR)" userId="2e7ebbab-928d-4621-b055-ba5ecd87af3f" providerId="ADAL" clId="{406DA4F5-19E9-4571-B523-F5B122CA674E}"/>
-    <pc:docChg chg="undo custSel addSld delSld modSld sldOrd modShowInfo">
-      <pc:chgData name="Shuo Chen (MSR)" userId="2e7ebbab-928d-4621-b055-ba5ecd87af3f" providerId="ADAL" clId="{406DA4F5-19E9-4571-B523-F5B122CA674E}" dt="2023-05-05T18:13:38.804" v="1693" actId="2744"/>
-      <pc:docMkLst>
-        <pc:docMk/>
-      </pc:docMkLst>
-      <pc:sldChg chg="addSp delSp modSp mod modTransition delAnim modAnim modNotesTx">
-        <pc:chgData name="Shuo Chen (MSR)" userId="2e7ebbab-928d-4621-b055-ba5ecd87af3f" providerId="ADAL" clId="{406DA4F5-19E9-4571-B523-F5B122CA674E}" dt="2023-05-02T03:18:42.035" v="13"/>
-        <pc:sldMkLst>
-          <pc:docMk/>
-          <pc:sldMk cId="1520681955" sldId="256"/>
-        </pc:sldMkLst>
-        <pc:picChg chg="add del mod">
-          <ac:chgData name="Shuo Chen (MSR)" userId="2e7ebbab-928d-4621-b055-ba5ecd87af3f" providerId="ADAL" clId="{406DA4F5-19E9-4571-B523-F5B122CA674E}" dt="2023-05-02T03:17:23.562" v="4" actId="478"/>
-          <ac:picMkLst>
-            <pc:docMk/>
-            <pc:sldMk cId="1520681955" sldId="256"/>
-            <ac:picMk id="6" creationId="{C2E8D74D-EC8E-3D3C-9B2F-916CC8FAF617}"/>
-          </ac:picMkLst>
-        </pc:picChg>
-        <pc:picChg chg="add del mod">
-          <ac:chgData name="Shuo Chen (MSR)" userId="2e7ebbab-928d-4621-b055-ba5ecd87af3f" providerId="ADAL" clId="{406DA4F5-19E9-4571-B523-F5B122CA674E}" dt="2023-05-02T03:17:17.450" v="3" actId="478"/>
-          <ac:picMkLst>
-            <pc:docMk/>
-            <pc:sldMk cId="1520681955" sldId="256"/>
-            <ac:picMk id="9" creationId="{EE93F9E8-F9DD-A21D-989B-4E446938EFDE}"/>
-          </ac:picMkLst>
-        </pc:picChg>
-        <pc:picChg chg="add del mod">
-          <ac:chgData name="Shuo Chen (MSR)" userId="2e7ebbab-928d-4621-b055-ba5ecd87af3f" providerId="ADAL" clId="{406DA4F5-19E9-4571-B523-F5B122CA674E}" dt="2023-05-02T03:17:52" v="7"/>
-          <ac:picMkLst>
-            <pc:docMk/>
-            <pc:sldMk cId="1520681955" sldId="256"/>
-            <ac:picMk id="12" creationId="{34565B21-9F65-9117-C19F-696780D7D2DC}"/>
-          </ac:picMkLst>
-        </pc:picChg>
-        <pc:picChg chg="add del mod">
-          <ac:chgData name="Shuo Chen (MSR)" userId="2e7ebbab-928d-4621-b055-ba5ecd87af3f" providerId="ADAL" clId="{406DA4F5-19E9-4571-B523-F5B122CA674E}" dt="2023-05-02T03:17:55.956" v="9"/>
-          <ac:picMkLst>
-            <pc:docMk/>
-            <pc:sldMk cId="1520681955" sldId="256"/>
-            <ac:picMk id="13" creationId="{EB73D28B-5F5F-31E0-EA03-FD005324DDDE}"/>
-          </ac:picMkLst>
-        </pc:picChg>
-        <pc:picChg chg="add del mod ord">
-          <ac:chgData name="Shuo Chen (MSR)" userId="2e7ebbab-928d-4621-b055-ba5ecd87af3f" providerId="ADAL" clId="{406DA4F5-19E9-4571-B523-F5B122CA674E}" dt="2023-05-02T03:18:08.276" v="10"/>
-          <ac:picMkLst>
-            <pc:docMk/>
-            <pc:sldMk cId="1520681955" sldId="256"/>
-            <ac:picMk id="16" creationId="{F1F47BC9-82E3-F542-DA50-321879284F80}"/>
-          </ac:picMkLst>
-        </pc:picChg>
-        <pc:picChg chg="add del mod">
-          <ac:chgData name="Shuo Chen (MSR)" userId="2e7ebbab-928d-4621-b055-ba5ecd87af3f" providerId="ADAL" clId="{406DA4F5-19E9-4571-B523-F5B122CA674E}" dt="2023-05-02T03:18:14.309" v="12"/>
-          <ac:picMkLst>
-            <pc:docMk/>
-            <pc:sldMk cId="1520681955" sldId="256"/>
-            <ac:picMk id="17" creationId="{16CBD6A4-C3A7-450A-4993-A6E957131DA7}"/>
-          </ac:picMkLst>
-        </pc:picChg>
-        <pc:picChg chg="add del mod ord">
-          <ac:chgData name="Shuo Chen (MSR)" userId="2e7ebbab-928d-4621-b055-ba5ecd87af3f" providerId="ADAL" clId="{406DA4F5-19E9-4571-B523-F5B122CA674E}" dt="2023-05-02T03:18:42.035" v="13"/>
-          <ac:picMkLst>
-            <pc:docMk/>
-            <pc:sldMk cId="1520681955" sldId="256"/>
-            <ac:picMk id="20" creationId="{F28BE608-0989-876F-FC46-7377C87791AE}"/>
-          </ac:picMkLst>
-        </pc:picChg>
-        <pc:picChg chg="add mod">
-          <ac:chgData name="Shuo Chen (MSR)" userId="2e7ebbab-928d-4621-b055-ba5ecd87af3f" providerId="ADAL" clId="{406DA4F5-19E9-4571-B523-F5B122CA674E}" dt="2023-05-02T03:18:42.035" v="13"/>
-          <ac:picMkLst>
-            <pc:docMk/>
-            <pc:sldMk cId="1520681955" sldId="256"/>
-            <ac:picMk id="21" creationId="{3386CEEE-3E55-7D00-8F40-E73B46BD4943}"/>
-          </ac:picMkLst>
-        </pc:picChg>
-      </pc:sldChg>
-      <pc:sldChg chg="addSp delSp modSp mod modTransition modAnim modNotesTx">
-        <pc:chgData name="Shuo Chen (MSR)" userId="2e7ebbab-928d-4621-b055-ba5ecd87af3f" providerId="ADAL" clId="{406DA4F5-19E9-4571-B523-F5B122CA674E}" dt="2023-05-02T03:32:31.369" v="244" actId="313"/>
-        <pc:sldMkLst>
-          <pc:docMk/>
-          <pc:sldMk cId="769397940" sldId="257"/>
-        </pc:sldMkLst>
-        <pc:spChg chg="mod">
-          <ac:chgData name="Shuo Chen (MSR)" userId="2e7ebbab-928d-4621-b055-ba5ecd87af3f" providerId="ADAL" clId="{406DA4F5-19E9-4571-B523-F5B122CA674E}" dt="2023-05-02T03:32:31.369" v="244" actId="313"/>
-          <ac:spMkLst>
-            <pc:docMk/>
-            <pc:sldMk cId="769397940" sldId="257"/>
-            <ac:spMk id="3" creationId="{972576A2-9783-8BE4-9C81-A05A503372EA}"/>
-          </ac:spMkLst>
-        </pc:spChg>
-        <pc:picChg chg="add del mod">
-          <ac:chgData name="Shuo Chen (MSR)" userId="2e7ebbab-928d-4621-b055-ba5ecd87af3f" providerId="ADAL" clId="{406DA4F5-19E9-4571-B523-F5B122CA674E}" dt="2023-05-02T03:26:07.650" v="183"/>
-          <ac:picMkLst>
-            <pc:docMk/>
-            <pc:sldMk cId="769397940" sldId="257"/>
-            <ac:picMk id="11" creationId="{168450FE-1672-FC06-6D8A-E1CE123269D1}"/>
-          </ac:picMkLst>
-        </pc:picChg>
-        <pc:picChg chg="add del mod ord">
-          <ac:chgData name="Shuo Chen (MSR)" userId="2e7ebbab-928d-4621-b055-ba5ecd87af3f" providerId="ADAL" clId="{406DA4F5-19E9-4571-B523-F5B122CA674E}" dt="2023-05-02T03:26:17.241" v="184"/>
-          <ac:picMkLst>
-            <pc:docMk/>
-            <pc:sldMk cId="769397940" sldId="257"/>
-            <ac:picMk id="14" creationId="{1D2800E4-FB29-AA57-588C-E8978D0B3E50}"/>
-          </ac:picMkLst>
-        </pc:picChg>
-        <pc:picChg chg="add del mod">
-          <ac:chgData name="Shuo Chen (MSR)" userId="2e7ebbab-928d-4621-b055-ba5ecd87af3f" providerId="ADAL" clId="{406DA4F5-19E9-4571-B523-F5B122CA674E}" dt="2023-05-02T03:26:18.927" v="186"/>
-          <ac:picMkLst>
-            <pc:docMk/>
-            <pc:sldMk cId="769397940" sldId="257"/>
-            <ac:picMk id="15" creationId="{9FFE323A-1ED0-CCE8-C32C-200E967DC588}"/>
-          </ac:picMkLst>
-        </pc:picChg>
-        <pc:picChg chg="add del mod ord">
-          <ac:chgData name="Shuo Chen (MSR)" userId="2e7ebbab-928d-4621-b055-ba5ecd87af3f" providerId="ADAL" clId="{406DA4F5-19E9-4571-B523-F5B122CA674E}" dt="2023-05-02T03:26:28.779" v="187"/>
-          <ac:picMkLst>
-            <pc:docMk/>
-            <pc:sldMk cId="769397940" sldId="257"/>
-            <ac:picMk id="18" creationId="{413FBF46-18A9-9E5E-1F75-3505670E6F9D}"/>
-          </ac:picMkLst>
-        </pc:picChg>
-        <pc:picChg chg="add del mod">
-          <ac:chgData name="Shuo Chen (MSR)" userId="2e7ebbab-928d-4621-b055-ba5ecd87af3f" providerId="ADAL" clId="{406DA4F5-19E9-4571-B523-F5B122CA674E}" dt="2023-05-02T03:26:32.680" v="189"/>
-          <ac:picMkLst>
-            <pc:docMk/>
-            <pc:sldMk cId="769397940" sldId="257"/>
-            <ac:picMk id="19" creationId="{26A2D441-192A-5DF7-17C4-7820557AE772}"/>
-          </ac:picMkLst>
-        </pc:picChg>
-        <pc:picChg chg="add del mod ord">
-          <ac:chgData name="Shuo Chen (MSR)" userId="2e7ebbab-928d-4621-b055-ba5ecd87af3f" providerId="ADAL" clId="{406DA4F5-19E9-4571-B523-F5B122CA674E}" dt="2023-05-02T03:26:46.036" v="190"/>
-          <ac:picMkLst>
-            <pc:docMk/>
-            <pc:sldMk cId="769397940" sldId="257"/>
-            <ac:picMk id="22" creationId="{4575CDF3-F011-9746-501E-59CA8CCA05E6}"/>
-          </ac:picMkLst>
-        </pc:picChg>
-        <pc:picChg chg="add del mod">
-          <ac:chgData name="Shuo Chen (MSR)" userId="2e7ebbab-928d-4621-b055-ba5ecd87af3f" providerId="ADAL" clId="{406DA4F5-19E9-4571-B523-F5B122CA674E}" dt="2023-05-02T03:27:13.759" v="195"/>
-          <ac:picMkLst>
-            <pc:docMk/>
-            <pc:sldMk cId="769397940" sldId="257"/>
-            <ac:picMk id="23" creationId="{635D1AC6-055B-14A4-1AF2-B9F90C951ABA}"/>
-          </ac:picMkLst>
-        </pc:picChg>
-        <pc:picChg chg="add del mod ord">
-          <ac:chgData name="Shuo Chen (MSR)" userId="2e7ebbab-928d-4621-b055-ba5ecd87af3f" providerId="ADAL" clId="{406DA4F5-19E9-4571-B523-F5B122CA674E}" dt="2023-05-02T03:28:15.523" v="196"/>
-          <ac:picMkLst>
-            <pc:docMk/>
-            <pc:sldMk cId="769397940" sldId="257"/>
-            <ac:picMk id="27" creationId="{F3FD7C40-3A7F-97FD-58BE-41ECC0A28CC8}"/>
-          </ac:picMkLst>
-        </pc:picChg>
-        <pc:picChg chg="add del mod">
-          <ac:chgData name="Shuo Chen (MSR)" userId="2e7ebbab-928d-4621-b055-ba5ecd87af3f" providerId="ADAL" clId="{406DA4F5-19E9-4571-B523-F5B122CA674E}" dt="2023-05-02T03:28:18.136" v="198"/>
-          <ac:picMkLst>
-            <pc:docMk/>
-            <pc:sldMk cId="769397940" sldId="257"/>
-            <ac:picMk id="28" creationId="{3F2814F9-6F90-C7B2-41BD-4390190C6AD7}"/>
-          </ac:picMkLst>
-        </pc:picChg>
-        <pc:picChg chg="add del mod ord">
-          <ac:chgData name="Shuo Chen (MSR)" userId="2e7ebbab-928d-4621-b055-ba5ecd87af3f" providerId="ADAL" clId="{406DA4F5-19E9-4571-B523-F5B122CA674E}" dt="2023-05-02T03:29:03.895" v="199"/>
-          <ac:picMkLst>
-            <pc:docMk/>
-            <pc:sldMk cId="769397940" sldId="257"/>
-            <ac:picMk id="31" creationId="{E36889D6-49DC-0697-1AA9-0AF628DC77A8}"/>
-          </ac:picMkLst>
-        </pc:picChg>
-        <pc:picChg chg="add del mod">
-          <ac:chgData name="Shuo Chen (MSR)" userId="2e7ebbab-928d-4621-b055-ba5ecd87af3f" providerId="ADAL" clId="{406DA4F5-19E9-4571-B523-F5B122CA674E}" dt="2023-05-02T03:29:10.519" v="201"/>
-          <ac:picMkLst>
-            <pc:docMk/>
-            <pc:sldMk cId="769397940" sldId="257"/>
-            <ac:picMk id="32" creationId="{A57CA9D8-C390-75FC-3448-34A6A55645FD}"/>
-          </ac:picMkLst>
-        </pc:picChg>
-        <pc:picChg chg="add del mod ord">
-          <ac:chgData name="Shuo Chen (MSR)" userId="2e7ebbab-928d-4621-b055-ba5ecd87af3f" providerId="ADAL" clId="{406DA4F5-19E9-4571-B523-F5B122CA674E}" dt="2023-05-02T03:30:09.463" v="202"/>
-          <ac:picMkLst>
-            <pc:docMk/>
-            <pc:sldMk cId="769397940" sldId="257"/>
-            <ac:picMk id="35" creationId="{2C1E1E5B-F92B-8647-D5BD-4D4133807DF1}"/>
-          </ac:picMkLst>
-        </pc:picChg>
-        <pc:picChg chg="add mod">
-          <ac:chgData name="Shuo Chen (MSR)" userId="2e7ebbab-928d-4621-b055-ba5ecd87af3f" providerId="ADAL" clId="{406DA4F5-19E9-4571-B523-F5B122CA674E}" dt="2023-05-02T03:30:09.463" v="202"/>
-          <ac:picMkLst>
-            <pc:docMk/>
-            <pc:sldMk cId="769397940" sldId="257"/>
-            <ac:picMk id="36" creationId="{D9026E56-EC87-5462-BB42-20102500F5FC}"/>
-          </ac:picMkLst>
-        </pc:picChg>
-      </pc:sldChg>
-      <pc:sldChg chg="addSp modSp mod modTransition modAnim modNotesTx">
-        <pc:chgData name="Shuo Chen (MSR)" userId="2e7ebbab-928d-4621-b055-ba5ecd87af3f" providerId="ADAL" clId="{406DA4F5-19E9-4571-B523-F5B122CA674E}" dt="2023-05-02T05:10:32.368" v="1369"/>
-        <pc:sldMkLst>
-          <pc:docMk/>
-          <pc:sldMk cId="3923138916" sldId="258"/>
-        </pc:sldMkLst>
-        <pc:spChg chg="mod">
-          <ac:chgData name="Shuo Chen (MSR)" userId="2e7ebbab-928d-4621-b055-ba5ecd87af3f" providerId="ADAL" clId="{406DA4F5-19E9-4571-B523-F5B122CA674E}" dt="2023-05-02T03:34:01.853" v="247" actId="20577"/>
-          <ac:spMkLst>
-            <pc:docMk/>
-            <pc:sldMk cId="3923138916" sldId="258"/>
-            <ac:spMk id="3" creationId="{B832D10F-404D-E9DA-8981-5A18FA6F4472}"/>
-          </ac:spMkLst>
-        </pc:spChg>
-        <pc:picChg chg="add mod">
-          <ac:chgData name="Shuo Chen (MSR)" userId="2e7ebbab-928d-4621-b055-ba5ecd87af3f" providerId="ADAL" clId="{406DA4F5-19E9-4571-B523-F5B122CA674E}" dt="2023-05-02T03:35:38.684" v="248"/>
-          <ac:picMkLst>
-            <pc:docMk/>
-            <pc:sldMk cId="3923138916" sldId="258"/>
-            <ac:picMk id="6" creationId="{51AF6A8F-AC55-044F-8C4B-591BEF7416A7}"/>
-          </ac:picMkLst>
-        </pc:picChg>
-      </pc:sldChg>
-      <pc:sldChg chg="addSp delSp modSp mod modTransition modAnim modNotesTx">
-        <pc:chgData name="Shuo Chen (MSR)" userId="2e7ebbab-928d-4621-b055-ba5ecd87af3f" providerId="ADAL" clId="{406DA4F5-19E9-4571-B523-F5B122CA674E}" dt="2023-05-02T05:13:26.222" v="1387" actId="20577"/>
-        <pc:sldMkLst>
-          <pc:docMk/>
-          <pc:sldMk cId="2134660308" sldId="259"/>
-        </pc:sldMkLst>
-        <pc:spChg chg="mod">
-          <ac:chgData name="Shuo Chen (MSR)" userId="2e7ebbab-928d-4621-b055-ba5ecd87af3f" providerId="ADAL" clId="{406DA4F5-19E9-4571-B523-F5B122CA674E}" dt="2023-05-02T05:13:26.222" v="1387" actId="20577"/>
-          <ac:spMkLst>
-            <pc:docMk/>
-            <pc:sldMk cId="2134660308" sldId="259"/>
-            <ac:spMk id="3" creationId="{FD5AF04A-4085-A438-46E2-BA90B750345B}"/>
-          </ac:spMkLst>
-        </pc:spChg>
-        <pc:spChg chg="mod">
-          <ac:chgData name="Shuo Chen (MSR)" userId="2e7ebbab-928d-4621-b055-ba5ecd87af3f" providerId="ADAL" clId="{406DA4F5-19E9-4571-B523-F5B122CA674E}" dt="2023-05-02T03:40:16.507" v="257" actId="1076"/>
-          <ac:spMkLst>
-            <pc:docMk/>
-            <pc:sldMk cId="2134660308" sldId="259"/>
-            <ac:spMk id="5" creationId="{2D166818-6056-E400-12A2-35E16488BFE0}"/>
-          </ac:spMkLst>
-        </pc:spChg>
-        <pc:spChg chg="mod">
-          <ac:chgData name="Shuo Chen (MSR)" userId="2e7ebbab-928d-4621-b055-ba5ecd87af3f" providerId="ADAL" clId="{406DA4F5-19E9-4571-B523-F5B122CA674E}" dt="2023-05-02T03:40:16.507" v="257" actId="1076"/>
-          <ac:spMkLst>
-            <pc:docMk/>
-            <pc:sldMk cId="2134660308" sldId="259"/>
-            <ac:spMk id="6" creationId="{9D61511D-2F33-9794-405C-11777FBCBD27}"/>
-          </ac:spMkLst>
-        </pc:spChg>
-        <pc:spChg chg="mod">
-          <ac:chgData name="Shuo Chen (MSR)" userId="2e7ebbab-928d-4621-b055-ba5ecd87af3f" providerId="ADAL" clId="{406DA4F5-19E9-4571-B523-F5B122CA674E}" dt="2023-05-02T03:40:16.507" v="257" actId="1076"/>
-          <ac:spMkLst>
-            <pc:docMk/>
-            <pc:sldMk cId="2134660308" sldId="259"/>
-            <ac:spMk id="11" creationId="{C7FE1669-C345-A5D5-57EB-C4588C6B528F}"/>
-          </ac:spMkLst>
-        </pc:spChg>
-        <pc:picChg chg="mod">
-          <ac:chgData name="Shuo Chen (MSR)" userId="2e7ebbab-928d-4621-b055-ba5ecd87af3f" providerId="ADAL" clId="{406DA4F5-19E9-4571-B523-F5B122CA674E}" dt="2023-05-02T03:39:58.475" v="254" actId="1076"/>
-          <ac:picMkLst>
-            <pc:docMk/>
-            <pc:sldMk cId="2134660308" sldId="259"/>
-            <ac:picMk id="4" creationId="{85EFA03A-5071-00C9-5A75-D8EB9FB62BAF}"/>
-          </ac:picMkLst>
-        </pc:picChg>
-        <pc:picChg chg="add del mod">
-          <ac:chgData name="Shuo Chen (MSR)" userId="2e7ebbab-928d-4621-b055-ba5ecd87af3f" providerId="ADAL" clId="{406DA4F5-19E9-4571-B523-F5B122CA674E}" dt="2023-05-02T03:45:22.642" v="306"/>
-          <ac:picMkLst>
-            <pc:docMk/>
-            <pc:sldMk cId="2134660308" sldId="259"/>
-            <ac:picMk id="15" creationId="{860A5C13-DB91-8BEB-8C61-0D21D4A2F548}"/>
-          </ac:picMkLst>
-        </pc:picChg>
-        <pc:picChg chg="add del mod ord">
-          <ac:chgData name="Shuo Chen (MSR)" userId="2e7ebbab-928d-4621-b055-ba5ecd87af3f" providerId="ADAL" clId="{406DA4F5-19E9-4571-B523-F5B122CA674E}" dt="2023-05-02T03:46:07.377" v="307"/>
-          <ac:picMkLst>
-            <pc:docMk/>
-            <pc:sldMk cId="2134660308" sldId="259"/>
-            <ac:picMk id="18" creationId="{783239A2-9CE4-34F1-3E3E-5C7D8A9B5B59}"/>
-          </ac:picMkLst>
-        </pc:picChg>
-        <pc:picChg chg="add del mod">
-          <ac:chgData name="Shuo Chen (MSR)" userId="2e7ebbab-928d-4621-b055-ba5ecd87af3f" providerId="ADAL" clId="{406DA4F5-19E9-4571-B523-F5B122CA674E}" dt="2023-05-02T03:46:16.277" v="309"/>
-          <ac:picMkLst>
-            <pc:docMk/>
-            <pc:sldMk cId="2134660308" sldId="259"/>
-            <ac:picMk id="19" creationId="{6C40F060-36C8-8D7F-F16D-C5107A59A31B}"/>
-          </ac:picMkLst>
-        </pc:picChg>
-        <pc:picChg chg="add del mod ord">
-          <ac:chgData name="Shuo Chen (MSR)" userId="2e7ebbab-928d-4621-b055-ba5ecd87af3f" providerId="ADAL" clId="{406DA4F5-19E9-4571-B523-F5B122CA674E}" dt="2023-05-02T03:47:24.171" v="310"/>
-          <ac:picMkLst>
-            <pc:docMk/>
-            <pc:sldMk cId="2134660308" sldId="259"/>
-            <ac:picMk id="22" creationId="{F39B0AE2-5544-7EEA-D77A-272C9AC324B1}"/>
-          </ac:picMkLst>
-        </pc:picChg>
-        <pc:picChg chg="add del mod">
-          <ac:chgData name="Shuo Chen (MSR)" userId="2e7ebbab-928d-4621-b055-ba5ecd87af3f" providerId="ADAL" clId="{406DA4F5-19E9-4571-B523-F5B122CA674E}" dt="2023-05-02T03:48:36.057" v="318"/>
-          <ac:picMkLst>
-            <pc:docMk/>
-            <pc:sldMk cId="2134660308" sldId="259"/>
-            <ac:picMk id="23" creationId="{FA387B5E-BCCA-3A56-DF07-5C52F752A13F}"/>
-          </ac:picMkLst>
-        </pc:picChg>
-        <pc:picChg chg="add del mod ord">
-          <ac:chgData name="Shuo Chen (MSR)" userId="2e7ebbab-928d-4621-b055-ba5ecd87af3f" providerId="ADAL" clId="{406DA4F5-19E9-4571-B523-F5B122CA674E}" dt="2023-05-02T03:48:46.619" v="319"/>
-          <ac:picMkLst>
-            <pc:docMk/>
-            <pc:sldMk cId="2134660308" sldId="259"/>
-            <ac:picMk id="27" creationId="{394E3FD1-604B-C178-48EE-65755F0C5A55}"/>
-          </ac:picMkLst>
-        </pc:picChg>
-        <pc:picChg chg="add del mod">
-          <ac:chgData name="Shuo Chen (MSR)" userId="2e7ebbab-928d-4621-b055-ba5ecd87af3f" providerId="ADAL" clId="{406DA4F5-19E9-4571-B523-F5B122CA674E}" dt="2023-05-02T03:48:48.190" v="321"/>
-          <ac:picMkLst>
-            <pc:docMk/>
-            <pc:sldMk cId="2134660308" sldId="259"/>
-            <ac:picMk id="28" creationId="{50DA80BA-7D72-832F-2445-5731DA1C3CA3}"/>
-          </ac:picMkLst>
-        </pc:picChg>
-        <pc:picChg chg="add del mod ord">
-          <ac:chgData name="Shuo Chen (MSR)" userId="2e7ebbab-928d-4621-b055-ba5ecd87af3f" providerId="ADAL" clId="{406DA4F5-19E9-4571-B523-F5B122CA674E}" dt="2023-05-02T03:50:17.872" v="322"/>
-          <ac:picMkLst>
-            <pc:docMk/>
-            <pc:sldMk cId="2134660308" sldId="259"/>
-            <ac:picMk id="31" creationId="{495BB437-2D9D-51FE-A683-D2A2F9AF75EE}"/>
-          </ac:picMkLst>
-        </pc:picChg>
-        <pc:picChg chg="add mod">
-          <ac:chgData name="Shuo Chen (MSR)" userId="2e7ebbab-928d-4621-b055-ba5ecd87af3f" providerId="ADAL" clId="{406DA4F5-19E9-4571-B523-F5B122CA674E}" dt="2023-05-02T03:50:17.872" v="322"/>
-          <ac:picMkLst>
-            <pc:docMk/>
-            <pc:sldMk cId="2134660308" sldId="259"/>
-            <ac:picMk id="32" creationId="{8A5A12E9-326B-3EF4-70A7-CBE5B96B12FB}"/>
-          </ac:picMkLst>
-        </pc:picChg>
-        <pc:cxnChg chg="mod">
-          <ac:chgData name="Shuo Chen (MSR)" userId="2e7ebbab-928d-4621-b055-ba5ecd87af3f" providerId="ADAL" clId="{406DA4F5-19E9-4571-B523-F5B122CA674E}" dt="2023-05-02T03:40:16.507" v="257" actId="1076"/>
-          <ac:cxnSpMkLst>
-            <pc:docMk/>
-            <pc:sldMk cId="2134660308" sldId="259"/>
-            <ac:cxnSpMk id="7" creationId="{FE23244A-4F89-60E9-FF59-E23BA53EFE83}"/>
-          </ac:cxnSpMkLst>
-        </pc:cxnChg>
-        <pc:cxnChg chg="mod">
-          <ac:chgData name="Shuo Chen (MSR)" userId="2e7ebbab-928d-4621-b055-ba5ecd87af3f" providerId="ADAL" clId="{406DA4F5-19E9-4571-B523-F5B122CA674E}" dt="2023-05-02T03:40:16.507" v="257" actId="1076"/>
-          <ac:cxnSpMkLst>
-            <pc:docMk/>
-            <pc:sldMk cId="2134660308" sldId="259"/>
-            <ac:cxnSpMk id="8" creationId="{2ACE8E55-C75E-03F5-3743-78C16076D589}"/>
-          </ac:cxnSpMkLst>
-        </pc:cxnChg>
-        <pc:cxnChg chg="mod">
-          <ac:chgData name="Shuo Chen (MSR)" userId="2e7ebbab-928d-4621-b055-ba5ecd87af3f" providerId="ADAL" clId="{406DA4F5-19E9-4571-B523-F5B122CA674E}" dt="2023-05-02T03:40:16.507" v="257" actId="1076"/>
-          <ac:cxnSpMkLst>
-            <pc:docMk/>
-            <pc:sldMk cId="2134660308" sldId="259"/>
-            <ac:cxnSpMk id="9" creationId="{D23D79F7-6D85-CC79-B441-0B56F57BC74C}"/>
-          </ac:cxnSpMkLst>
-        </pc:cxnChg>
-        <pc:cxnChg chg="mod">
-          <ac:chgData name="Shuo Chen (MSR)" userId="2e7ebbab-928d-4621-b055-ba5ecd87af3f" providerId="ADAL" clId="{406DA4F5-19E9-4571-B523-F5B122CA674E}" dt="2023-05-02T03:40:16.507" v="257" actId="1076"/>
-          <ac:cxnSpMkLst>
-            <pc:docMk/>
-            <pc:sldMk cId="2134660308" sldId="259"/>
-            <ac:cxnSpMk id="10" creationId="{D5E99447-EAB4-A092-FB39-16B567C48E8E}"/>
-          </ac:cxnSpMkLst>
-        </pc:cxnChg>
-      </pc:sldChg>
-      <pc:sldChg chg="addSp modSp mod modTransition modAnim">
-        <pc:chgData name="Shuo Chen (MSR)" userId="2e7ebbab-928d-4621-b055-ba5ecd87af3f" providerId="ADAL" clId="{406DA4F5-19E9-4571-B523-F5B122CA674E}" dt="2023-05-02T05:13:01.476" v="1370"/>
-        <pc:sldMkLst>
-          <pc:docMk/>
-          <pc:sldMk cId="330743462" sldId="260"/>
-        </pc:sldMkLst>
-        <pc:spChg chg="mod">
-          <ac:chgData name="Shuo Chen (MSR)" userId="2e7ebbab-928d-4621-b055-ba5ecd87af3f" providerId="ADAL" clId="{406DA4F5-19E9-4571-B523-F5B122CA674E}" dt="2023-05-02T03:51:42.527" v="337" actId="20577"/>
-          <ac:spMkLst>
-            <pc:docMk/>
-            <pc:sldMk cId="330743462" sldId="260"/>
-            <ac:spMk id="3" creationId="{19C7CB0F-8772-3D99-2205-C7984D06B126}"/>
-          </ac:spMkLst>
-        </pc:spChg>
-        <pc:spChg chg="mod">
-          <ac:chgData name="Shuo Chen (MSR)" userId="2e7ebbab-928d-4621-b055-ba5ecd87af3f" providerId="ADAL" clId="{406DA4F5-19E9-4571-B523-F5B122CA674E}" dt="2023-05-02T03:50:57.118" v="331" actId="20577"/>
-          <ac:spMkLst>
-            <pc:docMk/>
-            <pc:sldMk cId="330743462" sldId="260"/>
-            <ac:spMk id="4" creationId="{CEC5304A-2F5F-BF25-F276-8B67C930F2F5}"/>
-          </ac:spMkLst>
-        </pc:spChg>
-        <pc:spChg chg="mod">
-          <ac:chgData name="Shuo Chen (MSR)" userId="2e7ebbab-928d-4621-b055-ba5ecd87af3f" providerId="ADAL" clId="{406DA4F5-19E9-4571-B523-F5B122CA674E}" dt="2023-05-02T03:52:19.149" v="339" actId="14100"/>
-          <ac:spMkLst>
-            <pc:docMk/>
-            <pc:sldMk cId="330743462" sldId="260"/>
-            <ac:spMk id="5" creationId="{CD01A572-1A49-BE4A-60BA-3B4C4F9F2EFA}"/>
-          </ac:spMkLst>
-        </pc:spChg>
-        <pc:spChg chg="mod">
-          <ac:chgData name="Shuo Chen (MSR)" userId="2e7ebbab-928d-4621-b055-ba5ecd87af3f" providerId="ADAL" clId="{406DA4F5-19E9-4571-B523-F5B122CA674E}" dt="2023-05-02T03:52:22.879" v="340" actId="1076"/>
-          <ac:spMkLst>
-            <pc:docMk/>
-            <pc:sldMk cId="330743462" sldId="260"/>
-            <ac:spMk id="8" creationId="{4A8C95F2-0922-B5EC-7EA9-32B045D29727}"/>
-          </ac:spMkLst>
-        </pc:spChg>
-        <pc:picChg chg="add mod">
-          <ac:chgData name="Shuo Chen (MSR)" userId="2e7ebbab-928d-4621-b055-ba5ecd87af3f" providerId="ADAL" clId="{406DA4F5-19E9-4571-B523-F5B122CA674E}" dt="2023-05-02T03:53:51.789" v="341"/>
-          <ac:picMkLst>
-            <pc:docMk/>
-            <pc:sldMk cId="330743462" sldId="260"/>
-            <ac:picMk id="6" creationId="{3CE23FF5-3F32-C86A-09BD-A5D119E5565C}"/>
-          </ac:picMkLst>
-        </pc:picChg>
-      </pc:sldChg>
-      <pc:sldChg chg="addSp delSp modSp mod modTransition modAnim modNotesTx">
-        <pc:chgData name="Shuo Chen (MSR)" userId="2e7ebbab-928d-4621-b055-ba5ecd87af3f" providerId="ADAL" clId="{406DA4F5-19E9-4571-B523-F5B122CA674E}" dt="2023-05-02T04:03:34.186" v="356"/>
-        <pc:sldMkLst>
-          <pc:docMk/>
-          <pc:sldMk cId="2857909126" sldId="261"/>
-        </pc:sldMkLst>
-        <pc:spChg chg="mod">
-          <ac:chgData name="Shuo Chen (MSR)" userId="2e7ebbab-928d-4621-b055-ba5ecd87af3f" providerId="ADAL" clId="{406DA4F5-19E9-4571-B523-F5B122CA674E}" dt="2023-05-02T03:57:07.008" v="346" actId="20577"/>
-          <ac:spMkLst>
-            <pc:docMk/>
-            <pc:sldMk cId="2857909126" sldId="261"/>
-            <ac:spMk id="3" creationId="{AE4522A9-1EA2-E38E-B18E-AAE0F478F6AD}"/>
-          </ac:spMkLst>
-        </pc:spChg>
-        <pc:spChg chg="mod">
-          <ac:chgData name="Shuo Chen (MSR)" userId="2e7ebbab-928d-4621-b055-ba5ecd87af3f" providerId="ADAL" clId="{406DA4F5-19E9-4571-B523-F5B122CA674E}" dt="2023-05-02T03:56:03.915" v="342" actId="1076"/>
-          <ac:spMkLst>
-            <pc:docMk/>
-            <pc:sldMk cId="2857909126" sldId="261"/>
-            <ac:spMk id="42" creationId="{94FBEADE-78D3-B466-E24A-366F6C0BD87D}"/>
-          </ac:spMkLst>
-        </pc:spChg>
-        <pc:picChg chg="add del mod">
-          <ac:chgData name="Shuo Chen (MSR)" userId="2e7ebbab-928d-4621-b055-ba5ecd87af3f" providerId="ADAL" clId="{406DA4F5-19E9-4571-B523-F5B122CA674E}" dt="2023-05-02T04:02:03.176" v="355"/>
-          <ac:picMkLst>
-            <pc:docMk/>
-            <pc:sldMk cId="2857909126" sldId="261"/>
-            <ac:picMk id="44" creationId="{BA299895-B597-CB1D-641F-D5467C5661C2}"/>
-          </ac:picMkLst>
-        </pc:picChg>
-        <pc:picChg chg="add del mod ord">
-          <ac:chgData name="Shuo Chen (MSR)" userId="2e7ebbab-928d-4621-b055-ba5ecd87af3f" providerId="ADAL" clId="{406DA4F5-19E9-4571-B523-F5B122CA674E}" dt="2023-05-02T04:03:34.186" v="356"/>
-          <ac:picMkLst>
-            <pc:docMk/>
-            <pc:sldMk cId="2857909126" sldId="261"/>
-            <ac:picMk id="47" creationId="{004B18D9-E49C-381F-31EE-4188306D6E18}"/>
-          </ac:picMkLst>
-        </pc:picChg>
-        <pc:picChg chg="add mod">
-          <ac:chgData name="Shuo Chen (MSR)" userId="2e7ebbab-928d-4621-b055-ba5ecd87af3f" providerId="ADAL" clId="{406DA4F5-19E9-4571-B523-F5B122CA674E}" dt="2023-05-02T04:03:34.186" v="356"/>
-          <ac:picMkLst>
-            <pc:docMk/>
-            <pc:sldMk cId="2857909126" sldId="261"/>
-            <ac:picMk id="48" creationId="{AFA2B895-5506-2D94-6B41-CBD310FD372E}"/>
-          </ac:picMkLst>
-        </pc:picChg>
-      </pc:sldChg>
-      <pc:sldChg chg="add del modTransition">
-        <pc:chgData name="Shuo Chen (MSR)" userId="2e7ebbab-928d-4621-b055-ba5ecd87af3f" providerId="ADAL" clId="{406DA4F5-19E9-4571-B523-F5B122CA674E}" dt="2023-05-02T04:34:32.033" v="1320"/>
-        <pc:sldMkLst>
-          <pc:docMk/>
-          <pc:sldMk cId="3732450724" sldId="262"/>
-        </pc:sldMkLst>
-      </pc:sldChg>
-      <pc:sldChg chg="addSp modSp ord modTransition modAnim">
-        <pc:chgData name="Shuo Chen (MSR)" userId="2e7ebbab-928d-4621-b055-ba5ecd87af3f" providerId="ADAL" clId="{406DA4F5-19E9-4571-B523-F5B122CA674E}" dt="2023-05-02T15:27:01.911" v="1388"/>
-        <pc:sldMkLst>
-          <pc:docMk/>
-          <pc:sldMk cId="309724048" sldId="263"/>
-        </pc:sldMkLst>
-        <pc:spChg chg="mod">
-          <ac:chgData name="Shuo Chen (MSR)" userId="2e7ebbab-928d-4621-b055-ba5ecd87af3f" providerId="ADAL" clId="{406DA4F5-19E9-4571-B523-F5B122CA674E}" dt="2023-05-02T04:04:48.778" v="358" actId="20577"/>
-          <ac:spMkLst>
-            <pc:docMk/>
-            <pc:sldMk cId="309724048" sldId="263"/>
-            <ac:spMk id="2" creationId="{BDCEF694-3D4D-86E8-7876-C7A5E692451F}"/>
-          </ac:spMkLst>
-        </pc:spChg>
-        <pc:picChg chg="add mod">
-          <ac:chgData name="Shuo Chen (MSR)" userId="2e7ebbab-928d-4621-b055-ba5ecd87af3f" providerId="ADAL" clId="{406DA4F5-19E9-4571-B523-F5B122CA674E}" dt="2023-05-02T03:38:40.906" v="251"/>
-          <ac:picMkLst>
-            <pc:docMk/>
-            <pc:sldMk cId="309724048" sldId="263"/>
-            <ac:picMk id="5" creationId="{F6B1D6D8-C3D9-3068-A3CC-16ADE426735C}"/>
-          </ac:picMkLst>
-        </pc:picChg>
-      </pc:sldChg>
-      <pc:sldChg chg="addSp modSp del mod modNotesTx">
-        <pc:chgData name="Shuo Chen (MSR)" userId="2e7ebbab-928d-4621-b055-ba5ecd87af3f" providerId="ADAL" clId="{406DA4F5-19E9-4571-B523-F5B122CA674E}" dt="2023-05-02T15:35:42.576" v="1407" actId="47"/>
-        <pc:sldMkLst>
-          <pc:docMk/>
-          <pc:sldMk cId="2643142849" sldId="264"/>
-        </pc:sldMkLst>
-        <pc:spChg chg="mod">
-          <ac:chgData name="Shuo Chen (MSR)" userId="2e7ebbab-928d-4621-b055-ba5ecd87af3f" providerId="ADAL" clId="{406DA4F5-19E9-4571-B523-F5B122CA674E}" dt="2023-05-02T15:33:09.409" v="1398" actId="1076"/>
-          <ac:spMkLst>
-            <pc:docMk/>
-            <pc:sldMk cId="2643142849" sldId="264"/>
-            <ac:spMk id="3" creationId="{D6F01BF1-DB64-FF52-FA05-58572F6946FC}"/>
-          </ac:spMkLst>
-        </pc:spChg>
-        <pc:spChg chg="add mod">
-          <ac:chgData name="Shuo Chen (MSR)" userId="2e7ebbab-928d-4621-b055-ba5ecd87af3f" providerId="ADAL" clId="{406DA4F5-19E9-4571-B523-F5B122CA674E}" dt="2023-05-02T15:33:33.433" v="1403" actId="1076"/>
-          <ac:spMkLst>
-            <pc:docMk/>
-            <pc:sldMk cId="2643142849" sldId="264"/>
-            <ac:spMk id="7" creationId="{11CD7742-8D0E-F117-256B-F0E12B2C3904}"/>
-          </ac:spMkLst>
-        </pc:spChg>
-      </pc:sldChg>
-      <pc:sldChg chg="addSp delSp modSp mod modTransition delAnim modAnim modNotesTx">
-        <pc:chgData name="Shuo Chen (MSR)" userId="2e7ebbab-928d-4621-b055-ba5ecd87af3f" providerId="ADAL" clId="{406DA4F5-19E9-4571-B523-F5B122CA674E}" dt="2023-05-02T16:01:35.073" v="1526"/>
-        <pc:sldMkLst>
-          <pc:docMk/>
-          <pc:sldMk cId="3917931094" sldId="265"/>
-        </pc:sldMkLst>
-        <pc:picChg chg="add del mod">
-          <ac:chgData name="Shuo Chen (MSR)" userId="2e7ebbab-928d-4621-b055-ba5ecd87af3f" providerId="ADAL" clId="{406DA4F5-19E9-4571-B523-F5B122CA674E}" dt="2023-05-02T04:43:32.752" v="1322" actId="478"/>
-          <ac:picMkLst>
-            <pc:docMk/>
-            <pc:sldMk cId="3917931094" sldId="265"/>
-            <ac:picMk id="3" creationId="{7831E6AD-4403-D6AC-42C2-92C425D22E81}"/>
-          </ac:picMkLst>
-        </pc:picChg>
-        <pc:picChg chg="add del mod">
-          <ac:chgData name="Shuo Chen (MSR)" userId="2e7ebbab-928d-4621-b055-ba5ecd87af3f" providerId="ADAL" clId="{406DA4F5-19E9-4571-B523-F5B122CA674E}" dt="2023-05-02T16:00:39.556" v="1525"/>
-          <ac:picMkLst>
-            <pc:docMk/>
-            <pc:sldMk cId="3917931094" sldId="265"/>
-            <ac:picMk id="29" creationId="{D1BD6ABB-392F-14E7-AEC2-683BD85F599E}"/>
-          </ac:picMkLst>
-        </pc:picChg>
-        <pc:picChg chg="add del mod ord">
-          <ac:chgData name="Shuo Chen (MSR)" userId="2e7ebbab-928d-4621-b055-ba5ecd87af3f" providerId="ADAL" clId="{406DA4F5-19E9-4571-B523-F5B122CA674E}" dt="2023-05-02T16:01:35.073" v="1526"/>
-          <ac:picMkLst>
-            <pc:docMk/>
-            <pc:sldMk cId="3917931094" sldId="265"/>
-            <ac:picMk id="32" creationId="{DEEAD0C3-E15B-84AB-683F-F1D076015377}"/>
-          </ac:picMkLst>
-        </pc:picChg>
-        <pc:picChg chg="add mod">
-          <ac:chgData name="Shuo Chen (MSR)" userId="2e7ebbab-928d-4621-b055-ba5ecd87af3f" providerId="ADAL" clId="{406DA4F5-19E9-4571-B523-F5B122CA674E}" dt="2023-05-02T16:01:35.073" v="1526"/>
-          <ac:picMkLst>
-            <pc:docMk/>
-            <pc:sldMk cId="3917931094" sldId="265"/>
-            <ac:picMk id="33" creationId="{E220BB00-D01C-ABD8-7369-BEC9E9D736B7}"/>
-          </ac:picMkLst>
-        </pc:picChg>
-      </pc:sldChg>
-      <pc:sldChg chg="addSp modSp mod modTransition modAnim modNotesTx">
-        <pc:chgData name="Shuo Chen (MSR)" userId="2e7ebbab-928d-4621-b055-ba5ecd87af3f" providerId="ADAL" clId="{406DA4F5-19E9-4571-B523-F5B122CA674E}" dt="2023-05-02T16:37:36.890" v="1685" actId="21"/>
-        <pc:sldMkLst>
-          <pc:docMk/>
-          <pc:sldMk cId="3928553163" sldId="266"/>
-        </pc:sldMkLst>
-        <pc:spChg chg="mod">
-          <ac:chgData name="Shuo Chen (MSR)" userId="2e7ebbab-928d-4621-b055-ba5ecd87af3f" providerId="ADAL" clId="{406DA4F5-19E9-4571-B523-F5B122CA674E}" dt="2023-05-02T16:37:36.890" v="1685" actId="21"/>
-          <ac:spMkLst>
-            <pc:docMk/>
-            <pc:sldMk cId="3928553163" sldId="266"/>
-            <ac:spMk id="3" creationId="{D4A68C14-C764-09AB-2564-DC14E83133A0}"/>
-          </ac:spMkLst>
-        </pc:spChg>
-        <pc:picChg chg="add mod">
-          <ac:chgData name="Shuo Chen (MSR)" userId="2e7ebbab-928d-4621-b055-ba5ecd87af3f" providerId="ADAL" clId="{406DA4F5-19E9-4571-B523-F5B122CA674E}" dt="2023-05-02T04:50:00.378" v="1330"/>
-          <ac:picMkLst>
-            <pc:docMk/>
-            <pc:sldMk cId="3928553163" sldId="266"/>
-            <ac:picMk id="5" creationId="{B897D662-A55E-C218-9592-E3E75AD72866}"/>
-          </ac:picMkLst>
-        </pc:picChg>
-      </pc:sldChg>
-      <pc:sldChg chg="addSp delSp modSp mod modTransition modAnim modNotesTx">
-        <pc:chgData name="Shuo Chen (MSR)" userId="2e7ebbab-928d-4621-b055-ba5ecd87af3f" providerId="ADAL" clId="{406DA4F5-19E9-4571-B523-F5B122CA674E}" dt="2023-05-02T16:07:07.491" v="1547"/>
-        <pc:sldMkLst>
-          <pc:docMk/>
-          <pc:sldMk cId="2316422460" sldId="267"/>
-        </pc:sldMkLst>
-        <pc:spChg chg="mod">
-          <ac:chgData name="Shuo Chen (MSR)" userId="2e7ebbab-928d-4621-b055-ba5ecd87af3f" providerId="ADAL" clId="{406DA4F5-19E9-4571-B523-F5B122CA674E}" dt="2023-05-02T16:05:04.360" v="1542" actId="1076"/>
-          <ac:spMkLst>
-            <pc:docMk/>
-            <pc:sldMk cId="2316422460" sldId="267"/>
-            <ac:spMk id="11" creationId="{DF047735-531D-D8B9-306F-4D001519F6F7}"/>
-          </ac:spMkLst>
-        </pc:spChg>
-        <pc:spChg chg="mod">
-          <ac:chgData name="Shuo Chen (MSR)" userId="2e7ebbab-928d-4621-b055-ba5ecd87af3f" providerId="ADAL" clId="{406DA4F5-19E9-4571-B523-F5B122CA674E}" dt="2023-05-02T16:05:12.019" v="1543" actId="1076"/>
-          <ac:spMkLst>
-            <pc:docMk/>
-            <pc:sldMk cId="2316422460" sldId="267"/>
-            <ac:spMk id="17" creationId="{D65817DE-D685-89B0-9DC9-7F154E79D8A8}"/>
-          </ac:spMkLst>
-        </pc:spChg>
-        <pc:spChg chg="add del mod">
-          <ac:chgData name="Shuo Chen (MSR)" userId="2e7ebbab-928d-4621-b055-ba5ecd87af3f" providerId="ADAL" clId="{406DA4F5-19E9-4571-B523-F5B122CA674E}" dt="2023-05-02T16:04:58.746" v="1541" actId="478"/>
-          <ac:spMkLst>
-            <pc:docMk/>
-            <pc:sldMk cId="2316422460" sldId="267"/>
-            <ac:spMk id="27" creationId="{8A4978E5-89BD-AA2A-9EF8-460CD0F5407C}"/>
-          </ac:spMkLst>
-        </pc:spChg>
-        <pc:picChg chg="add del mod">
-          <ac:chgData name="Shuo Chen (MSR)" userId="2e7ebbab-928d-4621-b055-ba5ecd87af3f" providerId="ADAL" clId="{406DA4F5-19E9-4571-B523-F5B122CA674E}" dt="2023-05-02T16:05:57.423" v="1546"/>
-          <ac:picMkLst>
-            <pc:docMk/>
-            <pc:sldMk cId="2316422460" sldId="267"/>
-            <ac:picMk id="24" creationId="{070D2B14-B7B1-48FA-ED38-A9FF4337DF02}"/>
-          </ac:picMkLst>
-        </pc:picChg>
-        <pc:picChg chg="add del mod ord">
-          <ac:chgData name="Shuo Chen (MSR)" userId="2e7ebbab-928d-4621-b055-ba5ecd87af3f" providerId="ADAL" clId="{406DA4F5-19E9-4571-B523-F5B122CA674E}" dt="2023-05-02T16:07:07.491" v="1547"/>
-          <ac:picMkLst>
-            <pc:docMk/>
-            <pc:sldMk cId="2316422460" sldId="267"/>
-            <ac:picMk id="30" creationId="{0584EEEC-DEF5-8AE7-EAA6-8C006DB2E60E}"/>
-          </ac:picMkLst>
-        </pc:picChg>
-        <pc:picChg chg="add mod">
-          <ac:chgData name="Shuo Chen (MSR)" userId="2e7ebbab-928d-4621-b055-ba5ecd87af3f" providerId="ADAL" clId="{406DA4F5-19E9-4571-B523-F5B122CA674E}" dt="2023-05-02T16:07:07.491" v="1547"/>
-          <ac:picMkLst>
-            <pc:docMk/>
-            <pc:sldMk cId="2316422460" sldId="267"/>
-            <ac:picMk id="31" creationId="{F0416ED9-244E-4312-F428-0C0E423992D1}"/>
-          </ac:picMkLst>
-        </pc:picChg>
-      </pc:sldChg>
-      <pc:sldChg chg="modSp del mod">
-        <pc:chgData name="Shuo Chen (MSR)" userId="2e7ebbab-928d-4621-b055-ba5ecd87af3f" providerId="ADAL" clId="{406DA4F5-19E9-4571-B523-F5B122CA674E}" dt="2023-05-02T04:58:03.638" v="1345" actId="2696"/>
-        <pc:sldMkLst>
-          <pc:docMk/>
-          <pc:sldMk cId="3234405172" sldId="268"/>
-        </pc:sldMkLst>
-        <pc:spChg chg="mod">
-          <ac:chgData name="Shuo Chen (MSR)" userId="2e7ebbab-928d-4621-b055-ba5ecd87af3f" providerId="ADAL" clId="{406DA4F5-19E9-4571-B523-F5B122CA674E}" dt="2023-05-02T04:51:56.677" v="1332" actId="20577"/>
-          <ac:spMkLst>
-            <pc:docMk/>
-            <pc:sldMk cId="3234405172" sldId="268"/>
-            <ac:spMk id="24" creationId="{8E5678CA-FF5D-5D96-6754-78E15597BE04}"/>
-          </ac:spMkLst>
-        </pc:spChg>
-      </pc:sldChg>
-      <pc:sldChg chg="addSp delSp modSp mod modTransition delAnim modAnim">
-        <pc:chgData name="Shuo Chen (MSR)" userId="2e7ebbab-928d-4621-b055-ba5ecd87af3f" providerId="ADAL" clId="{406DA4F5-19E9-4571-B523-F5B122CA674E}" dt="2023-05-02T05:03:50.505" v="1366"/>
-        <pc:sldMkLst>
-          <pc:docMk/>
-          <pc:sldMk cId="1884591052" sldId="270"/>
-        </pc:sldMkLst>
-        <pc:picChg chg="add del mod">
-          <ac:chgData name="Shuo Chen (MSR)" userId="2e7ebbab-928d-4621-b055-ba5ecd87af3f" providerId="ADAL" clId="{406DA4F5-19E9-4571-B523-F5B122CA674E}" dt="2023-05-02T05:00:10.978" v="1358" actId="478"/>
-          <ac:picMkLst>
-            <pc:docMk/>
-            <pc:sldMk cId="1884591052" sldId="270"/>
-            <ac:picMk id="16" creationId="{14D39B66-DA2D-CA87-6B62-9C5FFB483FAB}"/>
-          </ac:picMkLst>
-        </pc:picChg>
-        <pc:picChg chg="add del mod">
-          <ac:chgData name="Shuo Chen (MSR)" userId="2e7ebbab-928d-4621-b055-ba5ecd87af3f" providerId="ADAL" clId="{406DA4F5-19E9-4571-B523-F5B122CA674E}" dt="2023-05-02T05:01:56.305" v="1362"/>
-          <ac:picMkLst>
-            <pc:docMk/>
-            <pc:sldMk cId="1884591052" sldId="270"/>
-            <ac:picMk id="21" creationId="{6B7C5472-2011-7D6D-BF33-AC00EE99CA35}"/>
-          </ac:picMkLst>
-        </pc:picChg>
-        <pc:picChg chg="add del mod ord">
-          <ac:chgData name="Shuo Chen (MSR)" userId="2e7ebbab-928d-4621-b055-ba5ecd87af3f" providerId="ADAL" clId="{406DA4F5-19E9-4571-B523-F5B122CA674E}" dt="2023-05-02T05:02:51.357" v="1363"/>
-          <ac:picMkLst>
-            <pc:docMk/>
-            <pc:sldMk cId="1884591052" sldId="270"/>
-            <ac:picMk id="25" creationId="{BC585BD7-FA46-847D-CCBC-BA77DA9E48FF}"/>
-          </ac:picMkLst>
-        </pc:picChg>
-        <pc:picChg chg="add del mod">
-          <ac:chgData name="Shuo Chen (MSR)" userId="2e7ebbab-928d-4621-b055-ba5ecd87af3f" providerId="ADAL" clId="{406DA4F5-19E9-4571-B523-F5B122CA674E}" dt="2023-05-02T05:02:56.311" v="1365"/>
-          <ac:picMkLst>
-            <pc:docMk/>
-            <pc:sldMk cId="1884591052" sldId="270"/>
-            <ac:picMk id="26" creationId="{BB713DF9-1A2E-26C6-7008-6230AE1D76B9}"/>
-          </ac:picMkLst>
-        </pc:picChg>
-        <pc:picChg chg="add del mod ord">
-          <ac:chgData name="Shuo Chen (MSR)" userId="2e7ebbab-928d-4621-b055-ba5ecd87af3f" providerId="ADAL" clId="{406DA4F5-19E9-4571-B523-F5B122CA674E}" dt="2023-05-02T05:03:50.505" v="1366"/>
-          <ac:picMkLst>
-            <pc:docMk/>
-            <pc:sldMk cId="1884591052" sldId="270"/>
-            <ac:picMk id="29" creationId="{F318E4E4-48A1-1D04-3239-306B2952113B}"/>
-          </ac:picMkLst>
-        </pc:picChg>
-        <pc:picChg chg="add mod">
-          <ac:chgData name="Shuo Chen (MSR)" userId="2e7ebbab-928d-4621-b055-ba5ecd87af3f" providerId="ADAL" clId="{406DA4F5-19E9-4571-B523-F5B122CA674E}" dt="2023-05-02T05:03:50.505" v="1366"/>
-          <ac:picMkLst>
-            <pc:docMk/>
-            <pc:sldMk cId="1884591052" sldId="270"/>
-            <ac:picMk id="30" creationId="{BAEFDA04-48FD-8FEA-7090-2D4A26646615}"/>
-          </ac:picMkLst>
-        </pc:picChg>
-      </pc:sldChg>
-      <pc:sldChg chg="addSp delSp modSp mod modTransition modAnim modNotesTx">
-        <pc:chgData name="Shuo Chen (MSR)" userId="2e7ebbab-928d-4621-b055-ba5ecd87af3f" providerId="ADAL" clId="{406DA4F5-19E9-4571-B523-F5B122CA674E}" dt="2023-05-02T15:55:26.998" v="1507"/>
-        <pc:sldMkLst>
-          <pc:docMk/>
-          <pc:sldMk cId="128444667" sldId="272"/>
-        </pc:sldMkLst>
-        <pc:picChg chg="add del mod">
-          <ac:chgData name="Shuo Chen (MSR)" userId="2e7ebbab-928d-4621-b055-ba5ecd87af3f" providerId="ADAL" clId="{406DA4F5-19E9-4571-B523-F5B122CA674E}" dt="2023-05-02T15:54:38.178" v="1503"/>
-          <ac:picMkLst>
-            <pc:docMk/>
-            <pc:sldMk cId="128444667" sldId="272"/>
-            <ac:picMk id="6" creationId="{B7E73127-741A-3B89-AA6F-41BD9AFF64FC}"/>
-          </ac:picMkLst>
-        </pc:picChg>
-        <pc:picChg chg="add del mod ord">
-          <ac:chgData name="Shuo Chen (MSR)" userId="2e7ebbab-928d-4621-b055-ba5ecd87af3f" providerId="ADAL" clId="{406DA4F5-19E9-4571-B523-F5B122CA674E}" dt="2023-05-02T15:54:54.520" v="1504"/>
-          <ac:picMkLst>
-            <pc:docMk/>
-            <pc:sldMk cId="128444667" sldId="272"/>
-            <ac:picMk id="9" creationId="{D8C61F0A-C30F-38CE-8AD1-DEE944D568E0}"/>
-          </ac:picMkLst>
-        </pc:picChg>
-        <pc:picChg chg="add del mod">
-          <ac:chgData name="Shuo Chen (MSR)" userId="2e7ebbab-928d-4621-b055-ba5ecd87af3f" providerId="ADAL" clId="{406DA4F5-19E9-4571-B523-F5B122CA674E}" dt="2023-05-02T15:54:56.343" v="1506"/>
-          <ac:picMkLst>
-            <pc:docMk/>
-            <pc:sldMk cId="128444667" sldId="272"/>
-            <ac:picMk id="10" creationId="{6E8FA43D-FABC-D524-C432-027878DA76B2}"/>
-          </ac:picMkLst>
-        </pc:picChg>
-        <pc:picChg chg="add del mod ord">
-          <ac:chgData name="Shuo Chen (MSR)" userId="2e7ebbab-928d-4621-b055-ba5ecd87af3f" providerId="ADAL" clId="{406DA4F5-19E9-4571-B523-F5B122CA674E}" dt="2023-05-02T15:55:26.998" v="1507"/>
-          <ac:picMkLst>
-            <pc:docMk/>
-            <pc:sldMk cId="128444667" sldId="272"/>
-            <ac:picMk id="13" creationId="{FDA51E7C-FADF-136B-884A-AFC578E18078}"/>
-          </ac:picMkLst>
-        </pc:picChg>
-        <pc:picChg chg="add mod">
-          <ac:chgData name="Shuo Chen (MSR)" userId="2e7ebbab-928d-4621-b055-ba5ecd87af3f" providerId="ADAL" clId="{406DA4F5-19E9-4571-B523-F5B122CA674E}" dt="2023-05-02T15:55:26.998" v="1507"/>
-          <ac:picMkLst>
-            <pc:docMk/>
-            <pc:sldMk cId="128444667" sldId="272"/>
-            <ac:picMk id="14" creationId="{C1FA2AF4-51E5-7425-A151-C9BDAB124229}"/>
-          </ac:picMkLst>
-        </pc:picChg>
-      </pc:sldChg>
-      <pc:sldChg chg="addSp modSp modTransition modAnim">
-        <pc:chgData name="Shuo Chen (MSR)" userId="2e7ebbab-928d-4621-b055-ba5ecd87af3f" providerId="ADAL" clId="{406DA4F5-19E9-4571-B523-F5B122CA674E}" dt="2023-05-02T15:50:02.360" v="1493"/>
-        <pc:sldMkLst>
-          <pc:docMk/>
-          <pc:sldMk cId="2103635629" sldId="274"/>
-        </pc:sldMkLst>
-        <pc:picChg chg="add mod">
-          <ac:chgData name="Shuo Chen (MSR)" userId="2e7ebbab-928d-4621-b055-ba5ecd87af3f" providerId="ADAL" clId="{406DA4F5-19E9-4571-B523-F5B122CA674E}" dt="2023-05-02T05:05:10.715" v="1367"/>
-          <ac:picMkLst>
-            <pc:docMk/>
-            <pc:sldMk cId="2103635629" sldId="274"/>
-            <ac:picMk id="9" creationId="{2FFD6CF6-5AD4-3A68-54CC-EFB936CD1B09}"/>
-          </ac:picMkLst>
-        </pc:picChg>
-      </pc:sldChg>
-      <pc:sldChg chg="modSp add mod modTransition">
-        <pc:chgData name="Shuo Chen (MSR)" userId="2e7ebbab-928d-4621-b055-ba5ecd87af3f" providerId="ADAL" clId="{406DA4F5-19E9-4571-B523-F5B122CA674E}" dt="2023-05-02T15:39:45.012" v="1443" actId="6549"/>
-        <pc:sldMkLst>
-          <pc:docMk/>
-          <pc:sldMk cId="4109316617" sldId="286"/>
-        </pc:sldMkLst>
-        <pc:spChg chg="mod">
-          <ac:chgData name="Shuo Chen (MSR)" userId="2e7ebbab-928d-4621-b055-ba5ecd87af3f" providerId="ADAL" clId="{406DA4F5-19E9-4571-B523-F5B122CA674E}" dt="2023-05-02T15:39:45.012" v="1443" actId="6549"/>
-          <ac:spMkLst>
-            <pc:docMk/>
-            <pc:sldMk cId="4109316617" sldId="286"/>
-            <ac:spMk id="2" creationId="{F02D85EE-D8D5-568B-6491-68C504D82FE3}"/>
-          </ac:spMkLst>
-        </pc:spChg>
-        <pc:spChg chg="mod">
-          <ac:chgData name="Shuo Chen (MSR)" userId="2e7ebbab-928d-4621-b055-ba5ecd87af3f" providerId="ADAL" clId="{406DA4F5-19E9-4571-B523-F5B122CA674E}" dt="2023-05-02T15:37:04.922" v="1411" actId="2711"/>
-          <ac:spMkLst>
-            <pc:docMk/>
-            <pc:sldMk cId="4109316617" sldId="286"/>
-            <ac:spMk id="3" creationId="{6D00613C-31F8-4DDB-BE33-F36DDB99BB7E}"/>
-          </ac:spMkLst>
-        </pc:spChg>
-        <pc:spChg chg="mod">
-          <ac:chgData name="Shuo Chen (MSR)" userId="2e7ebbab-928d-4621-b055-ba5ecd87af3f" providerId="ADAL" clId="{406DA4F5-19E9-4571-B523-F5B122CA674E}" dt="2023-05-02T15:39:10.342" v="1418" actId="14100"/>
-          <ac:spMkLst>
-            <pc:docMk/>
-            <pc:sldMk cId="4109316617" sldId="286"/>
-            <ac:spMk id="7" creationId="{F06E78A5-0464-DDEF-B24F-60D30BC29E31}"/>
-          </ac:spMkLst>
-        </pc:spChg>
-        <pc:spChg chg="mod">
-          <ac:chgData name="Shuo Chen (MSR)" userId="2e7ebbab-928d-4621-b055-ba5ecd87af3f" providerId="ADAL" clId="{406DA4F5-19E9-4571-B523-F5B122CA674E}" dt="2023-05-02T15:37:50.779" v="1416" actId="1076"/>
-          <ac:spMkLst>
-            <pc:docMk/>
-            <pc:sldMk cId="4109316617" sldId="286"/>
-            <ac:spMk id="12" creationId="{4174AF05-A298-B583-8CB2-130B2631F2B8}"/>
-          </ac:spMkLst>
-        </pc:spChg>
-        <pc:spChg chg="mod">
-          <ac:chgData name="Shuo Chen (MSR)" userId="2e7ebbab-928d-4621-b055-ba5ecd87af3f" providerId="ADAL" clId="{406DA4F5-19E9-4571-B523-F5B122CA674E}" dt="2023-05-02T15:37:54.398" v="1417" actId="2711"/>
-          <ac:spMkLst>
-            <pc:docMk/>
-            <pc:sldMk cId="4109316617" sldId="286"/>
-            <ac:spMk id="21" creationId="{119490B3-12CB-C998-71AE-F1314304D39D}"/>
-          </ac:spMkLst>
-        </pc:spChg>
-        <pc:spChg chg="mod">
-          <ac:chgData name="Shuo Chen (MSR)" userId="2e7ebbab-928d-4621-b055-ba5ecd87af3f" providerId="ADAL" clId="{406DA4F5-19E9-4571-B523-F5B122CA674E}" dt="2023-05-02T15:37:37.026" v="1414" actId="1076"/>
-          <ac:spMkLst>
-            <pc:docMk/>
-            <pc:sldMk cId="4109316617" sldId="286"/>
-            <ac:spMk id="25" creationId="{B47D2CF2-60AB-412D-B1F9-9304D0D7FC5E}"/>
-          </ac:spMkLst>
-        </pc:spChg>
-      </pc:sldChg>
-      <pc:sldChg chg="addSp delSp modSp add mod modTransition">
-        <pc:chgData name="Shuo Chen (MSR)" userId="2e7ebbab-928d-4621-b055-ba5ecd87af3f" providerId="ADAL" clId="{406DA4F5-19E9-4571-B523-F5B122CA674E}" dt="2023-05-02T15:47:05.274" v="1487" actId="1076"/>
-        <pc:sldMkLst>
-          <pc:docMk/>
-          <pc:sldMk cId="2103549427" sldId="287"/>
-        </pc:sldMkLst>
-        <pc:spChg chg="del">
-          <ac:chgData name="Shuo Chen (MSR)" userId="2e7ebbab-928d-4621-b055-ba5ecd87af3f" providerId="ADAL" clId="{406DA4F5-19E9-4571-B523-F5B122CA674E}" dt="2023-05-02T15:39:53.258" v="1444" actId="478"/>
-          <ac:spMkLst>
-            <pc:docMk/>
-            <pc:sldMk cId="2103549427" sldId="287"/>
-            <ac:spMk id="2" creationId="{F02D85EE-D8D5-568B-6491-68C504D82FE3}"/>
-          </ac:spMkLst>
-        </pc:spChg>
-        <pc:spChg chg="mod">
-          <ac:chgData name="Shuo Chen (MSR)" userId="2e7ebbab-928d-4621-b055-ba5ecd87af3f" providerId="ADAL" clId="{406DA4F5-19E9-4571-B523-F5B122CA674E}" dt="2023-05-02T15:44:34.691" v="1472" actId="20577"/>
-          <ac:spMkLst>
-            <pc:docMk/>
-            <pc:sldMk cId="2103549427" sldId="287"/>
-            <ac:spMk id="3" creationId="{6D00613C-31F8-4DDB-BE33-F36DDB99BB7E}"/>
-          </ac:spMkLst>
-        </pc:spChg>
-        <pc:spChg chg="mod">
-          <ac:chgData name="Shuo Chen (MSR)" userId="2e7ebbab-928d-4621-b055-ba5ecd87af3f" providerId="ADAL" clId="{406DA4F5-19E9-4571-B523-F5B122CA674E}" dt="2023-05-02T15:44:51.636" v="1473" actId="1076"/>
-          <ac:spMkLst>
-            <pc:docMk/>
-            <pc:sldMk cId="2103549427" sldId="287"/>
-            <ac:spMk id="6" creationId="{3FD8FB2A-F9C1-FF6D-A398-0F3920401DB0}"/>
-          </ac:spMkLst>
-        </pc:spChg>
-        <pc:spChg chg="mod">
-          <ac:chgData name="Shuo Chen (MSR)" userId="2e7ebbab-928d-4621-b055-ba5ecd87af3f" providerId="ADAL" clId="{406DA4F5-19E9-4571-B523-F5B122CA674E}" dt="2023-05-02T15:45:31.784" v="1478" actId="1076"/>
-          <ac:spMkLst>
-            <pc:docMk/>
-            <pc:sldMk cId="2103549427" sldId="287"/>
-            <ac:spMk id="7" creationId="{0AFFECC6-8E25-C481-A072-3EC6FAED06EE}"/>
-          </ac:spMkLst>
-        </pc:spChg>
-        <pc:spChg chg="add del mod">
-          <ac:chgData name="Shuo Chen (MSR)" userId="2e7ebbab-928d-4621-b055-ba5ecd87af3f" providerId="ADAL" clId="{406DA4F5-19E9-4571-B523-F5B122CA674E}" dt="2023-05-02T15:39:56.969" v="1445" actId="478"/>
-          <ac:spMkLst>
-            <pc:docMk/>
-            <pc:sldMk cId="2103549427" sldId="287"/>
-            <ac:spMk id="11" creationId="{D4333C4D-BB36-2836-7B89-8E668EA4F1D9}"/>
-          </ac:spMkLst>
-        </pc:spChg>
-        <pc:spChg chg="add mod">
-          <ac:chgData name="Shuo Chen (MSR)" userId="2e7ebbab-928d-4621-b055-ba5ecd87af3f" providerId="ADAL" clId="{406DA4F5-19E9-4571-B523-F5B122CA674E}" dt="2023-05-02T15:40:01.847" v="1454" actId="20577"/>
-          <ac:spMkLst>
-            <pc:docMk/>
-            <pc:sldMk cId="2103549427" sldId="287"/>
-            <ac:spMk id="12" creationId="{F4E870EC-86E2-824E-07BB-A13287E158AC}"/>
-          </ac:spMkLst>
-        </pc:spChg>
-        <pc:spChg chg="mod">
-          <ac:chgData name="Shuo Chen (MSR)" userId="2e7ebbab-928d-4621-b055-ba5ecd87af3f" providerId="ADAL" clId="{406DA4F5-19E9-4571-B523-F5B122CA674E}" dt="2023-05-02T15:46:19.695" v="1479" actId="1076"/>
-          <ac:spMkLst>
-            <pc:docMk/>
-            <pc:sldMk cId="2103549427" sldId="287"/>
-            <ac:spMk id="13" creationId="{EA9C1A90-A136-F9DF-2E7F-10B5CF0718A0}"/>
-          </ac:spMkLst>
-        </pc:spChg>
-        <pc:spChg chg="mod">
-          <ac:chgData name="Shuo Chen (MSR)" userId="2e7ebbab-928d-4621-b055-ba5ecd87af3f" providerId="ADAL" clId="{406DA4F5-19E9-4571-B523-F5B122CA674E}" dt="2023-05-02T15:46:35.598" v="1481" actId="1076"/>
-          <ac:spMkLst>
-            <pc:docMk/>
-            <pc:sldMk cId="2103549427" sldId="287"/>
-            <ac:spMk id="15" creationId="{970B3837-4549-E8B2-35FC-002049AA31E4}"/>
-          </ac:spMkLst>
-        </pc:spChg>
-        <pc:spChg chg="mod">
-          <ac:chgData name="Shuo Chen (MSR)" userId="2e7ebbab-928d-4621-b055-ba5ecd87af3f" providerId="ADAL" clId="{406DA4F5-19E9-4571-B523-F5B122CA674E}" dt="2023-05-02T15:46:55.208" v="1485" actId="1076"/>
-          <ac:spMkLst>
-            <pc:docMk/>
-            <pc:sldMk cId="2103549427" sldId="287"/>
-            <ac:spMk id="16" creationId="{0AABE2B1-B714-253E-30ED-4C32BBCC5F57}"/>
-          </ac:spMkLst>
-        </pc:spChg>
-        <pc:spChg chg="mod">
-          <ac:chgData name="Shuo Chen (MSR)" userId="2e7ebbab-928d-4621-b055-ba5ecd87af3f" providerId="ADAL" clId="{406DA4F5-19E9-4571-B523-F5B122CA674E}" dt="2023-05-02T15:47:01.017" v="1486" actId="1076"/>
-          <ac:spMkLst>
-            <pc:docMk/>
-            <pc:sldMk cId="2103549427" sldId="287"/>
-            <ac:spMk id="17" creationId="{190C70E0-C7B7-9192-CA28-DD5948BAD2CE}"/>
-          </ac:spMkLst>
-        </pc:spChg>
-        <pc:picChg chg="mod">
-          <ac:chgData name="Shuo Chen (MSR)" userId="2e7ebbab-928d-4621-b055-ba5ecd87af3f" providerId="ADAL" clId="{406DA4F5-19E9-4571-B523-F5B122CA674E}" dt="2023-05-02T15:46:43.684" v="1484" actId="1076"/>
-          <ac:picMkLst>
-            <pc:docMk/>
-            <pc:sldMk cId="2103549427" sldId="287"/>
-            <ac:picMk id="10" creationId="{E6352778-3A24-EC47-F1C5-FA627AA085A5}"/>
-          </ac:picMkLst>
-        </pc:picChg>
-        <pc:picChg chg="mod">
-          <ac:chgData name="Shuo Chen (MSR)" userId="2e7ebbab-928d-4621-b055-ba5ecd87af3f" providerId="ADAL" clId="{406DA4F5-19E9-4571-B523-F5B122CA674E}" dt="2023-05-02T15:47:05.274" v="1487" actId="1076"/>
-          <ac:picMkLst>
-            <pc:docMk/>
-            <pc:sldMk cId="2103549427" sldId="287"/>
-            <ac:picMk id="23" creationId="{A5F73DB6-3300-844C-EB3C-1B6A546E2F91}"/>
-          </ac:picMkLst>
-        </pc:picChg>
-      </pc:sldChg>
-      <pc:sldChg chg="addSp modSp modTransition modAnim">
-        <pc:chgData name="Shuo Chen (MSR)" userId="2e7ebbab-928d-4621-b055-ba5ecd87af3f" providerId="ADAL" clId="{406DA4F5-19E9-4571-B523-F5B122CA674E}" dt="2023-05-02T16:44:10.211" v="1691"/>
-        <pc:sldMkLst>
-          <pc:docMk/>
-          <pc:sldMk cId="1220370174" sldId="288"/>
-        </pc:sldMkLst>
-        <pc:picChg chg="add mod">
-          <ac:chgData name="Shuo Chen (MSR)" userId="2e7ebbab-928d-4621-b055-ba5ecd87af3f" providerId="ADAL" clId="{406DA4F5-19E9-4571-B523-F5B122CA674E}" dt="2023-05-02T04:42:30.743" v="1321"/>
-          <ac:picMkLst>
-            <pc:docMk/>
-            <pc:sldMk cId="1220370174" sldId="288"/>
-            <ac:picMk id="5" creationId="{3D89BE40-DDFF-F41D-5625-4CB7BD49BA0C}"/>
-          </ac:picMkLst>
-        </pc:picChg>
-      </pc:sldChg>
-      <pc:sldChg chg="addSp delSp modSp mod modTransition delAnim modAnim modNotesTx">
-        <pc:chgData name="Shuo Chen (MSR)" userId="2e7ebbab-928d-4621-b055-ba5ecd87af3f" providerId="ADAL" clId="{406DA4F5-19E9-4571-B523-F5B122CA674E}" dt="2023-05-02T16:16:55.289" v="1648" actId="1076"/>
-        <pc:sldMkLst>
-          <pc:docMk/>
-          <pc:sldMk cId="1473077478" sldId="289"/>
-        </pc:sldMkLst>
-        <pc:spChg chg="mod">
-          <ac:chgData name="Shuo Chen (MSR)" userId="2e7ebbab-928d-4621-b055-ba5ecd87af3f" providerId="ADAL" clId="{406DA4F5-19E9-4571-B523-F5B122CA674E}" dt="2023-05-02T16:12:55.212" v="1579" actId="14100"/>
-          <ac:spMkLst>
-            <pc:docMk/>
-            <pc:sldMk cId="1473077478" sldId="289"/>
-            <ac:spMk id="3" creationId="{2C74E118-F88D-D5CE-DF9E-B409CBB2FB5F}"/>
-          </ac:spMkLst>
-        </pc:spChg>
-        <pc:spChg chg="mod">
-          <ac:chgData name="Shuo Chen (MSR)" userId="2e7ebbab-928d-4621-b055-ba5ecd87af3f" providerId="ADAL" clId="{406DA4F5-19E9-4571-B523-F5B122CA674E}" dt="2023-05-02T16:15:21.368" v="1606" actId="20577"/>
-          <ac:spMkLst>
-            <pc:docMk/>
-            <pc:sldMk cId="1473077478" sldId="289"/>
-            <ac:spMk id="8" creationId="{39F78D93-E895-ED46-5E6A-F7446949F032}"/>
-          </ac:spMkLst>
-        </pc:spChg>
-        <pc:spChg chg="add mod">
-          <ac:chgData name="Shuo Chen (MSR)" userId="2e7ebbab-928d-4621-b055-ba5ecd87af3f" providerId="ADAL" clId="{406DA4F5-19E9-4571-B523-F5B122CA674E}" dt="2023-05-02T16:16:05.448" v="1610" actId="14100"/>
-          <ac:spMkLst>
-            <pc:docMk/>
-            <pc:sldMk cId="1473077478" sldId="289"/>
-            <ac:spMk id="20" creationId="{EC922177-2E76-4B6F-873A-58AEE67B4398}"/>
-          </ac:spMkLst>
-        </pc:spChg>
-        <pc:spChg chg="add mod">
-          <ac:chgData name="Shuo Chen (MSR)" userId="2e7ebbab-928d-4621-b055-ba5ecd87af3f" providerId="ADAL" clId="{406DA4F5-19E9-4571-B523-F5B122CA674E}" dt="2023-05-02T16:16:55.289" v="1648" actId="1076"/>
-          <ac:spMkLst>
-            <pc:docMk/>
-            <pc:sldMk cId="1473077478" sldId="289"/>
-            <ac:spMk id="21" creationId="{AE9D56ED-5D79-8CBF-45C0-A439D8868236}"/>
-          </ac:spMkLst>
-        </pc:spChg>
-        <pc:spChg chg="del mod">
-          <ac:chgData name="Shuo Chen (MSR)" userId="2e7ebbab-928d-4621-b055-ba5ecd87af3f" providerId="ADAL" clId="{406DA4F5-19E9-4571-B523-F5B122CA674E}" dt="2023-05-02T16:11:27.489" v="1575" actId="478"/>
-          <ac:spMkLst>
-            <pc:docMk/>
-            <pc:sldMk cId="1473077478" sldId="289"/>
-            <ac:spMk id="28" creationId="{154EC11D-A1C2-6830-6CCB-1F7410CEC703}"/>
-          </ac:spMkLst>
-        </pc:spChg>
-        <pc:picChg chg="add del mod">
-          <ac:chgData name="Shuo Chen (MSR)" userId="2e7ebbab-928d-4621-b055-ba5ecd87af3f" providerId="ADAL" clId="{406DA4F5-19E9-4571-B523-F5B122CA674E}" dt="2023-05-02T04:48:00.479" v="1327" actId="478"/>
-          <ac:picMkLst>
-            <pc:docMk/>
-            <pc:sldMk cId="1473077478" sldId="289"/>
-            <ac:picMk id="5" creationId="{83EBB5E6-7E84-A232-5A13-8954865160D7}"/>
-          </ac:picMkLst>
-        </pc:picChg>
-        <pc:picChg chg="add del mod">
-          <ac:chgData name="Shuo Chen (MSR)" userId="2e7ebbab-928d-4621-b055-ba5ecd87af3f" providerId="ADAL" clId="{406DA4F5-19E9-4571-B523-F5B122CA674E}" dt="2023-05-02T16:13:39.155" v="1582"/>
-          <ac:picMkLst>
-            <pc:docMk/>
-            <pc:sldMk cId="1473077478" sldId="289"/>
-            <ac:picMk id="11" creationId="{46142408-B748-4FE9-DA76-3089AECBC42F}"/>
-          </ac:picMkLst>
-        </pc:picChg>
-        <pc:picChg chg="add del mod ord">
-          <ac:chgData name="Shuo Chen (MSR)" userId="2e7ebbab-928d-4621-b055-ba5ecd87af3f" providerId="ADAL" clId="{406DA4F5-19E9-4571-B523-F5B122CA674E}" dt="2023-05-02T16:14:30.088" v="1583"/>
-          <ac:picMkLst>
-            <pc:docMk/>
-            <pc:sldMk cId="1473077478" sldId="289"/>
-            <ac:picMk id="14" creationId="{A192A77F-B274-4644-EE88-F47CECB56061}"/>
-          </ac:picMkLst>
-        </pc:picChg>
-        <pc:picChg chg="add mod">
-          <ac:chgData name="Shuo Chen (MSR)" userId="2e7ebbab-928d-4621-b055-ba5ecd87af3f" providerId="ADAL" clId="{406DA4F5-19E9-4571-B523-F5B122CA674E}" dt="2023-05-02T16:14:30.088" v="1583"/>
-          <ac:picMkLst>
-            <pc:docMk/>
-            <pc:sldMk cId="1473077478" sldId="289"/>
-            <ac:picMk id="15" creationId="{6C2E11A1-D0FD-F3F6-3F0C-50C3C67D0FBA}"/>
-          </ac:picMkLst>
-        </pc:picChg>
-      </pc:sldChg>
-      <pc:sldChg chg="addSp delSp modSp mod delAnim modAnim">
-        <pc:chgData name="Shuo Chen (MSR)" userId="2e7ebbab-928d-4621-b055-ba5ecd87af3f" providerId="ADAL" clId="{406DA4F5-19E9-4571-B523-F5B122CA674E}" dt="2023-05-02T16:32:14.112" v="1670"/>
-        <pc:sldMkLst>
-          <pc:docMk/>
-          <pc:sldMk cId="1958234100" sldId="290"/>
-        </pc:sldMkLst>
-        <pc:spChg chg="mod">
-          <ac:chgData name="Shuo Chen (MSR)" userId="2e7ebbab-928d-4621-b055-ba5ecd87af3f" providerId="ADAL" clId="{406DA4F5-19E9-4571-B523-F5B122CA674E}" dt="2023-05-02T16:24:56.569" v="1663"/>
-          <ac:spMkLst>
-            <pc:docMk/>
-            <pc:sldMk cId="1958234100" sldId="290"/>
-            <ac:spMk id="5" creationId="{21ABF669-01C0-E1DD-EDF5-24568DFFBF98}"/>
-          </ac:spMkLst>
-        </pc:spChg>
-        <pc:spChg chg="mod">
-          <ac:chgData name="Shuo Chen (MSR)" userId="2e7ebbab-928d-4621-b055-ba5ecd87af3f" providerId="ADAL" clId="{406DA4F5-19E9-4571-B523-F5B122CA674E}" dt="2023-05-02T16:25:11.976" v="1668" actId="20577"/>
-          <ac:spMkLst>
-            <pc:docMk/>
-            <pc:sldMk cId="1958234100" sldId="290"/>
-            <ac:spMk id="6" creationId="{64A799F4-730B-6C80-9527-1E368F9F4955}"/>
-          </ac:spMkLst>
-        </pc:spChg>
-        <pc:spChg chg="mod">
-          <ac:chgData name="Shuo Chen (MSR)" userId="2e7ebbab-928d-4621-b055-ba5ecd87af3f" providerId="ADAL" clId="{406DA4F5-19E9-4571-B523-F5B122CA674E}" dt="2023-05-02T16:26:04.266" v="1669" actId="207"/>
-          <ac:spMkLst>
-            <pc:docMk/>
-            <pc:sldMk cId="1958234100" sldId="290"/>
-            <ac:spMk id="151" creationId="{684F2905-3598-24C4-B2B2-E7F70850B30E}"/>
-          </ac:spMkLst>
-        </pc:spChg>
-        <pc:spChg chg="mod">
-          <ac:chgData name="Shuo Chen (MSR)" userId="2e7ebbab-928d-4621-b055-ba5ecd87af3f" providerId="ADAL" clId="{406DA4F5-19E9-4571-B523-F5B122CA674E}" dt="2023-05-02T16:25:06.284" v="1665" actId="1076"/>
-          <ac:spMkLst>
-            <pc:docMk/>
-            <pc:sldMk cId="1958234100" sldId="290"/>
-            <ac:spMk id="152" creationId="{73EF83D5-2689-6BF7-339E-03B24B38E759}"/>
-          </ac:spMkLst>
-        </pc:spChg>
-        <pc:grpChg chg="add mod">
-          <ac:chgData name="Shuo Chen (MSR)" userId="2e7ebbab-928d-4621-b055-ba5ecd87af3f" providerId="ADAL" clId="{406DA4F5-19E9-4571-B523-F5B122CA674E}" dt="2023-05-02T16:25:00.893" v="1664" actId="1076"/>
-          <ac:grpSpMkLst>
-            <pc:docMk/>
-            <pc:sldMk cId="1958234100" sldId="290"/>
-            <ac:grpSpMk id="4" creationId="{08DB1309-5C9A-6297-6346-0440DFE16093}"/>
-          </ac:grpSpMkLst>
-        </pc:grpChg>
-        <pc:grpChg chg="del">
-          <ac:chgData name="Shuo Chen (MSR)" userId="2e7ebbab-928d-4621-b055-ba5ecd87af3f" providerId="ADAL" clId="{406DA4F5-19E9-4571-B523-F5B122CA674E}" dt="2023-05-02T16:24:54.588" v="1662" actId="478"/>
-          <ac:grpSpMkLst>
-            <pc:docMk/>
-            <pc:sldMk cId="1958234100" sldId="290"/>
-            <ac:grpSpMk id="262" creationId="{A76EA46A-E4E8-CAE6-9737-E940FB13AC05}"/>
-          </ac:grpSpMkLst>
-        </pc:grpChg>
-        <pc:picChg chg="add mod">
-          <ac:chgData name="Shuo Chen (MSR)" userId="2e7ebbab-928d-4621-b055-ba5ecd87af3f" providerId="ADAL" clId="{406DA4F5-19E9-4571-B523-F5B122CA674E}" dt="2023-05-02T16:32:14.112" v="1670"/>
-          <ac:picMkLst>
-            <pc:docMk/>
-            <pc:sldMk cId="1958234100" sldId="290"/>
-            <ac:picMk id="9" creationId="{432C2244-E5CF-708A-6543-2BC18580AF52}"/>
-          </ac:picMkLst>
-        </pc:picChg>
-      </pc:sldChg>
-      <pc:sldChg chg="addSp modSp mod">
-        <pc:chgData name="Shuo Chen (MSR)" userId="2e7ebbab-928d-4621-b055-ba5ecd87af3f" providerId="ADAL" clId="{406DA4F5-19E9-4571-B523-F5B122CA674E}" dt="2023-05-02T16:33:45.855" v="1671"/>
-        <pc:sldMkLst>
-          <pc:docMk/>
-          <pc:sldMk cId="3817332862" sldId="291"/>
-        </pc:sldMkLst>
-        <pc:spChg chg="mod">
-          <ac:chgData name="Shuo Chen (MSR)" userId="2e7ebbab-928d-4621-b055-ba5ecd87af3f" providerId="ADAL" clId="{406DA4F5-19E9-4571-B523-F5B122CA674E}" dt="2023-05-02T16:23:29.237" v="1658" actId="692"/>
-          <ac:spMkLst>
-            <pc:docMk/>
-            <pc:sldMk cId="3817332862" sldId="291"/>
-            <ac:spMk id="14" creationId="{2DEEC018-7895-0B20-3428-C88425835ADF}"/>
-          </ac:spMkLst>
-        </pc:spChg>
-        <pc:spChg chg="mod">
-          <ac:chgData name="Shuo Chen (MSR)" userId="2e7ebbab-928d-4621-b055-ba5ecd87af3f" providerId="ADAL" clId="{406DA4F5-19E9-4571-B523-F5B122CA674E}" dt="2023-05-02T16:23:21.080" v="1657" actId="207"/>
-          <ac:spMkLst>
-            <pc:docMk/>
-            <pc:sldMk cId="3817332862" sldId="291"/>
-            <ac:spMk id="15" creationId="{EE475632-019D-754F-E78F-EEEDDF8BA64C}"/>
-          </ac:spMkLst>
-        </pc:spChg>
-        <pc:spChg chg="mod">
-          <ac:chgData name="Shuo Chen (MSR)" userId="2e7ebbab-928d-4621-b055-ba5ecd87af3f" providerId="ADAL" clId="{406DA4F5-19E9-4571-B523-F5B122CA674E}" dt="2023-05-02T16:22:32.026" v="1653" actId="207"/>
-          <ac:spMkLst>
-            <pc:docMk/>
-            <pc:sldMk cId="3817332862" sldId="291"/>
-            <ac:spMk id="151" creationId="{684F2905-3598-24C4-B2B2-E7F70850B30E}"/>
-          </ac:spMkLst>
-        </pc:spChg>
-        <pc:spChg chg="mod">
-          <ac:chgData name="Shuo Chen (MSR)" userId="2e7ebbab-928d-4621-b055-ba5ecd87af3f" providerId="ADAL" clId="{406DA4F5-19E9-4571-B523-F5B122CA674E}" dt="2023-05-02T16:23:12.112" v="1656" actId="1076"/>
-          <ac:spMkLst>
-            <pc:docMk/>
-            <pc:sldMk cId="3817332862" sldId="291"/>
-            <ac:spMk id="152" creationId="{73EF83D5-2689-6BF7-339E-03B24B38E759}"/>
-          </ac:spMkLst>
-        </pc:spChg>
-        <pc:spChg chg="mod">
-          <ac:chgData name="Shuo Chen (MSR)" userId="2e7ebbab-928d-4621-b055-ba5ecd87af3f" providerId="ADAL" clId="{406DA4F5-19E9-4571-B523-F5B122CA674E}" dt="2023-05-02T16:24:11.145" v="1661" actId="1076"/>
-          <ac:spMkLst>
-            <pc:docMk/>
-            <pc:sldMk cId="3817332862" sldId="291"/>
-            <ac:spMk id="216" creationId="{1360AC33-A255-91B2-5D1D-C0E32530A3A0}"/>
-          </ac:spMkLst>
-        </pc:spChg>
-        <pc:spChg chg="mod">
-          <ac:chgData name="Shuo Chen (MSR)" userId="2e7ebbab-928d-4621-b055-ba5ecd87af3f" providerId="ADAL" clId="{406DA4F5-19E9-4571-B523-F5B122CA674E}" dt="2023-05-02T16:23:36.942" v="1659" actId="14100"/>
-          <ac:spMkLst>
-            <pc:docMk/>
-            <pc:sldMk cId="3817332862" sldId="291"/>
-            <ac:spMk id="263" creationId="{EE03992A-E796-B9D9-A4F2-088E5B9E5073}"/>
-          </ac:spMkLst>
-        </pc:spChg>
-        <pc:spChg chg="mod">
-          <ac:chgData name="Shuo Chen (MSR)" userId="2e7ebbab-928d-4621-b055-ba5ecd87af3f" providerId="ADAL" clId="{406DA4F5-19E9-4571-B523-F5B122CA674E}" dt="2023-05-02T16:22:40.159" v="1654" actId="207"/>
-          <ac:spMkLst>
-            <pc:docMk/>
-            <pc:sldMk cId="3817332862" sldId="291"/>
-            <ac:spMk id="264" creationId="{FCF5CA29-5B0A-9257-A99E-88198580F93A}"/>
-          </ac:spMkLst>
-        </pc:spChg>
-        <pc:picChg chg="add mod">
-          <ac:chgData name="Shuo Chen (MSR)" userId="2e7ebbab-928d-4621-b055-ba5ecd87af3f" providerId="ADAL" clId="{406DA4F5-19E9-4571-B523-F5B122CA674E}" dt="2023-05-02T16:33:45.855" v="1671"/>
-          <ac:picMkLst>
-            <pc:docMk/>
-            <pc:sldMk cId="3817332862" sldId="291"/>
-            <ac:picMk id="7" creationId="{BDCC0A9D-849B-958C-801E-04C5D74B984E}"/>
-          </ac:picMkLst>
-        </pc:picChg>
-      </pc:sldChg>
-      <pc:sldChg chg="addSp delSp modSp mod modTransition modAnim">
-        <pc:chgData name="Shuo Chen (MSR)" userId="2e7ebbab-928d-4621-b055-ba5ecd87af3f" providerId="ADAL" clId="{406DA4F5-19E9-4571-B523-F5B122CA674E}" dt="2023-05-02T16:35:20.343" v="1675"/>
-        <pc:sldMkLst>
-          <pc:docMk/>
-          <pc:sldMk cId="4165179042" sldId="292"/>
-        </pc:sldMkLst>
-        <pc:picChg chg="add del mod">
-          <ac:chgData name="Shuo Chen (MSR)" userId="2e7ebbab-928d-4621-b055-ba5ecd87af3f" providerId="ADAL" clId="{406DA4F5-19E9-4571-B523-F5B122CA674E}" dt="2023-05-02T16:34:56.853" v="1674"/>
-          <ac:picMkLst>
-            <pc:docMk/>
-            <pc:sldMk cId="4165179042" sldId="292"/>
-            <ac:picMk id="49" creationId="{7F488390-18BB-8B4B-4B4D-5BBA498103DA}"/>
-          </ac:picMkLst>
-        </pc:picChg>
-        <pc:picChg chg="add del mod ord">
-          <ac:chgData name="Shuo Chen (MSR)" userId="2e7ebbab-928d-4621-b055-ba5ecd87af3f" providerId="ADAL" clId="{406DA4F5-19E9-4571-B523-F5B122CA674E}" dt="2023-05-02T16:35:20.343" v="1675"/>
-          <ac:picMkLst>
-            <pc:docMk/>
-            <pc:sldMk cId="4165179042" sldId="292"/>
-            <ac:picMk id="53" creationId="{2CC7C029-DEF8-60E6-C541-06805A6CBC57}"/>
-          </ac:picMkLst>
-        </pc:picChg>
-        <pc:picChg chg="add mod">
-          <ac:chgData name="Shuo Chen (MSR)" userId="2e7ebbab-928d-4621-b055-ba5ecd87af3f" providerId="ADAL" clId="{406DA4F5-19E9-4571-B523-F5B122CA674E}" dt="2023-05-02T16:35:20.343" v="1675"/>
-          <ac:picMkLst>
-            <pc:docMk/>
-            <pc:sldMk cId="4165179042" sldId="292"/>
-            <ac:picMk id="54" creationId="{8245224E-6015-63BF-95D3-3B34A4B958F0}"/>
-          </ac:picMkLst>
-        </pc:picChg>
-      </pc:sldChg>
-      <pc:sldChg chg="addSp modSp modTransition modAnim modNotesTx">
-        <pc:chgData name="Shuo Chen (MSR)" userId="2e7ebbab-928d-4621-b055-ba5ecd87af3f" providerId="ADAL" clId="{406DA4F5-19E9-4571-B523-F5B122CA674E}" dt="2023-05-02T15:49:00.711" v="1491"/>
-        <pc:sldMkLst>
-          <pc:docMk/>
-          <pc:sldMk cId="2748381907" sldId="293"/>
-        </pc:sldMkLst>
-        <pc:picChg chg="add mod">
-          <ac:chgData name="Shuo Chen (MSR)" userId="2e7ebbab-928d-4621-b055-ba5ecd87af3f" providerId="ADAL" clId="{406DA4F5-19E9-4571-B523-F5B122CA674E}" dt="2023-05-02T15:48:45.292" v="1490"/>
-          <ac:picMkLst>
-            <pc:docMk/>
-            <pc:sldMk cId="2748381907" sldId="293"/>
-            <ac:picMk id="5" creationId="{DA7026DE-A0F3-1815-AF2A-72CB183E6867}"/>
-          </ac:picMkLst>
-        </pc:picChg>
-      </pc:sldChg>
-      <pc:sldChg chg="addSp modSp modTransition modAnim">
-        <pc:chgData name="Shuo Chen (MSR)" userId="2e7ebbab-928d-4621-b055-ba5ecd87af3f" providerId="ADAL" clId="{406DA4F5-19E9-4571-B523-F5B122CA674E}" dt="2023-05-02T15:29:36.910" v="1389"/>
-        <pc:sldMkLst>
-          <pc:docMk/>
-          <pc:sldMk cId="2710933721" sldId="294"/>
-        </pc:sldMkLst>
-        <pc:picChg chg="add mod">
-          <ac:chgData name="Shuo Chen (MSR)" userId="2e7ebbab-928d-4621-b055-ba5ecd87af3f" providerId="ADAL" clId="{406DA4F5-19E9-4571-B523-F5B122CA674E}" dt="2023-05-02T04:28:54.878" v="1313"/>
-          <ac:picMkLst>
-            <pc:docMk/>
-            <pc:sldMk cId="2710933721" sldId="294"/>
-            <ac:picMk id="5" creationId="{D202C96A-36ED-4BEC-2870-4D1308C7EBBB}"/>
-          </ac:picMkLst>
-        </pc:picChg>
-      </pc:sldChg>
-      <pc:sldChg chg="addSp modSp mod modTransition modAnim modNotesTx">
-        <pc:chgData name="Shuo Chen (MSR)" userId="2e7ebbab-928d-4621-b055-ba5ecd87af3f" providerId="ADAL" clId="{406DA4F5-19E9-4571-B523-F5B122CA674E}" dt="2023-05-02T16:42:45.710" v="1690" actId="20577"/>
-        <pc:sldMkLst>
-          <pc:docMk/>
-          <pc:sldMk cId="836384348" sldId="296"/>
-        </pc:sldMkLst>
-        <pc:spChg chg="mod">
-          <ac:chgData name="Shuo Chen (MSR)" userId="2e7ebbab-928d-4621-b055-ba5ecd87af3f" providerId="ADAL" clId="{406DA4F5-19E9-4571-B523-F5B122CA674E}" dt="2023-05-02T16:42:39.277" v="1689" actId="20577"/>
-          <ac:spMkLst>
-            <pc:docMk/>
-            <pc:sldMk cId="836384348" sldId="296"/>
-            <ac:spMk id="3" creationId="{2C74E118-F88D-D5CE-DF9E-B409CBB2FB5F}"/>
-          </ac:spMkLst>
-        </pc:spChg>
-        <pc:picChg chg="add mod">
-          <ac:chgData name="Shuo Chen (MSR)" userId="2e7ebbab-928d-4621-b055-ba5ecd87af3f" providerId="ADAL" clId="{406DA4F5-19E9-4571-B523-F5B122CA674E}" dt="2023-05-02T04:51:37.263" v="1331"/>
-          <ac:picMkLst>
-            <pc:docMk/>
-            <pc:sldMk cId="836384348" sldId="296"/>
-            <ac:picMk id="5" creationId="{E0FAE419-CB36-9FE4-D666-DA035A938C66}"/>
-          </ac:picMkLst>
-        </pc:picChg>
-      </pc:sldChg>
-      <pc:sldChg chg="addSp delSp modSp mod modTransition modAnim">
-        <pc:chgData name="Shuo Chen (MSR)" userId="2e7ebbab-928d-4621-b055-ba5ecd87af3f" providerId="ADAL" clId="{406DA4F5-19E9-4571-B523-F5B122CA674E}" dt="2023-05-02T15:56:11.959" v="1511"/>
-        <pc:sldMkLst>
-          <pc:docMk/>
-          <pc:sldMk cId="3822367586" sldId="297"/>
-        </pc:sldMkLst>
-        <pc:picChg chg="add del mod">
-          <ac:chgData name="Shuo Chen (MSR)" userId="2e7ebbab-928d-4621-b055-ba5ecd87af3f" providerId="ADAL" clId="{406DA4F5-19E9-4571-B523-F5B122CA674E}" dt="2023-05-02T15:56:02.915" v="1510"/>
-          <ac:picMkLst>
-            <pc:docMk/>
-            <pc:sldMk cId="3822367586" sldId="297"/>
-            <ac:picMk id="6" creationId="{ADA18638-8DDA-8299-0FDC-7D7E9DC507AF}"/>
-          </ac:picMkLst>
-        </pc:picChg>
-        <pc:picChg chg="add del mod ord">
-          <ac:chgData name="Shuo Chen (MSR)" userId="2e7ebbab-928d-4621-b055-ba5ecd87af3f" providerId="ADAL" clId="{406DA4F5-19E9-4571-B523-F5B122CA674E}" dt="2023-05-02T15:56:11.959" v="1511"/>
-          <ac:picMkLst>
-            <pc:docMk/>
-            <pc:sldMk cId="3822367586" sldId="297"/>
-            <ac:picMk id="9" creationId="{856D09E2-78D9-3216-FCC2-B54246448C0C}"/>
-          </ac:picMkLst>
-        </pc:picChg>
-        <pc:picChg chg="add mod">
-          <ac:chgData name="Shuo Chen (MSR)" userId="2e7ebbab-928d-4621-b055-ba5ecd87af3f" providerId="ADAL" clId="{406DA4F5-19E9-4571-B523-F5B122CA674E}" dt="2023-05-02T15:56:11.959" v="1511"/>
-          <ac:picMkLst>
-            <pc:docMk/>
-            <pc:sldMk cId="3822367586" sldId="297"/>
-            <ac:picMk id="10" creationId="{2C58948A-880F-2B18-839A-C9DFA27572EB}"/>
-          </ac:picMkLst>
-        </pc:picChg>
-      </pc:sldChg>
-      <pc:sldChg chg="addSp modSp modTransition modAnim">
-        <pc:chgData name="Shuo Chen (MSR)" userId="2e7ebbab-928d-4621-b055-ba5ecd87af3f" providerId="ADAL" clId="{406DA4F5-19E9-4571-B523-F5B122CA674E}" dt="2023-05-02T15:52:07.195" v="1496"/>
-        <pc:sldMkLst>
-          <pc:docMk/>
-          <pc:sldMk cId="3415354248" sldId="298"/>
-        </pc:sldMkLst>
-        <pc:picChg chg="add mod">
-          <ac:chgData name="Shuo Chen (MSR)" userId="2e7ebbab-928d-4621-b055-ba5ecd87af3f" providerId="ADAL" clId="{406DA4F5-19E9-4571-B523-F5B122CA674E}" dt="2023-05-02T15:51:50.038" v="1495"/>
-          <ac:picMkLst>
-            <pc:docMk/>
-            <pc:sldMk cId="3415354248" sldId="298"/>
-            <ac:picMk id="5" creationId="{7DE39233-430D-3F55-3D10-C573ECBECA04}"/>
-          </ac:picMkLst>
-        </pc:picChg>
-      </pc:sldChg>
-      <pc:sldChg chg="addSp modSp modTransition modAnim">
-        <pc:chgData name="Shuo Chen (MSR)" userId="2e7ebbab-928d-4621-b055-ba5ecd87af3f" providerId="ADAL" clId="{406DA4F5-19E9-4571-B523-F5B122CA674E}" dt="2023-05-02T15:52:43.626" v="1498"/>
-        <pc:sldMkLst>
-          <pc:docMk/>
-          <pc:sldMk cId="2636307608" sldId="299"/>
-        </pc:sldMkLst>
-        <pc:picChg chg="add mod">
-          <ac:chgData name="Shuo Chen (MSR)" userId="2e7ebbab-928d-4621-b055-ba5ecd87af3f" providerId="ADAL" clId="{406DA4F5-19E9-4571-B523-F5B122CA674E}" dt="2023-05-02T15:52:31.063" v="1497"/>
-          <ac:picMkLst>
-            <pc:docMk/>
-            <pc:sldMk cId="2636307608" sldId="299"/>
-            <ac:picMk id="5" creationId="{7FA9A9B4-406D-B3E1-CF5F-E2423DC1C2F7}"/>
-          </ac:picMkLst>
-        </pc:picChg>
-      </pc:sldChg>
-      <pc:sldChg chg="addSp delSp modSp mod modTransition modAnim modNotesTx">
-        <pc:chgData name="Shuo Chen (MSR)" userId="2e7ebbab-928d-4621-b055-ba5ecd87af3f" providerId="ADAL" clId="{406DA4F5-19E9-4571-B523-F5B122CA674E}" dt="2023-05-02T04:26:25.786" v="1312"/>
-        <pc:sldMkLst>
-          <pc:docMk/>
-          <pc:sldMk cId="257127731" sldId="300"/>
-        </pc:sldMkLst>
-        <pc:spChg chg="mod">
-          <ac:chgData name="Shuo Chen (MSR)" userId="2e7ebbab-928d-4621-b055-ba5ecd87af3f" providerId="ADAL" clId="{406DA4F5-19E9-4571-B523-F5B122CA674E}" dt="2023-05-02T04:24:26.733" v="1299" actId="20577"/>
-          <ac:spMkLst>
-            <pc:docMk/>
-            <pc:sldMk cId="257127731" sldId="300"/>
-            <ac:spMk id="3" creationId="{19C7CB0F-8772-3D99-2205-C7984D06B126}"/>
-          </ac:spMkLst>
-        </pc:spChg>
-        <pc:spChg chg="mod">
-          <ac:chgData name="Shuo Chen (MSR)" userId="2e7ebbab-928d-4621-b055-ba5ecd87af3f" providerId="ADAL" clId="{406DA4F5-19E9-4571-B523-F5B122CA674E}" dt="2023-05-02T04:04:31.003" v="357" actId="403"/>
-          <ac:spMkLst>
-            <pc:docMk/>
-            <pc:sldMk cId="257127731" sldId="300"/>
-            <ac:spMk id="4" creationId="{CEC5304A-2F5F-BF25-F276-8B67C930F2F5}"/>
-          </ac:spMkLst>
-        </pc:spChg>
-        <pc:spChg chg="mod">
-          <ac:chgData name="Shuo Chen (MSR)" userId="2e7ebbab-928d-4621-b055-ba5ecd87af3f" providerId="ADAL" clId="{406DA4F5-19E9-4571-B523-F5B122CA674E}" dt="2023-05-02T04:09:41.490" v="703" actId="20577"/>
-          <ac:spMkLst>
-            <pc:docMk/>
-            <pc:sldMk cId="257127731" sldId="300"/>
-            <ac:spMk id="7" creationId="{71109773-686E-4DA3-4BB7-990E8FEA2E23}"/>
-          </ac:spMkLst>
-        </pc:spChg>
-        <pc:spChg chg="mod">
-          <ac:chgData name="Shuo Chen (MSR)" userId="2e7ebbab-928d-4621-b055-ba5ecd87af3f" providerId="ADAL" clId="{406DA4F5-19E9-4571-B523-F5B122CA674E}" dt="2023-05-02T04:13:25.663" v="829" actId="1076"/>
-          <ac:spMkLst>
-            <pc:docMk/>
-            <pc:sldMk cId="257127731" sldId="300"/>
-            <ac:spMk id="10" creationId="{6A1F44F4-30CA-795E-C1C0-C3573213640D}"/>
-          </ac:spMkLst>
-        </pc:spChg>
-        <pc:spChg chg="mod">
-          <ac:chgData name="Shuo Chen (MSR)" userId="2e7ebbab-928d-4621-b055-ba5ecd87af3f" providerId="ADAL" clId="{406DA4F5-19E9-4571-B523-F5B122CA674E}" dt="2023-05-02T04:14:59.567" v="901" actId="20577"/>
-          <ac:spMkLst>
-            <pc:docMk/>
-            <pc:sldMk cId="257127731" sldId="300"/>
-            <ac:spMk id="11" creationId="{D06DEB81-C2AC-11BF-F838-7E443D56A158}"/>
-          </ac:spMkLst>
-        </pc:spChg>
-        <pc:picChg chg="add del mod">
-          <ac:chgData name="Shuo Chen (MSR)" userId="2e7ebbab-928d-4621-b055-ba5ecd87af3f" providerId="ADAL" clId="{406DA4F5-19E9-4571-B523-F5B122CA674E}" dt="2023-05-02T04:25:04.565" v="1311"/>
-          <ac:picMkLst>
-            <pc:docMk/>
-            <pc:sldMk cId="257127731" sldId="300"/>
-            <ac:picMk id="14" creationId="{43FEA2A7-5F33-1649-333E-113EDE3D3A18}"/>
-          </ac:picMkLst>
-        </pc:picChg>
-        <pc:picChg chg="add del mod ord">
-          <ac:chgData name="Shuo Chen (MSR)" userId="2e7ebbab-928d-4621-b055-ba5ecd87af3f" providerId="ADAL" clId="{406DA4F5-19E9-4571-B523-F5B122CA674E}" dt="2023-05-02T04:26:25.786" v="1312"/>
-          <ac:picMkLst>
-            <pc:docMk/>
-            <pc:sldMk cId="257127731" sldId="300"/>
-            <ac:picMk id="17" creationId="{C48A60F7-F0D1-0232-4CEC-668ECEF75F1A}"/>
-          </ac:picMkLst>
-        </pc:picChg>
-        <pc:picChg chg="add mod">
-          <ac:chgData name="Shuo Chen (MSR)" userId="2e7ebbab-928d-4621-b055-ba5ecd87af3f" providerId="ADAL" clId="{406DA4F5-19E9-4571-B523-F5B122CA674E}" dt="2023-05-02T04:26:25.786" v="1312"/>
-          <ac:picMkLst>
-            <pc:docMk/>
-            <pc:sldMk cId="257127731" sldId="300"/>
-            <ac:picMk id="18" creationId="{8C56BDC8-6CB1-7ABB-0C1C-043216485CBC}"/>
-          </ac:picMkLst>
-        </pc:picChg>
-      </pc:sldChg>
-      <pc:sldChg chg="addSp delSp modSp add mod modTransition">
-        <pc:chgData name="Shuo Chen (MSR)" userId="2e7ebbab-928d-4621-b055-ba5ecd87af3f" providerId="ADAL" clId="{406DA4F5-19E9-4571-B523-F5B122CA674E}" dt="2023-05-02T04:57:13.801" v="1344" actId="1076"/>
-        <pc:sldMkLst>
-          <pc:docMk/>
-          <pc:sldMk cId="3980272723" sldId="301"/>
-        </pc:sldMkLst>
-        <pc:spChg chg="del">
-          <ac:chgData name="Shuo Chen (MSR)" userId="2e7ebbab-928d-4621-b055-ba5ecd87af3f" providerId="ADAL" clId="{406DA4F5-19E9-4571-B523-F5B122CA674E}" dt="2023-05-02T04:53:22.351" v="1334" actId="478"/>
-          <ac:spMkLst>
-            <pc:docMk/>
-            <pc:sldMk cId="3980272723" sldId="301"/>
-            <ac:spMk id="2" creationId="{AE7FE623-FFC5-8142-3D42-51CE3D9EAA68}"/>
-          </ac:spMkLst>
-        </pc:spChg>
-        <pc:spChg chg="del">
-          <ac:chgData name="Shuo Chen (MSR)" userId="2e7ebbab-928d-4621-b055-ba5ecd87af3f" providerId="ADAL" clId="{406DA4F5-19E9-4571-B523-F5B122CA674E}" dt="2023-05-02T04:54:07.739" v="1337" actId="478"/>
-          <ac:spMkLst>
-            <pc:docMk/>
-            <pc:sldMk cId="3980272723" sldId="301"/>
-            <ac:spMk id="3" creationId="{7ADE9F33-95E8-C970-DAAA-322FD1168595}"/>
-          </ac:spMkLst>
-        </pc:spChg>
-        <pc:spChg chg="add del mod">
-          <ac:chgData name="Shuo Chen (MSR)" userId="2e7ebbab-928d-4621-b055-ba5ecd87af3f" providerId="ADAL" clId="{406DA4F5-19E9-4571-B523-F5B122CA674E}" dt="2023-05-02T04:53:25.740" v="1335" actId="478"/>
-          <ac:spMkLst>
-            <pc:docMk/>
-            <pc:sldMk cId="3980272723" sldId="301"/>
-            <ac:spMk id="9" creationId="{FC4D8B20-8717-799D-F003-9F9E5DCD8462}"/>
-          </ac:spMkLst>
-        </pc:spChg>
-        <pc:spChg chg="add mod">
-          <ac:chgData name="Shuo Chen (MSR)" userId="2e7ebbab-928d-4621-b055-ba5ecd87af3f" providerId="ADAL" clId="{406DA4F5-19E9-4571-B523-F5B122CA674E}" dt="2023-05-02T04:53:26.385" v="1336"/>
-          <ac:spMkLst>
-            <pc:docMk/>
-            <pc:sldMk cId="3980272723" sldId="301"/>
-            <ac:spMk id="10" creationId="{8ED4D008-B698-0E4A-553A-BD6316F24D0A}"/>
-          </ac:spMkLst>
-        </pc:spChg>
-        <pc:spChg chg="add del mod">
-          <ac:chgData name="Shuo Chen (MSR)" userId="2e7ebbab-928d-4621-b055-ba5ecd87af3f" providerId="ADAL" clId="{406DA4F5-19E9-4571-B523-F5B122CA674E}" dt="2023-05-02T04:54:13.018" v="1338" actId="478"/>
-          <ac:spMkLst>
-            <pc:docMk/>
-            <pc:sldMk cId="3980272723" sldId="301"/>
-            <ac:spMk id="14" creationId="{618CB1F5-9B32-B83E-A937-8D796321B6DC}"/>
-          </ac:spMkLst>
-        </pc:spChg>
-        <pc:spChg chg="add mod">
-          <ac:chgData name="Shuo Chen (MSR)" userId="2e7ebbab-928d-4621-b055-ba5ecd87af3f" providerId="ADAL" clId="{406DA4F5-19E9-4571-B523-F5B122CA674E}" dt="2023-05-02T04:54:23.062" v="1341"/>
-          <ac:spMkLst>
-            <pc:docMk/>
-            <pc:sldMk cId="3980272723" sldId="301"/>
-            <ac:spMk id="16" creationId="{284EB8C3-09A2-D976-6026-EA9D81CB221D}"/>
-          </ac:spMkLst>
-        </pc:spChg>
-        <pc:spChg chg="add mod">
-          <ac:chgData name="Shuo Chen (MSR)" userId="2e7ebbab-928d-4621-b055-ba5ecd87af3f" providerId="ADAL" clId="{406DA4F5-19E9-4571-B523-F5B122CA674E}" dt="2023-05-02T04:54:23.062" v="1341"/>
-          <ac:spMkLst>
-            <pc:docMk/>
-            <pc:sldMk cId="3980272723" sldId="301"/>
-            <ac:spMk id="23" creationId="{2EA3C30E-58B2-B938-76BB-E682C92F8240}"/>
-          </ac:spMkLst>
-        </pc:spChg>
-        <pc:spChg chg="add mod">
-          <ac:chgData name="Shuo Chen (MSR)" userId="2e7ebbab-928d-4621-b055-ba5ecd87af3f" providerId="ADAL" clId="{406DA4F5-19E9-4571-B523-F5B122CA674E}" dt="2023-05-02T04:54:23.062" v="1341"/>
-          <ac:spMkLst>
-            <pc:docMk/>
-            <pc:sldMk cId="3980272723" sldId="301"/>
-            <ac:spMk id="26" creationId="{EF73CFF9-2353-0C47-8899-1542C6A54FF9}"/>
-          </ac:spMkLst>
-        </pc:spChg>
-        <pc:spChg chg="add mod">
-          <ac:chgData name="Shuo Chen (MSR)" userId="2e7ebbab-928d-4621-b055-ba5ecd87af3f" providerId="ADAL" clId="{406DA4F5-19E9-4571-B523-F5B122CA674E}" dt="2023-05-02T04:54:23.062" v="1341"/>
-          <ac:spMkLst>
-            <pc:docMk/>
-            <pc:sldMk cId="3980272723" sldId="301"/>
-            <ac:spMk id="27" creationId="{DF2E2DCD-4149-3DE3-4049-C7E778BF8787}"/>
-          </ac:spMkLst>
-        </pc:spChg>
-        <pc:spChg chg="add mod">
-          <ac:chgData name="Shuo Chen (MSR)" userId="2e7ebbab-928d-4621-b055-ba5ecd87af3f" providerId="ADAL" clId="{406DA4F5-19E9-4571-B523-F5B122CA674E}" dt="2023-05-02T04:54:23.062" v="1341"/>
-          <ac:spMkLst>
-            <pc:docMk/>
-            <pc:sldMk cId="3980272723" sldId="301"/>
-            <ac:spMk id="28" creationId="{CCA451F1-11AA-E4C2-4EC5-23F035789F38}"/>
-          </ac:spMkLst>
-        </pc:spChg>
-        <pc:spChg chg="add mod">
-          <ac:chgData name="Shuo Chen (MSR)" userId="2e7ebbab-928d-4621-b055-ba5ecd87af3f" providerId="ADAL" clId="{406DA4F5-19E9-4571-B523-F5B122CA674E}" dt="2023-05-02T04:54:23.062" v="1341"/>
-          <ac:spMkLst>
-            <pc:docMk/>
-            <pc:sldMk cId="3980272723" sldId="301"/>
-            <ac:spMk id="29" creationId="{23F7949C-8F99-29C3-67EC-FC8AD4D1A8DE}"/>
-          </ac:spMkLst>
-        </pc:spChg>
-        <pc:spChg chg="add mod">
-          <ac:chgData name="Shuo Chen (MSR)" userId="2e7ebbab-928d-4621-b055-ba5ecd87af3f" providerId="ADAL" clId="{406DA4F5-19E9-4571-B523-F5B122CA674E}" dt="2023-05-02T04:54:23.062" v="1341"/>
-          <ac:spMkLst>
-            <pc:docMk/>
-            <pc:sldMk cId="3980272723" sldId="301"/>
-            <ac:spMk id="30" creationId="{69BAAD33-4F04-F0CD-80DE-128D4A3B2512}"/>
-          </ac:spMkLst>
-        </pc:spChg>
-        <pc:spChg chg="add mod">
-          <ac:chgData name="Shuo Chen (MSR)" userId="2e7ebbab-928d-4621-b055-ba5ecd87af3f" providerId="ADAL" clId="{406DA4F5-19E9-4571-B523-F5B122CA674E}" dt="2023-05-02T04:54:23.062" v="1341"/>
-          <ac:spMkLst>
-            <pc:docMk/>
-            <pc:sldMk cId="3980272723" sldId="301"/>
-            <ac:spMk id="31" creationId="{B93B4374-B3BB-9BE3-963C-5DCB7C0A22AB}"/>
-          </ac:spMkLst>
-        </pc:spChg>
-        <pc:spChg chg="del">
-          <ac:chgData name="Shuo Chen (MSR)" userId="2e7ebbab-928d-4621-b055-ba5ecd87af3f" providerId="ADAL" clId="{406DA4F5-19E9-4571-B523-F5B122CA674E}" dt="2023-05-02T04:54:07.739" v="1337" actId="478"/>
-          <ac:spMkLst>
-            <pc:docMk/>
-            <pc:sldMk cId="3980272723" sldId="301"/>
-            <ac:spMk id="35" creationId="{C9571D96-6FE6-55BD-9426-8098F244F11C}"/>
-          </ac:spMkLst>
-        </pc:spChg>
-        <pc:spChg chg="del">
-          <ac:chgData name="Shuo Chen (MSR)" userId="2e7ebbab-928d-4621-b055-ba5ecd87af3f" providerId="ADAL" clId="{406DA4F5-19E9-4571-B523-F5B122CA674E}" dt="2023-05-02T04:54:07.739" v="1337" actId="478"/>
-          <ac:spMkLst>
-            <pc:docMk/>
-            <pc:sldMk cId="3980272723" sldId="301"/>
-            <ac:spMk id="36" creationId="{CB468E1B-B625-4AC7-B2C9-3A603E36AFFD}"/>
-          </ac:spMkLst>
-        </pc:spChg>
-        <pc:spChg chg="del">
-          <ac:chgData name="Shuo Chen (MSR)" userId="2e7ebbab-928d-4621-b055-ba5ecd87af3f" providerId="ADAL" clId="{406DA4F5-19E9-4571-B523-F5B122CA674E}" dt="2023-05-02T04:54:07.739" v="1337" actId="478"/>
-          <ac:spMkLst>
-            <pc:docMk/>
-            <pc:sldMk cId="3980272723" sldId="301"/>
-            <ac:spMk id="37" creationId="{4BF723CA-81CC-35F0-CB2E-EFC07DDDD18A}"/>
-          </ac:spMkLst>
-        </pc:spChg>
-        <pc:spChg chg="del">
-          <ac:chgData name="Shuo Chen (MSR)" userId="2e7ebbab-928d-4621-b055-ba5ecd87af3f" providerId="ADAL" clId="{406DA4F5-19E9-4571-B523-F5B122CA674E}" dt="2023-05-02T04:54:07.739" v="1337" actId="478"/>
-          <ac:spMkLst>
-            <pc:docMk/>
-            <pc:sldMk cId="3980272723" sldId="301"/>
-            <ac:spMk id="38" creationId="{1D9F8231-514A-E556-F6AA-82F55E825021}"/>
-          </ac:spMkLst>
-        </pc:spChg>
-        <pc:spChg chg="del">
-          <ac:chgData name="Shuo Chen (MSR)" userId="2e7ebbab-928d-4621-b055-ba5ecd87af3f" providerId="ADAL" clId="{406DA4F5-19E9-4571-B523-F5B122CA674E}" dt="2023-05-02T04:54:17.124" v="1339" actId="478"/>
-          <ac:spMkLst>
-            <pc:docMk/>
-            <pc:sldMk cId="3980272723" sldId="301"/>
-            <ac:spMk id="39" creationId="{730F3A04-B663-B081-1F7D-ABE53DF5D3D6}"/>
-          </ac:spMkLst>
-        </pc:spChg>
-        <pc:spChg chg="del">
-          <ac:chgData name="Shuo Chen (MSR)" userId="2e7ebbab-928d-4621-b055-ba5ecd87af3f" providerId="ADAL" clId="{406DA4F5-19E9-4571-B523-F5B122CA674E}" dt="2023-05-02T04:54:07.739" v="1337" actId="478"/>
-          <ac:spMkLst>
-            <pc:docMk/>
-            <pc:sldMk cId="3980272723" sldId="301"/>
-            <ac:spMk id="40" creationId="{767DE12F-BF90-BDA4-F8F1-4BDF592645E7}"/>
-          </ac:spMkLst>
-        </pc:spChg>
-        <pc:spChg chg="del">
-          <ac:chgData name="Shuo Chen (MSR)" userId="2e7ebbab-928d-4621-b055-ba5ecd87af3f" providerId="ADAL" clId="{406DA4F5-19E9-4571-B523-F5B122CA674E}" dt="2023-05-02T04:54:07.739" v="1337" actId="478"/>
-          <ac:spMkLst>
-            <pc:docMk/>
-            <pc:sldMk cId="3980272723" sldId="301"/>
-            <ac:spMk id="41" creationId="{D70B9471-9BB1-7AD4-BB14-74EB1A8D4A8C}"/>
-          </ac:spMkLst>
-        </pc:spChg>
-        <pc:spChg chg="del">
-          <ac:chgData name="Shuo Chen (MSR)" userId="2e7ebbab-928d-4621-b055-ba5ecd87af3f" providerId="ADAL" clId="{406DA4F5-19E9-4571-B523-F5B122CA674E}" dt="2023-05-02T04:54:07.739" v="1337" actId="478"/>
-          <ac:spMkLst>
-            <pc:docMk/>
-            <pc:sldMk cId="3980272723" sldId="301"/>
-            <ac:spMk id="42" creationId="{DD6FA758-1468-1D55-7C08-8AB7A1D16CB8}"/>
-          </ac:spMkLst>
-        </pc:spChg>
-        <pc:spChg chg="del">
-          <ac:chgData name="Shuo Chen (MSR)" userId="2e7ebbab-928d-4621-b055-ba5ecd87af3f" providerId="ADAL" clId="{406DA4F5-19E9-4571-B523-F5B122CA674E}" dt="2023-05-02T04:54:07.739" v="1337" actId="478"/>
-          <ac:spMkLst>
-            <pc:docMk/>
-            <pc:sldMk cId="3980272723" sldId="301"/>
-            <ac:spMk id="43" creationId="{C47E26AA-916A-28AE-24DB-B0F73BB1A273}"/>
-          </ac:spMkLst>
-        </pc:spChg>
-        <pc:spChg chg="del">
-          <ac:chgData name="Shuo Chen (MSR)" userId="2e7ebbab-928d-4621-b055-ba5ecd87af3f" providerId="ADAL" clId="{406DA4F5-19E9-4571-B523-F5B122CA674E}" dt="2023-05-02T04:54:07.739" v="1337" actId="478"/>
-          <ac:spMkLst>
-            <pc:docMk/>
-            <pc:sldMk cId="3980272723" sldId="301"/>
-            <ac:spMk id="45" creationId="{2CAD130A-9486-0408-3C68-2583302CF8A8}"/>
-          </ac:spMkLst>
-        </pc:spChg>
-        <pc:spChg chg="del">
-          <ac:chgData name="Shuo Chen (MSR)" userId="2e7ebbab-928d-4621-b055-ba5ecd87af3f" providerId="ADAL" clId="{406DA4F5-19E9-4571-B523-F5B122CA674E}" dt="2023-05-02T04:54:07.739" v="1337" actId="478"/>
-          <ac:spMkLst>
-            <pc:docMk/>
-            <pc:sldMk cId="3980272723" sldId="301"/>
-            <ac:spMk id="47" creationId="{047207CE-8335-F242-78B9-C3EF432833E2}"/>
-          </ac:spMkLst>
-        </pc:spChg>
-        <pc:spChg chg="del">
-          <ac:chgData name="Shuo Chen (MSR)" userId="2e7ebbab-928d-4621-b055-ba5ecd87af3f" providerId="ADAL" clId="{406DA4F5-19E9-4571-B523-F5B122CA674E}" dt="2023-05-02T04:54:07.739" v="1337" actId="478"/>
-          <ac:spMkLst>
-            <pc:docMk/>
-            <pc:sldMk cId="3980272723" sldId="301"/>
-            <ac:spMk id="49" creationId="{8EEBC499-FF4C-953B-FEAE-A24897A600DA}"/>
-          </ac:spMkLst>
-        </pc:spChg>
-        <pc:spChg chg="del">
-          <ac:chgData name="Shuo Chen (MSR)" userId="2e7ebbab-928d-4621-b055-ba5ecd87af3f" providerId="ADAL" clId="{406DA4F5-19E9-4571-B523-F5B122CA674E}" dt="2023-05-02T04:54:07.739" v="1337" actId="478"/>
-          <ac:spMkLst>
-            <pc:docMk/>
-            <pc:sldMk cId="3980272723" sldId="301"/>
-            <ac:spMk id="50" creationId="{F8112FF1-B85C-5BE1-1C6C-A0DE435CD0A0}"/>
-          </ac:spMkLst>
-        </pc:spChg>
-        <pc:spChg chg="del">
-          <ac:chgData name="Shuo Chen (MSR)" userId="2e7ebbab-928d-4621-b055-ba5ecd87af3f" providerId="ADAL" clId="{406DA4F5-19E9-4571-B523-F5B122CA674E}" dt="2023-05-02T04:54:07.739" v="1337" actId="478"/>
-          <ac:spMkLst>
-            <pc:docMk/>
-            <pc:sldMk cId="3980272723" sldId="301"/>
-            <ac:spMk id="52" creationId="{799A7B81-9ED3-7A2E-6A5A-DC1F5C2A51CA}"/>
-          </ac:spMkLst>
-        </pc:spChg>
-        <pc:spChg chg="del">
-          <ac:chgData name="Shuo Chen (MSR)" userId="2e7ebbab-928d-4621-b055-ba5ecd87af3f" providerId="ADAL" clId="{406DA4F5-19E9-4571-B523-F5B122CA674E}" dt="2023-05-02T04:54:07.739" v="1337" actId="478"/>
-          <ac:spMkLst>
-            <pc:docMk/>
-            <pc:sldMk cId="3980272723" sldId="301"/>
-            <ac:spMk id="53" creationId="{F1EE4EAC-3652-F369-64D0-CD21642A3F14}"/>
-          </ac:spMkLst>
-        </pc:spChg>
-        <pc:spChg chg="del">
-          <ac:chgData name="Shuo Chen (MSR)" userId="2e7ebbab-928d-4621-b055-ba5ecd87af3f" providerId="ADAL" clId="{406DA4F5-19E9-4571-B523-F5B122CA674E}" dt="2023-05-02T04:54:07.739" v="1337" actId="478"/>
-          <ac:spMkLst>
-            <pc:docMk/>
-            <pc:sldMk cId="3980272723" sldId="301"/>
-            <ac:spMk id="54" creationId="{BE185489-66F3-E8E5-4A85-49C91EA69074}"/>
-          </ac:spMkLst>
-        </pc:spChg>
-        <pc:spChg chg="del">
-          <ac:chgData name="Shuo Chen (MSR)" userId="2e7ebbab-928d-4621-b055-ba5ecd87af3f" providerId="ADAL" clId="{406DA4F5-19E9-4571-B523-F5B122CA674E}" dt="2023-05-02T04:54:07.739" v="1337" actId="478"/>
-          <ac:spMkLst>
-            <pc:docMk/>
-            <pc:sldMk cId="3980272723" sldId="301"/>
-            <ac:spMk id="55" creationId="{7B90813E-B032-BCAB-0AD5-5EF92C7A4BC0}"/>
-          </ac:spMkLst>
-        </pc:spChg>
-        <pc:spChg chg="del">
-          <ac:chgData name="Shuo Chen (MSR)" userId="2e7ebbab-928d-4621-b055-ba5ecd87af3f" providerId="ADAL" clId="{406DA4F5-19E9-4571-B523-F5B122CA674E}" dt="2023-05-02T04:54:07.739" v="1337" actId="478"/>
-          <ac:spMkLst>
-            <pc:docMk/>
-            <pc:sldMk cId="3980272723" sldId="301"/>
-            <ac:spMk id="56" creationId="{3E250064-B66B-EA83-8060-60A0991F466A}"/>
-          </ac:spMkLst>
-        </pc:spChg>
-        <pc:spChg chg="del">
-          <ac:chgData name="Shuo Chen (MSR)" userId="2e7ebbab-928d-4621-b055-ba5ecd87af3f" providerId="ADAL" clId="{406DA4F5-19E9-4571-B523-F5B122CA674E}" dt="2023-05-02T04:54:20.671" v="1340" actId="478"/>
-          <ac:spMkLst>
-            <pc:docMk/>
-            <pc:sldMk cId="3980272723" sldId="301"/>
-            <ac:spMk id="57" creationId="{8C9A3B1C-76F2-C662-B520-FC1A11DD96F3}"/>
-          </ac:spMkLst>
-        </pc:spChg>
-        <pc:spChg chg="del">
-          <ac:chgData name="Shuo Chen (MSR)" userId="2e7ebbab-928d-4621-b055-ba5ecd87af3f" providerId="ADAL" clId="{406DA4F5-19E9-4571-B523-F5B122CA674E}" dt="2023-05-02T04:54:07.739" v="1337" actId="478"/>
-          <ac:spMkLst>
-            <pc:docMk/>
-            <pc:sldMk cId="3980272723" sldId="301"/>
-            <ac:spMk id="59" creationId="{5A0CCFA2-3111-E253-D1C9-E065E97D1604}"/>
-          </ac:spMkLst>
-        </pc:spChg>
-        <pc:spChg chg="add mod">
-          <ac:chgData name="Shuo Chen (MSR)" userId="2e7ebbab-928d-4621-b055-ba5ecd87af3f" providerId="ADAL" clId="{406DA4F5-19E9-4571-B523-F5B122CA674E}" dt="2023-05-02T04:54:23.062" v="1341"/>
-          <ac:spMkLst>
-            <pc:docMk/>
-            <pc:sldMk cId="3980272723" sldId="301"/>
-            <ac:spMk id="60" creationId="{CEAFCC27-0B1A-9183-1036-8C79753145EC}"/>
-          </ac:spMkLst>
-        </pc:spChg>
-        <pc:spChg chg="add mod">
-          <ac:chgData name="Shuo Chen (MSR)" userId="2e7ebbab-928d-4621-b055-ba5ecd87af3f" providerId="ADAL" clId="{406DA4F5-19E9-4571-B523-F5B122CA674E}" dt="2023-05-02T04:54:23.062" v="1341"/>
-          <ac:spMkLst>
-            <pc:docMk/>
-            <pc:sldMk cId="3980272723" sldId="301"/>
-            <ac:spMk id="62" creationId="{A8CCA0E2-DBF0-A162-5243-2EB1ACCDE5E7}"/>
-          </ac:spMkLst>
-        </pc:spChg>
-        <pc:spChg chg="add mod">
-          <ac:chgData name="Shuo Chen (MSR)" userId="2e7ebbab-928d-4621-b055-ba5ecd87af3f" providerId="ADAL" clId="{406DA4F5-19E9-4571-B523-F5B122CA674E}" dt="2023-05-02T04:54:23.062" v="1341"/>
-          <ac:spMkLst>
-            <pc:docMk/>
-            <pc:sldMk cId="3980272723" sldId="301"/>
-            <ac:spMk id="64" creationId="{214B8F23-07C6-77AC-021B-33393CB8D5B5}"/>
-          </ac:spMkLst>
-        </pc:spChg>
-        <pc:spChg chg="add mod">
-          <ac:chgData name="Shuo Chen (MSR)" userId="2e7ebbab-928d-4621-b055-ba5ecd87af3f" providerId="ADAL" clId="{406DA4F5-19E9-4571-B523-F5B122CA674E}" dt="2023-05-02T04:54:23.062" v="1341"/>
-          <ac:spMkLst>
-            <pc:docMk/>
-            <pc:sldMk cId="3980272723" sldId="301"/>
-            <ac:spMk id="66" creationId="{7D3E4FEB-E5D3-555E-AFC4-BDB56D83659A}"/>
-          </ac:spMkLst>
-        </pc:spChg>
-        <pc:spChg chg="add mod">
-          <ac:chgData name="Shuo Chen (MSR)" userId="2e7ebbab-928d-4621-b055-ba5ecd87af3f" providerId="ADAL" clId="{406DA4F5-19E9-4571-B523-F5B122CA674E}" dt="2023-05-02T04:54:23.062" v="1341"/>
-          <ac:spMkLst>
-            <pc:docMk/>
-            <pc:sldMk cId="3980272723" sldId="301"/>
-            <ac:spMk id="67" creationId="{82A4C159-DD6F-9DC9-9557-F375D876A7FB}"/>
-          </ac:spMkLst>
-        </pc:spChg>
-        <pc:spChg chg="add mod">
-          <ac:chgData name="Shuo Chen (MSR)" userId="2e7ebbab-928d-4621-b055-ba5ecd87af3f" providerId="ADAL" clId="{406DA4F5-19E9-4571-B523-F5B122CA674E}" dt="2023-05-02T04:54:23.062" v="1341"/>
-          <ac:spMkLst>
-            <pc:docMk/>
-            <pc:sldMk cId="3980272723" sldId="301"/>
-            <ac:spMk id="69" creationId="{F8090703-6A01-43F3-D0BE-A7D85F44521A}"/>
-          </ac:spMkLst>
-        </pc:spChg>
-        <pc:spChg chg="add mod">
-          <ac:chgData name="Shuo Chen (MSR)" userId="2e7ebbab-928d-4621-b055-ba5ecd87af3f" providerId="ADAL" clId="{406DA4F5-19E9-4571-B523-F5B122CA674E}" dt="2023-05-02T04:54:23.062" v="1341"/>
-          <ac:spMkLst>
-            <pc:docMk/>
-            <pc:sldMk cId="3980272723" sldId="301"/>
-            <ac:spMk id="70" creationId="{D275AD5A-3E14-BADB-DCDB-15E739DA7024}"/>
-          </ac:spMkLst>
-        </pc:spChg>
-        <pc:spChg chg="add mod">
-          <ac:chgData name="Shuo Chen (MSR)" userId="2e7ebbab-928d-4621-b055-ba5ecd87af3f" providerId="ADAL" clId="{406DA4F5-19E9-4571-B523-F5B122CA674E}" dt="2023-05-02T04:54:23.062" v="1341"/>
-          <ac:spMkLst>
-            <pc:docMk/>
-            <pc:sldMk cId="3980272723" sldId="301"/>
-            <ac:spMk id="71" creationId="{8912D629-8C68-A056-B8FD-13173E6F737E}"/>
-          </ac:spMkLst>
-        </pc:spChg>
-        <pc:spChg chg="add mod">
-          <ac:chgData name="Shuo Chen (MSR)" userId="2e7ebbab-928d-4621-b055-ba5ecd87af3f" providerId="ADAL" clId="{406DA4F5-19E9-4571-B523-F5B122CA674E}" dt="2023-05-02T04:54:23.062" v="1341"/>
-          <ac:spMkLst>
-            <pc:docMk/>
-            <pc:sldMk cId="3980272723" sldId="301"/>
-            <ac:spMk id="72" creationId="{670E011A-7B2C-46F7-A794-C14A71503054}"/>
-          </ac:spMkLst>
-        </pc:spChg>
-        <pc:spChg chg="add mod">
-          <ac:chgData name="Shuo Chen (MSR)" userId="2e7ebbab-928d-4621-b055-ba5ecd87af3f" providerId="ADAL" clId="{406DA4F5-19E9-4571-B523-F5B122CA674E}" dt="2023-05-02T04:54:23.062" v="1341"/>
-          <ac:spMkLst>
-            <pc:docMk/>
-            <pc:sldMk cId="3980272723" sldId="301"/>
-            <ac:spMk id="73" creationId="{08727CF7-9518-6818-03DC-1140C5586028}"/>
-          </ac:spMkLst>
-        </pc:spChg>
-        <pc:spChg chg="add mod">
-          <ac:chgData name="Shuo Chen (MSR)" userId="2e7ebbab-928d-4621-b055-ba5ecd87af3f" providerId="ADAL" clId="{406DA4F5-19E9-4571-B523-F5B122CA674E}" dt="2023-05-02T04:54:23.062" v="1341"/>
-          <ac:spMkLst>
-            <pc:docMk/>
-            <pc:sldMk cId="3980272723" sldId="301"/>
-            <ac:spMk id="74" creationId="{DE95EC68-AC46-861E-4E7E-B8D7BB02606A}"/>
-          </ac:spMkLst>
-        </pc:spChg>
-        <pc:spChg chg="add mod">
-          <ac:chgData name="Shuo Chen (MSR)" userId="2e7ebbab-928d-4621-b055-ba5ecd87af3f" providerId="ADAL" clId="{406DA4F5-19E9-4571-B523-F5B122CA674E}" dt="2023-05-02T04:54:23.062" v="1341"/>
-          <ac:spMkLst>
-            <pc:docMk/>
-            <pc:sldMk cId="3980272723" sldId="301"/>
-            <ac:spMk id="76" creationId="{7FEA3A7E-9093-B619-BABB-51D4AB5DFEEB}"/>
-          </ac:spMkLst>
-        </pc:spChg>
-        <pc:spChg chg="add mod">
-          <ac:chgData name="Shuo Chen (MSR)" userId="2e7ebbab-928d-4621-b055-ba5ecd87af3f" providerId="ADAL" clId="{406DA4F5-19E9-4571-B523-F5B122CA674E}" dt="2023-05-02T04:57:00.339" v="1342"/>
-          <ac:spMkLst>
-            <pc:docMk/>
-            <pc:sldMk cId="3980272723" sldId="301"/>
-            <ac:spMk id="77" creationId="{D1E53264-EC33-4BC5-E906-217CA5C31976}"/>
-          </ac:spMkLst>
-        </pc:spChg>
-        <pc:grpChg chg="mod">
-          <ac:chgData name="Shuo Chen (MSR)" userId="2e7ebbab-928d-4621-b055-ba5ecd87af3f" providerId="ADAL" clId="{406DA4F5-19E9-4571-B523-F5B122CA674E}" dt="2023-05-02T04:57:09.002" v="1343" actId="1076"/>
-          <ac:grpSpMkLst>
-            <pc:docMk/>
-            <pc:sldMk cId="3980272723" sldId="301"/>
-            <ac:grpSpMk id="15" creationId="{81B60229-E92B-D049-63A1-F7D80903CE89}"/>
-          </ac:grpSpMkLst>
-        </pc:grpChg>
-        <pc:grpChg chg="mod">
-          <ac:chgData name="Shuo Chen (MSR)" userId="2e7ebbab-928d-4621-b055-ba5ecd87af3f" providerId="ADAL" clId="{406DA4F5-19E9-4571-B523-F5B122CA674E}" dt="2023-05-02T04:57:13.801" v="1344" actId="1076"/>
-          <ac:grpSpMkLst>
-            <pc:docMk/>
-            <pc:sldMk cId="3980272723" sldId="301"/>
-            <ac:grpSpMk id="25" creationId="{213C9B97-DADF-FF5E-6BD0-9699CEEAB3EF}"/>
-          </ac:grpSpMkLst>
-        </pc:grpChg>
-        <pc:cxnChg chg="add mod">
-          <ac:chgData name="Shuo Chen (MSR)" userId="2e7ebbab-928d-4621-b055-ba5ecd87af3f" providerId="ADAL" clId="{406DA4F5-19E9-4571-B523-F5B122CA674E}" dt="2023-05-02T04:54:23.062" v="1341"/>
-          <ac:cxnSpMkLst>
-            <pc:docMk/>
-            <pc:sldMk cId="3980272723" sldId="301"/>
-            <ac:cxnSpMk id="19" creationId="{7278F78F-D453-E164-0DC9-984DECFCDFDC}"/>
-          </ac:cxnSpMkLst>
-        </pc:cxnChg>
-        <pc:cxnChg chg="add mod">
-          <ac:chgData name="Shuo Chen (MSR)" userId="2e7ebbab-928d-4621-b055-ba5ecd87af3f" providerId="ADAL" clId="{406DA4F5-19E9-4571-B523-F5B122CA674E}" dt="2023-05-02T04:54:23.062" v="1341"/>
-          <ac:cxnSpMkLst>
-            <pc:docMk/>
-            <pc:sldMk cId="3980272723" sldId="301"/>
-            <ac:cxnSpMk id="20" creationId="{378ABE65-0698-4E8E-04B8-27648A9C6601}"/>
-          </ac:cxnSpMkLst>
-        </pc:cxnChg>
-        <pc:cxnChg chg="add mod">
-          <ac:chgData name="Shuo Chen (MSR)" userId="2e7ebbab-928d-4621-b055-ba5ecd87af3f" providerId="ADAL" clId="{406DA4F5-19E9-4571-B523-F5B122CA674E}" dt="2023-05-02T04:54:23.062" v="1341"/>
-          <ac:cxnSpMkLst>
-            <pc:docMk/>
-            <pc:sldMk cId="3980272723" sldId="301"/>
-            <ac:cxnSpMk id="21" creationId="{34FE9420-19D8-78E3-3965-BAB4FECFFDB6}"/>
-          </ac:cxnSpMkLst>
-        </pc:cxnChg>
-        <pc:cxnChg chg="del">
-          <ac:chgData name="Shuo Chen (MSR)" userId="2e7ebbab-928d-4621-b055-ba5ecd87af3f" providerId="ADAL" clId="{406DA4F5-19E9-4571-B523-F5B122CA674E}" dt="2023-05-02T04:54:07.739" v="1337" actId="478"/>
-          <ac:cxnSpMkLst>
-            <pc:docMk/>
-            <pc:sldMk cId="3980272723" sldId="301"/>
-            <ac:cxnSpMk id="32" creationId="{4935389C-A0B8-689D-7DBD-7E72F7833099}"/>
-          </ac:cxnSpMkLst>
-        </pc:cxnChg>
-        <pc:cxnChg chg="del">
-          <ac:chgData name="Shuo Chen (MSR)" userId="2e7ebbab-928d-4621-b055-ba5ecd87af3f" providerId="ADAL" clId="{406DA4F5-19E9-4571-B523-F5B122CA674E}" dt="2023-05-02T04:54:07.739" v="1337" actId="478"/>
-          <ac:cxnSpMkLst>
-            <pc:docMk/>
-            <pc:sldMk cId="3980272723" sldId="301"/>
-            <ac:cxnSpMk id="33" creationId="{4FFD2477-C032-4661-6DF5-09A607126D84}"/>
-          </ac:cxnSpMkLst>
-        </pc:cxnChg>
-        <pc:cxnChg chg="del">
-          <ac:chgData name="Shuo Chen (MSR)" userId="2e7ebbab-928d-4621-b055-ba5ecd87af3f" providerId="ADAL" clId="{406DA4F5-19E9-4571-B523-F5B122CA674E}" dt="2023-05-02T04:54:07.739" v="1337" actId="478"/>
-          <ac:cxnSpMkLst>
-            <pc:docMk/>
-            <pc:sldMk cId="3980272723" sldId="301"/>
-            <ac:cxnSpMk id="34" creationId="{45760F61-6D63-97D2-5DA1-F29F3E7D0E38}"/>
-          </ac:cxnSpMkLst>
-        </pc:cxnChg>
-        <pc:cxnChg chg="del">
-          <ac:chgData name="Shuo Chen (MSR)" userId="2e7ebbab-928d-4621-b055-ba5ecd87af3f" providerId="ADAL" clId="{406DA4F5-19E9-4571-B523-F5B122CA674E}" dt="2023-05-02T04:54:07.739" v="1337" actId="478"/>
-          <ac:cxnSpMkLst>
-            <pc:docMk/>
-            <pc:sldMk cId="3980272723" sldId="301"/>
-            <ac:cxnSpMk id="44" creationId="{4322E517-0EA7-4D1C-B4ED-1CDFA9C2C3C8}"/>
-          </ac:cxnSpMkLst>
-        </pc:cxnChg>
-        <pc:cxnChg chg="del">
-          <ac:chgData name="Shuo Chen (MSR)" userId="2e7ebbab-928d-4621-b055-ba5ecd87af3f" providerId="ADAL" clId="{406DA4F5-19E9-4571-B523-F5B122CA674E}" dt="2023-05-02T04:54:07.739" v="1337" actId="478"/>
-          <ac:cxnSpMkLst>
-            <pc:docMk/>
-            <pc:sldMk cId="3980272723" sldId="301"/>
-            <ac:cxnSpMk id="46" creationId="{18A5364F-0D13-5386-4DB4-0EB579BC6793}"/>
-          </ac:cxnSpMkLst>
-        </pc:cxnChg>
-        <pc:cxnChg chg="del">
-          <ac:chgData name="Shuo Chen (MSR)" userId="2e7ebbab-928d-4621-b055-ba5ecd87af3f" providerId="ADAL" clId="{406DA4F5-19E9-4571-B523-F5B122CA674E}" dt="2023-05-02T04:54:07.739" v="1337" actId="478"/>
-          <ac:cxnSpMkLst>
-            <pc:docMk/>
-            <pc:sldMk cId="3980272723" sldId="301"/>
-            <ac:cxnSpMk id="48" creationId="{E25F88C6-22B2-CAA0-5B7D-0689B4103A0A}"/>
-          </ac:cxnSpMkLst>
-        </pc:cxnChg>
-        <pc:cxnChg chg="del">
-          <ac:chgData name="Shuo Chen (MSR)" userId="2e7ebbab-928d-4621-b055-ba5ecd87af3f" providerId="ADAL" clId="{406DA4F5-19E9-4571-B523-F5B122CA674E}" dt="2023-05-02T04:54:07.739" v="1337" actId="478"/>
-          <ac:cxnSpMkLst>
-            <pc:docMk/>
-            <pc:sldMk cId="3980272723" sldId="301"/>
-            <ac:cxnSpMk id="51" creationId="{4342EBCD-EA90-C368-3226-F1F7192BC9F6}"/>
-          </ac:cxnSpMkLst>
-        </pc:cxnChg>
-        <pc:cxnChg chg="del">
-          <ac:chgData name="Shuo Chen (MSR)" userId="2e7ebbab-928d-4621-b055-ba5ecd87af3f" providerId="ADAL" clId="{406DA4F5-19E9-4571-B523-F5B122CA674E}" dt="2023-05-02T04:54:07.739" v="1337" actId="478"/>
-          <ac:cxnSpMkLst>
-            <pc:docMk/>
-            <pc:sldMk cId="3980272723" sldId="301"/>
-            <ac:cxnSpMk id="58" creationId="{901D2E43-ADC4-0E6A-67C6-308414C3D77E}"/>
-          </ac:cxnSpMkLst>
-        </pc:cxnChg>
-        <pc:cxnChg chg="add mod">
-          <ac:chgData name="Shuo Chen (MSR)" userId="2e7ebbab-928d-4621-b055-ba5ecd87af3f" providerId="ADAL" clId="{406DA4F5-19E9-4571-B523-F5B122CA674E}" dt="2023-05-02T04:54:23.062" v="1341"/>
-          <ac:cxnSpMkLst>
-            <pc:docMk/>
-            <pc:sldMk cId="3980272723" sldId="301"/>
-            <ac:cxnSpMk id="61" creationId="{9C58978C-F780-5757-964F-FE81DF97D436}"/>
-          </ac:cxnSpMkLst>
-        </pc:cxnChg>
-        <pc:cxnChg chg="add mod">
-          <ac:chgData name="Shuo Chen (MSR)" userId="2e7ebbab-928d-4621-b055-ba5ecd87af3f" providerId="ADAL" clId="{406DA4F5-19E9-4571-B523-F5B122CA674E}" dt="2023-05-02T04:54:23.062" v="1341"/>
-          <ac:cxnSpMkLst>
-            <pc:docMk/>
-            <pc:sldMk cId="3980272723" sldId="301"/>
-            <ac:cxnSpMk id="63" creationId="{EEFDA28B-5309-03F7-07FB-ECBDD21D42E4}"/>
-          </ac:cxnSpMkLst>
-        </pc:cxnChg>
-        <pc:cxnChg chg="add mod">
-          <ac:chgData name="Shuo Chen (MSR)" userId="2e7ebbab-928d-4621-b055-ba5ecd87af3f" providerId="ADAL" clId="{406DA4F5-19E9-4571-B523-F5B122CA674E}" dt="2023-05-02T04:54:23.062" v="1341"/>
-          <ac:cxnSpMkLst>
-            <pc:docMk/>
-            <pc:sldMk cId="3980272723" sldId="301"/>
-            <ac:cxnSpMk id="65" creationId="{A3480C54-5B7C-1D69-6599-BAFC9B204D0E}"/>
-          </ac:cxnSpMkLst>
-        </pc:cxnChg>
-        <pc:cxnChg chg="add mod">
-          <ac:chgData name="Shuo Chen (MSR)" userId="2e7ebbab-928d-4621-b055-ba5ecd87af3f" providerId="ADAL" clId="{406DA4F5-19E9-4571-B523-F5B122CA674E}" dt="2023-05-02T04:54:23.062" v="1341"/>
-          <ac:cxnSpMkLst>
-            <pc:docMk/>
-            <pc:sldMk cId="3980272723" sldId="301"/>
-            <ac:cxnSpMk id="68" creationId="{F85A274C-3D6F-0505-D96C-CF0F39C62DFE}"/>
-          </ac:cxnSpMkLst>
-        </pc:cxnChg>
-        <pc:cxnChg chg="add mod">
-          <ac:chgData name="Shuo Chen (MSR)" userId="2e7ebbab-928d-4621-b055-ba5ecd87af3f" providerId="ADAL" clId="{406DA4F5-19E9-4571-B523-F5B122CA674E}" dt="2023-05-02T04:54:23.062" v="1341"/>
-          <ac:cxnSpMkLst>
-            <pc:docMk/>
-            <pc:sldMk cId="3980272723" sldId="301"/>
-            <ac:cxnSpMk id="75" creationId="{58EC4310-4C25-087E-5054-48320D88DC5D}"/>
-          </ac:cxnSpMkLst>
-        </pc:cxnChg>
-      </pc:sldChg>
-      <pc:sldChg chg="modSp add del mod">
-        <pc:chgData name="Shuo Chen (MSR)" userId="2e7ebbab-928d-4621-b055-ba5ecd87af3f" providerId="ADAL" clId="{406DA4F5-19E9-4571-B523-F5B122CA674E}" dt="2023-05-02T15:47:21.425" v="1488" actId="2696"/>
-        <pc:sldMkLst>
-          <pc:docMk/>
-          <pc:sldMk cId="3504208454" sldId="302"/>
-        </pc:sldMkLst>
-        <pc:spChg chg="mod">
-          <ac:chgData name="Shuo Chen (MSR)" userId="2e7ebbab-928d-4621-b055-ba5ecd87af3f" providerId="ADAL" clId="{406DA4F5-19E9-4571-B523-F5B122CA674E}" dt="2023-05-02T15:34:52.745" v="1406" actId="20577"/>
-          <ac:spMkLst>
-            <pc:docMk/>
-            <pc:sldMk cId="3504208454" sldId="302"/>
-            <ac:spMk id="2" creationId="{AF1E760D-A108-EF06-3138-D7DED2193228}"/>
-          </ac:spMkLst>
-        </pc:spChg>
       </pc:sldChg>
     </pc:docChg>
   </pc:docChgLst>
@@ -4271,7 +4271,7 @@
           <a:p>
             <a:fld id="{10EE871F-A273-427E-BA1E-523665C0A9A1}" type="datetimeFigureOut">
               <a:rPr lang="zh-CN" altLang="en-US" smtClean="0"/>
-              <a:t>2023/6/29</a:t>
+              <a:t>2023/7/3</a:t>
             </a:fld>
             <a:endParaRPr lang="zh-CN" altLang="en-US"/>
           </a:p>
@@ -5192,7 +5192,7 @@
           <a:p>
             <a:fld id="{F5C9B11C-2E35-4BBE-A411-229FDA95A1F6}" type="datetime1">
               <a:rPr lang="zh-CN" altLang="en-US" smtClean="0"/>
-              <a:t>2023/6/29</a:t>
+              <a:t>2023/7/3</a:t>
             </a:fld>
             <a:endParaRPr lang="zh-CN" altLang="en-US"/>
           </a:p>
@@ -5395,7 +5395,7 @@
           <a:p>
             <a:fld id="{DD9FFD23-ED5D-4DBB-A023-F4E7D8E78482}" type="datetime1">
               <a:rPr lang="zh-CN" altLang="en-US" smtClean="0"/>
-              <a:t>2023/6/29</a:t>
+              <a:t>2023/7/3</a:t>
             </a:fld>
             <a:endParaRPr lang="zh-CN" altLang="en-US"/>
           </a:p>
@@ -5608,7 +5608,7 @@
           <a:p>
             <a:fld id="{95E4B150-72C2-4C8F-8639-7E26CF7C2598}" type="datetime1">
               <a:rPr lang="zh-CN" altLang="en-US" smtClean="0"/>
-              <a:t>2023/6/29</a:t>
+              <a:t>2023/7/3</a:t>
             </a:fld>
             <a:endParaRPr lang="zh-CN" altLang="en-US"/>
           </a:p>
@@ -5811,7 +5811,7 @@
           <a:p>
             <a:fld id="{67C2012E-1348-48B7-AF2E-E9D5DDB88ECE}" type="datetime1">
               <a:rPr lang="zh-CN" altLang="en-US" smtClean="0"/>
-              <a:t>2023/6/29</a:t>
+              <a:t>2023/7/3</a:t>
             </a:fld>
             <a:endParaRPr lang="zh-CN" altLang="en-US"/>
           </a:p>
@@ -6090,7 +6090,7 @@
           <a:p>
             <a:fld id="{E4E146BA-B668-49AB-A690-E17E212D48A6}" type="datetime1">
               <a:rPr lang="zh-CN" altLang="en-US" smtClean="0"/>
-              <a:t>2023/6/29</a:t>
+              <a:t>2023/7/3</a:t>
             </a:fld>
             <a:endParaRPr lang="zh-CN" altLang="en-US"/>
           </a:p>
@@ -6361,7 +6361,7 @@
           <a:p>
             <a:fld id="{259DC193-4E1F-4990-BACD-8923D59D0CF9}" type="datetime1">
               <a:rPr lang="zh-CN" altLang="en-US" smtClean="0"/>
-              <a:t>2023/6/29</a:t>
+              <a:t>2023/7/3</a:t>
             </a:fld>
             <a:endParaRPr lang="zh-CN" altLang="en-US"/>
           </a:p>
@@ -6779,7 +6779,7 @@
           <a:p>
             <a:fld id="{02B4C294-A0A9-4DD4-BB66-55AF9F9C4DF3}" type="datetime1">
               <a:rPr lang="zh-CN" altLang="en-US" smtClean="0"/>
-              <a:t>2023/6/29</a:t>
+              <a:t>2023/7/3</a:t>
             </a:fld>
             <a:endParaRPr lang="zh-CN" altLang="en-US"/>
           </a:p>
@@ -6924,7 +6924,7 @@
           <a:p>
             <a:fld id="{33A84F60-7835-4BB0-A861-C2D07AB234AF}" type="datetime1">
               <a:rPr lang="zh-CN" altLang="en-US" smtClean="0"/>
-              <a:t>2023/6/29</a:t>
+              <a:t>2023/7/3</a:t>
             </a:fld>
             <a:endParaRPr lang="zh-CN" altLang="en-US"/>
           </a:p>
@@ -7040,7 +7040,7 @@
           <a:p>
             <a:fld id="{CBC0C525-A64D-4D10-8CE6-B9E82F19F230}" type="datetime1">
               <a:rPr lang="zh-CN" altLang="en-US" smtClean="0"/>
-              <a:t>2023/6/29</a:t>
+              <a:t>2023/7/3</a:t>
             </a:fld>
             <a:endParaRPr lang="zh-CN" altLang="en-US"/>
           </a:p>
@@ -7356,7 +7356,7 @@
           <a:p>
             <a:fld id="{EC75B653-B6B9-499F-9CCF-FFAAED0A210F}" type="datetime1">
               <a:rPr lang="zh-CN" altLang="en-US" smtClean="0"/>
-              <a:t>2023/6/29</a:t>
+              <a:t>2023/7/3</a:t>
             </a:fld>
             <a:endParaRPr lang="zh-CN" altLang="en-US"/>
           </a:p>
@@ -7648,7 +7648,7 @@
           <a:p>
             <a:fld id="{ACFB8109-5CC5-4E05-B634-3BE25D9C4120}" type="datetime1">
               <a:rPr lang="zh-CN" altLang="en-US" smtClean="0"/>
-              <a:t>2023/6/29</a:t>
+              <a:t>2023/7/3</a:t>
             </a:fld>
             <a:endParaRPr lang="zh-CN" altLang="en-US"/>
           </a:p>
@@ -7894,7 +7894,7 @@
           <a:p>
             <a:fld id="{E7DE67FA-D627-47B3-A6E3-D088CD5448ED}" type="datetime1">
               <a:rPr lang="zh-CN" altLang="en-US" smtClean="0"/>
-              <a:t>2023/6/29</a:t>
+              <a:t>2023/7/3</a:t>
             </a:fld>
             <a:endParaRPr lang="zh-CN" altLang="en-US"/>
           </a:p>
@@ -12004,6 +12004,44 @@
           </p:txBody>
         </p:sp>
       </p:grpSp>
+      <p:sp>
+        <p:nvSpPr>
+          <p:cNvPr id="3" name="TextBox 2">
+            <a:extLst>
+              <a:ext uri="{FF2B5EF4-FFF2-40B4-BE49-F238E27FC236}">
+                <a16:creationId xmlns:a16="http://schemas.microsoft.com/office/drawing/2014/main" id="{0326970C-9BCD-2E50-F6F5-9CE1C82E6DD9}"/>
+              </a:ext>
+            </a:extLst>
+          </p:cNvPr>
+          <p:cNvSpPr txBox="1"/>
+          <p:nvPr/>
+        </p:nvSpPr>
+        <p:spPr>
+          <a:xfrm>
+            <a:off x="32062" y="6431913"/>
+            <a:ext cx="2058577" cy="369332"/>
+          </a:xfrm>
+          <a:prstGeom prst="rect">
+            <a:avLst/>
+          </a:prstGeom>
+          <a:noFill/>
+        </p:spPr>
+        <p:txBody>
+          <a:bodyPr wrap="none" rtlCol="0">
+            <a:spAutoFit/>
+          </a:bodyPr>
+          <a:lstStyle/>
+          <a:p>
+            <a:r>
+              <a:rPr lang="en-US" dirty="0">
+                <a:hlinkClick r:id="rId3"/>
+              </a:rPr>
+              <a:t>Demo on YouTube</a:t>
+            </a:r>
+            <a:endParaRPr lang="en-US" dirty="0"/>
+          </a:p>
+        </p:txBody>
+      </p:sp>
     </p:spTree>
     <p:extLst>
       <p:ext uri="{BB962C8B-B14F-4D97-AF65-F5344CB8AC3E}">

</xml_diff>

<commit_message>
fix a URL error in the demo-1 PPT
</commit_message>
<xml_diff>
--- a/trace-symexec/PPTs/demo-1.pptx
+++ b/trace-symexec/PPTs/demo-1.pptx
@@ -9444,10 +9444,11 @@
               <a:t>The </a:t>
             </a:r>
             <a:r>
-              <a:rPr lang="en-US" altLang="zh-CN" sz="2400" dirty="0" err="1">
+              <a:rPr lang="en-US" altLang="zh-CN" sz="2400" dirty="0">
                 <a:latin typeface="Consolas" panose="020B0609020204030204" pitchFamily="49" charset="0"/>
                 <a:ea typeface="Calibri" panose="020F0502020204030204" pitchFamily="34" charset="0"/>
                 <a:cs typeface="Calibri" panose="020F0502020204030204" pitchFamily="34" charset="0"/>
+                <a:hlinkClick r:id="rId4"/>
               </a:rPr>
               <a:t>MultiVulnToken</a:t>
             </a:r>
@@ -9456,8 +9457,17 @@
                 <a:latin typeface="Georgia" panose="02040502050405020303" pitchFamily="18" charset="0"/>
                 <a:ea typeface="Calibri" panose="020F0502020204030204" pitchFamily="34" charset="0"/>
                 <a:cs typeface="Calibri" panose="020F0502020204030204" pitchFamily="34" charset="0"/>
-              </a:rPr>
-              <a:t> contract contains two security vulnerabilities: integer overflow and reentrancy</a:t>
+                <a:hlinkClick r:id="rId4"/>
+              </a:rPr>
+              <a:t> contract </a:t>
+            </a:r>
+            <a:r>
+              <a:rPr lang="en-US" altLang="zh-CN" sz="2400" dirty="0">
+                <a:latin typeface="Georgia" panose="02040502050405020303" pitchFamily="18" charset="0"/>
+                <a:ea typeface="Calibri" panose="020F0502020204030204" pitchFamily="34" charset="0"/>
+                <a:cs typeface="Calibri" panose="020F0502020204030204" pitchFamily="34" charset="0"/>
+              </a:rPr>
+              <a:t>contains two security vulnerabilities: integer overflow and reentrancy</a:t>
             </a:r>
           </a:p>
           <a:p>
@@ -13155,15 +13165,7 @@
           <a:p>
             <a:r>
               <a:rPr lang="en-US" sz="1600" dirty="0"/>
-              <a:t>contract </a:t>
-            </a:r>
-            <a:r>
-              <a:rPr lang="en-US" sz="1600" dirty="0" err="1"/>
-              <a:t>MultiVulnToken</a:t>
-            </a:r>
-            <a:r>
-              <a:rPr lang="en-US" sz="1600" dirty="0"/>
-              <a:t> is </a:t>
+              <a:t>contract MultiVulnToken is </a:t>
             </a:r>
             <a:r>
               <a:rPr lang="en-US" sz="1600" dirty="0" err="1"/>
@@ -13427,14 +13429,14 @@
               </a:lnSpc>
             </a:pPr>
             <a:r>
-              <a:rPr lang="en-US" altLang="zh-CN" sz="1800" dirty="0">
+              <a:rPr lang="en-US" altLang="zh-CN" sz="1600" dirty="0">
                 <a:latin typeface="Georgia" panose="02040502050405020303" pitchFamily="18" charset="0"/>
                 <a:ea typeface="Calibri" panose="020F0502020204030204" pitchFamily="34" charset="0"/>
               </a:rPr>
               <a:t>Theorem file (e.g., </a:t>
             </a:r>
             <a:r>
-              <a:rPr lang="en-US" altLang="zh-CN" sz="1800" dirty="0">
+              <a:rPr lang="en-US" altLang="zh-CN" sz="1600" dirty="0">
                 <a:latin typeface="Georgia" panose="02040502050405020303" pitchFamily="18" charset="0"/>
                 <a:ea typeface="Calibri" panose="020F0502020204030204" pitchFamily="34" charset="0"/>
                 <a:hlinkClick r:id="rId3"/>
@@ -13442,20 +13444,20 @@
               <a:t>https://github.com/TCT-web3/demo/blob/main/trace-symexec/theorem3.json</a:t>
             </a:r>
             <a:r>
-              <a:rPr lang="en-US" altLang="zh-CN" sz="1800" dirty="0">
+              <a:rPr lang="en-US" altLang="zh-CN" sz="1600" dirty="0">
                 <a:latin typeface="Georgia" panose="02040502050405020303" pitchFamily="18" charset="0"/>
                 <a:ea typeface="Calibri" panose="020F0502020204030204" pitchFamily="34" charset="0"/>
               </a:rPr>
               <a:t>) </a:t>
             </a:r>
-            <a:endParaRPr lang="en-US" altLang="zh-CN" sz="1800" dirty="0">
+            <a:endParaRPr lang="en-US" altLang="zh-CN" sz="1600" dirty="0">
               <a:effectLst/>
               <a:latin typeface="Georgia" panose="02040502050405020303" pitchFamily="18" charset="0"/>
               <a:ea typeface="Calibri" panose="020F0502020204030204" pitchFamily="34" charset="0"/>
             </a:endParaRPr>
           </a:p>
           <a:p>
-            <a:endParaRPr lang="zh-CN" altLang="en-US" dirty="0"/>
+            <a:endParaRPr lang="zh-CN" altLang="en-US" sz="2400" dirty="0"/>
           </a:p>
         </p:txBody>
       </p:sp>
@@ -13534,7 +13536,7 @@
                   <a:schemeClr val="tx1"/>
                 </a:solidFill>
               </a:rPr>
-              <a:t>    "entry-for-test":"</a:t>
+              <a:t>    "</a:t>
             </a:r>
             <a:r>
               <a:rPr lang="en-US" sz="1600" dirty="0" err="1">
@@ -13542,7 +13544,7 @@
                   <a:schemeClr val="tx1"/>
                 </a:solidFill>
               </a:rPr>
-              <a:t>MultiVulnToken</a:t>
+              <a:t>entry-for-test":"MultiVulnToken</a:t>
             </a:r>
             <a:r>
               <a:rPr lang="en-US" sz="1600" dirty="0">
@@ -13654,7 +13656,7 @@
         <p:spPr>
           <a:xfrm>
             <a:off x="838200" y="3934868"/>
-            <a:ext cx="10693893" cy="649848"/>
+            <a:ext cx="10906496" cy="649848"/>
           </a:xfrm>
           <a:prstGeom prst="rect">
             <a:avLst/>
@@ -13835,22 +13837,22 @@
               </a:lnSpc>
             </a:pPr>
             <a:r>
-              <a:rPr lang="en-US" altLang="zh-CN" sz="1800" dirty="0">
+              <a:rPr lang="en-US" altLang="zh-CN" sz="1600" dirty="0">
                 <a:latin typeface="Georgia" panose="02040502050405020303" pitchFamily="18" charset="0"/>
                 <a:ea typeface="Calibri" panose="020F0502020204030204" pitchFamily="34" charset="0"/>
               </a:rPr>
               <a:t>Trace file (e.g., </a:t>
             </a:r>
             <a:r>
-              <a:rPr lang="en-US" altLang="zh-CN" sz="1800" dirty="0">
+              <a:rPr lang="en-US" altLang="zh-CN" sz="1600" dirty="0">
                 <a:latin typeface="Georgia" panose="02040502050405020303" pitchFamily="18" charset="0"/>
                 <a:ea typeface="Calibri" panose="020F0502020204030204" pitchFamily="34" charset="0"/>
-                <a:hlinkClick r:id="rId3"/>
-              </a:rPr>
-              <a:t>https://github.com/TCT-web3/demo/blob/main/trace-symexec/theorem3.json</a:t>
-            </a:r>
-            <a:r>
-              <a:rPr lang="en-US" altLang="zh-CN" sz="1800" dirty="0">
+                <a:hlinkClick r:id="rId4"/>
+              </a:rPr>
+              <a:t>https://github.com/TCT-web3/demo/blob/main/trace-symexec/sampleAutoGenTrace3.txt</a:t>
+            </a:r>
+            <a:r>
+              <a:rPr lang="en-US" altLang="zh-CN" sz="1600" dirty="0">
                 <a:latin typeface="Georgia" panose="02040502050405020303" pitchFamily="18" charset="0"/>
                 <a:ea typeface="Calibri" panose="020F0502020204030204" pitchFamily="34" charset="0"/>
               </a:rPr>
@@ -13937,23 +13939,7 @@
                   <a:schemeClr val="tx1"/>
                 </a:solidFill>
               </a:rPr>
-              <a:t>&gt;&gt;enter 0x000000000000000000000000343d506162c506bc2a64a8dad82aaf9918eeebfa::0x3d0a4061(</a:t>
-            </a:r>
-            <a:r>
-              <a:rPr lang="en-US" sz="1050" dirty="0" err="1">
-                <a:solidFill>
-                  <a:schemeClr val="tx1"/>
-                </a:solidFill>
-              </a:rPr>
-              <a:t>MultiVulnToken</a:t>
-            </a:r>
-            <a:r>
-              <a:rPr lang="en-US" sz="1050" dirty="0">
-                <a:solidFill>
-                  <a:schemeClr val="tx1"/>
-                </a:solidFill>
-              </a:rPr>
-              <a:t>::clear(address)) -</a:t>
+              <a:t>&gt;&gt;enter 0x000000000000000000000000343d506162c506bc2a64a8dad82aaf9918eeebfa::0x3d0a4061(MultiVulnToken::clear(address)) -</a:t>
             </a:r>
           </a:p>
           <a:p>
@@ -15159,23 +15145,7 @@
                   <a:schemeClr val="tx1"/>
                 </a:solidFill>
               </a:rPr>
-              <a:t>   "entry-for-test“: "</a:t>
-            </a:r>
-            <a:r>
-              <a:rPr lang="en-US" sz="1200" dirty="0" err="1">
-                <a:solidFill>
-                  <a:schemeClr val="tx1"/>
-                </a:solidFill>
-              </a:rPr>
-              <a:t>MultiVulnToken</a:t>
-            </a:r>
-            <a:r>
-              <a:rPr lang="en-US" sz="1200" dirty="0">
-                <a:solidFill>
-                  <a:schemeClr val="tx1"/>
-                </a:solidFill>
-              </a:rPr>
-              <a:t>::</a:t>
+              <a:t>   "entry-for-test“: "MultiVulnToken::</a:t>
             </a:r>
             <a:r>
               <a:rPr lang="en-US" sz="1200" dirty="0" err="1">

</xml_diff>